<commit_message>
Papildināta prezentācija, ar informācijas avotiem
</commit_message>
<xml_diff>
--- a/macibu_materiali/eksamens_krumins.pptx
+++ b/macibu_materiali/eksamens_krumins.pptx
@@ -6287,6 +6287,318 @@
   <p:clrMapOvr>
     <a:masterClrMapping/>
   </p:clrMapOvr>
+  <p:timing>
+    <p:tnLst>
+      <p:par>
+        <p:cTn id="1" dur="indefinite" restart="never" nodeType="tmRoot">
+          <p:childTnLst>
+            <p:seq concurrent="1" nextAc="seek">
+              <p:cTn id="2" dur="indefinite" nodeType="mainSeq">
+                <p:childTnLst>
+                  <p:par>
+                    <p:cTn id="3" fill="hold">
+                      <p:stCondLst>
+                        <p:cond delay="indefinite"/>
+                      </p:stCondLst>
+                      <p:childTnLst>
+                        <p:par>
+                          <p:cTn id="4" fill="hold">
+                            <p:stCondLst>
+                              <p:cond delay="0"/>
+                            </p:stCondLst>
+                            <p:childTnLst>
+                              <p:par>
+                                <p:cTn id="5" presetID="42" presetClass="entr" presetSubtype="0" fill="hold" grpId="0" nodeType="clickEffect">
+                                  <p:stCondLst>
+                                    <p:cond delay="0"/>
+                                  </p:stCondLst>
+                                  <p:childTnLst>
+                                    <p:set>
+                                      <p:cBhvr>
+                                        <p:cTn id="6" dur="1" fill="hold">
+                                          <p:stCondLst>
+                                            <p:cond delay="0"/>
+                                          </p:stCondLst>
+                                        </p:cTn>
+                                        <p:tgtEl>
+                                          <p:spTgt spid="2"/>
+                                        </p:tgtEl>
+                                        <p:attrNameLst>
+                                          <p:attrName>style.visibility</p:attrName>
+                                        </p:attrNameLst>
+                                      </p:cBhvr>
+                                      <p:to>
+                                        <p:strVal val="visible"/>
+                                      </p:to>
+                                    </p:set>
+                                    <p:animEffect transition="in" filter="fade">
+                                      <p:cBhvr>
+                                        <p:cTn id="7" dur="1000"/>
+                                        <p:tgtEl>
+                                          <p:spTgt spid="2"/>
+                                        </p:tgtEl>
+                                      </p:cBhvr>
+                                    </p:animEffect>
+                                    <p:anim calcmode="lin" valueType="num">
+                                      <p:cBhvr>
+                                        <p:cTn id="8" dur="1000" fill="hold"/>
+                                        <p:tgtEl>
+                                          <p:spTgt spid="2"/>
+                                        </p:tgtEl>
+                                        <p:attrNameLst>
+                                          <p:attrName>ppt_x</p:attrName>
+                                        </p:attrNameLst>
+                                      </p:cBhvr>
+                                      <p:tavLst>
+                                        <p:tav tm="0">
+                                          <p:val>
+                                            <p:strVal val="#ppt_x"/>
+                                          </p:val>
+                                        </p:tav>
+                                        <p:tav tm="100000">
+                                          <p:val>
+                                            <p:strVal val="#ppt_x"/>
+                                          </p:val>
+                                        </p:tav>
+                                      </p:tavLst>
+                                    </p:anim>
+                                    <p:anim calcmode="lin" valueType="num">
+                                      <p:cBhvr>
+                                        <p:cTn id="9" dur="1000" fill="hold"/>
+                                        <p:tgtEl>
+                                          <p:spTgt spid="2"/>
+                                        </p:tgtEl>
+                                        <p:attrNameLst>
+                                          <p:attrName>ppt_y</p:attrName>
+                                        </p:attrNameLst>
+                                      </p:cBhvr>
+                                      <p:tavLst>
+                                        <p:tav tm="0">
+                                          <p:val>
+                                            <p:strVal val="#ppt_y+.1"/>
+                                          </p:val>
+                                        </p:tav>
+                                        <p:tav tm="100000">
+                                          <p:val>
+                                            <p:strVal val="#ppt_y"/>
+                                          </p:val>
+                                        </p:tav>
+                                      </p:tavLst>
+                                    </p:anim>
+                                  </p:childTnLst>
+                                </p:cTn>
+                              </p:par>
+                            </p:childTnLst>
+                          </p:cTn>
+                        </p:par>
+                      </p:childTnLst>
+                    </p:cTn>
+                  </p:par>
+                  <p:par>
+                    <p:cTn id="10" fill="hold">
+                      <p:stCondLst>
+                        <p:cond delay="indefinite"/>
+                      </p:stCondLst>
+                      <p:childTnLst>
+                        <p:par>
+                          <p:cTn id="11" fill="hold">
+                            <p:stCondLst>
+                              <p:cond delay="0"/>
+                            </p:stCondLst>
+                            <p:childTnLst>
+                              <p:par>
+                                <p:cTn id="12" presetID="42" presetClass="entr" presetSubtype="0" fill="hold" nodeType="clickEffect">
+                                  <p:stCondLst>
+                                    <p:cond delay="0"/>
+                                  </p:stCondLst>
+                                  <p:childTnLst>
+                                    <p:set>
+                                      <p:cBhvr>
+                                        <p:cTn id="13" dur="1" fill="hold">
+                                          <p:stCondLst>
+                                            <p:cond delay="0"/>
+                                          </p:stCondLst>
+                                        </p:cTn>
+                                        <p:tgtEl>
+                                          <p:spTgt spid="11"/>
+                                        </p:tgtEl>
+                                        <p:attrNameLst>
+                                          <p:attrName>style.visibility</p:attrName>
+                                        </p:attrNameLst>
+                                      </p:cBhvr>
+                                      <p:to>
+                                        <p:strVal val="visible"/>
+                                      </p:to>
+                                    </p:set>
+                                    <p:animEffect transition="in" filter="fade">
+                                      <p:cBhvr>
+                                        <p:cTn id="14" dur="1000"/>
+                                        <p:tgtEl>
+                                          <p:spTgt spid="11"/>
+                                        </p:tgtEl>
+                                      </p:cBhvr>
+                                    </p:animEffect>
+                                    <p:anim calcmode="lin" valueType="num">
+                                      <p:cBhvr>
+                                        <p:cTn id="15" dur="1000" fill="hold"/>
+                                        <p:tgtEl>
+                                          <p:spTgt spid="11"/>
+                                        </p:tgtEl>
+                                        <p:attrNameLst>
+                                          <p:attrName>ppt_x</p:attrName>
+                                        </p:attrNameLst>
+                                      </p:cBhvr>
+                                      <p:tavLst>
+                                        <p:tav tm="0">
+                                          <p:val>
+                                            <p:strVal val="#ppt_x"/>
+                                          </p:val>
+                                        </p:tav>
+                                        <p:tav tm="100000">
+                                          <p:val>
+                                            <p:strVal val="#ppt_x"/>
+                                          </p:val>
+                                        </p:tav>
+                                      </p:tavLst>
+                                    </p:anim>
+                                    <p:anim calcmode="lin" valueType="num">
+                                      <p:cBhvr>
+                                        <p:cTn id="16" dur="1000" fill="hold"/>
+                                        <p:tgtEl>
+                                          <p:spTgt spid="11"/>
+                                        </p:tgtEl>
+                                        <p:attrNameLst>
+                                          <p:attrName>ppt_y</p:attrName>
+                                        </p:attrNameLst>
+                                      </p:cBhvr>
+                                      <p:tavLst>
+                                        <p:tav tm="0">
+                                          <p:val>
+                                            <p:strVal val="#ppt_y+.1"/>
+                                          </p:val>
+                                        </p:tav>
+                                        <p:tav tm="100000">
+                                          <p:val>
+                                            <p:strVal val="#ppt_y"/>
+                                          </p:val>
+                                        </p:tav>
+                                      </p:tavLst>
+                                    </p:anim>
+                                  </p:childTnLst>
+                                </p:cTn>
+                              </p:par>
+                              <p:par>
+                                <p:cTn id="17" presetID="42" presetClass="entr" presetSubtype="0" fill="hold" nodeType="withEffect">
+                                  <p:stCondLst>
+                                    <p:cond delay="0"/>
+                                  </p:stCondLst>
+                                  <p:childTnLst>
+                                    <p:set>
+                                      <p:cBhvr>
+                                        <p:cTn id="18" dur="1" fill="hold">
+                                          <p:stCondLst>
+                                            <p:cond delay="0"/>
+                                          </p:stCondLst>
+                                        </p:cTn>
+                                        <p:tgtEl>
+                                          <p:spTgt spid="14"/>
+                                        </p:tgtEl>
+                                        <p:attrNameLst>
+                                          <p:attrName>style.visibility</p:attrName>
+                                        </p:attrNameLst>
+                                      </p:cBhvr>
+                                      <p:to>
+                                        <p:strVal val="visible"/>
+                                      </p:to>
+                                    </p:set>
+                                    <p:animEffect transition="in" filter="fade">
+                                      <p:cBhvr>
+                                        <p:cTn id="19" dur="1000"/>
+                                        <p:tgtEl>
+                                          <p:spTgt spid="14"/>
+                                        </p:tgtEl>
+                                      </p:cBhvr>
+                                    </p:animEffect>
+                                    <p:anim calcmode="lin" valueType="num">
+                                      <p:cBhvr>
+                                        <p:cTn id="20" dur="1000" fill="hold"/>
+                                        <p:tgtEl>
+                                          <p:spTgt spid="14"/>
+                                        </p:tgtEl>
+                                        <p:attrNameLst>
+                                          <p:attrName>ppt_x</p:attrName>
+                                        </p:attrNameLst>
+                                      </p:cBhvr>
+                                      <p:tavLst>
+                                        <p:tav tm="0">
+                                          <p:val>
+                                            <p:strVal val="#ppt_x"/>
+                                          </p:val>
+                                        </p:tav>
+                                        <p:tav tm="100000">
+                                          <p:val>
+                                            <p:strVal val="#ppt_x"/>
+                                          </p:val>
+                                        </p:tav>
+                                      </p:tavLst>
+                                    </p:anim>
+                                    <p:anim calcmode="lin" valueType="num">
+                                      <p:cBhvr>
+                                        <p:cTn id="21" dur="1000" fill="hold"/>
+                                        <p:tgtEl>
+                                          <p:spTgt spid="14"/>
+                                        </p:tgtEl>
+                                        <p:attrNameLst>
+                                          <p:attrName>ppt_y</p:attrName>
+                                        </p:attrNameLst>
+                                      </p:cBhvr>
+                                      <p:tavLst>
+                                        <p:tav tm="0">
+                                          <p:val>
+                                            <p:strVal val="#ppt_y+.1"/>
+                                          </p:val>
+                                        </p:tav>
+                                        <p:tav tm="100000">
+                                          <p:val>
+                                            <p:strVal val="#ppt_y"/>
+                                          </p:val>
+                                        </p:tav>
+                                      </p:tavLst>
+                                    </p:anim>
+                                  </p:childTnLst>
+                                </p:cTn>
+                              </p:par>
+                            </p:childTnLst>
+                          </p:cTn>
+                        </p:par>
+                      </p:childTnLst>
+                    </p:cTn>
+                  </p:par>
+                </p:childTnLst>
+              </p:cTn>
+              <p:prevCondLst>
+                <p:cond evt="onPrev" delay="0">
+                  <p:tgtEl>
+                    <p:sldTgt/>
+                  </p:tgtEl>
+                </p:cond>
+              </p:prevCondLst>
+              <p:nextCondLst>
+                <p:cond evt="onNext" delay="0">
+                  <p:tgtEl>
+                    <p:sldTgt/>
+                  </p:tgtEl>
+                </p:cond>
+              </p:nextCondLst>
+            </p:seq>
+          </p:childTnLst>
+        </p:cTn>
+      </p:par>
+    </p:tnLst>
+    <p:bldLst>
+      <p:bldP spid="2" grpId="0"/>
+    </p:bldLst>
+  </p:timing>
 </p:sld>
 </file>
 
@@ -6405,6 +6717,318 @@
   <p:clrMapOvr>
     <a:masterClrMapping/>
   </p:clrMapOvr>
+  <p:timing>
+    <p:tnLst>
+      <p:par>
+        <p:cTn id="1" dur="indefinite" restart="never" nodeType="tmRoot">
+          <p:childTnLst>
+            <p:seq concurrent="1" nextAc="seek">
+              <p:cTn id="2" dur="indefinite" nodeType="mainSeq">
+                <p:childTnLst>
+                  <p:par>
+                    <p:cTn id="3" fill="hold">
+                      <p:stCondLst>
+                        <p:cond delay="indefinite"/>
+                      </p:stCondLst>
+                      <p:childTnLst>
+                        <p:par>
+                          <p:cTn id="4" fill="hold">
+                            <p:stCondLst>
+                              <p:cond delay="0"/>
+                            </p:stCondLst>
+                            <p:childTnLst>
+                              <p:par>
+                                <p:cTn id="5" presetID="42" presetClass="entr" presetSubtype="0" fill="hold" grpId="0" nodeType="clickEffect">
+                                  <p:stCondLst>
+                                    <p:cond delay="0"/>
+                                  </p:stCondLst>
+                                  <p:childTnLst>
+                                    <p:set>
+                                      <p:cBhvr>
+                                        <p:cTn id="6" dur="1" fill="hold">
+                                          <p:stCondLst>
+                                            <p:cond delay="0"/>
+                                          </p:stCondLst>
+                                        </p:cTn>
+                                        <p:tgtEl>
+                                          <p:spTgt spid="2"/>
+                                        </p:tgtEl>
+                                        <p:attrNameLst>
+                                          <p:attrName>style.visibility</p:attrName>
+                                        </p:attrNameLst>
+                                      </p:cBhvr>
+                                      <p:to>
+                                        <p:strVal val="visible"/>
+                                      </p:to>
+                                    </p:set>
+                                    <p:animEffect transition="in" filter="fade">
+                                      <p:cBhvr>
+                                        <p:cTn id="7" dur="1000"/>
+                                        <p:tgtEl>
+                                          <p:spTgt spid="2"/>
+                                        </p:tgtEl>
+                                      </p:cBhvr>
+                                    </p:animEffect>
+                                    <p:anim calcmode="lin" valueType="num">
+                                      <p:cBhvr>
+                                        <p:cTn id="8" dur="1000" fill="hold"/>
+                                        <p:tgtEl>
+                                          <p:spTgt spid="2"/>
+                                        </p:tgtEl>
+                                        <p:attrNameLst>
+                                          <p:attrName>ppt_x</p:attrName>
+                                        </p:attrNameLst>
+                                      </p:cBhvr>
+                                      <p:tavLst>
+                                        <p:tav tm="0">
+                                          <p:val>
+                                            <p:strVal val="#ppt_x"/>
+                                          </p:val>
+                                        </p:tav>
+                                        <p:tav tm="100000">
+                                          <p:val>
+                                            <p:strVal val="#ppt_x"/>
+                                          </p:val>
+                                        </p:tav>
+                                      </p:tavLst>
+                                    </p:anim>
+                                    <p:anim calcmode="lin" valueType="num">
+                                      <p:cBhvr>
+                                        <p:cTn id="9" dur="1000" fill="hold"/>
+                                        <p:tgtEl>
+                                          <p:spTgt spid="2"/>
+                                        </p:tgtEl>
+                                        <p:attrNameLst>
+                                          <p:attrName>ppt_y</p:attrName>
+                                        </p:attrNameLst>
+                                      </p:cBhvr>
+                                      <p:tavLst>
+                                        <p:tav tm="0">
+                                          <p:val>
+                                            <p:strVal val="#ppt_y+.1"/>
+                                          </p:val>
+                                        </p:tav>
+                                        <p:tav tm="100000">
+                                          <p:val>
+                                            <p:strVal val="#ppt_y"/>
+                                          </p:val>
+                                        </p:tav>
+                                      </p:tavLst>
+                                    </p:anim>
+                                  </p:childTnLst>
+                                </p:cTn>
+                              </p:par>
+                            </p:childTnLst>
+                          </p:cTn>
+                        </p:par>
+                      </p:childTnLst>
+                    </p:cTn>
+                  </p:par>
+                  <p:par>
+                    <p:cTn id="10" fill="hold">
+                      <p:stCondLst>
+                        <p:cond delay="indefinite"/>
+                      </p:stCondLst>
+                      <p:childTnLst>
+                        <p:par>
+                          <p:cTn id="11" fill="hold">
+                            <p:stCondLst>
+                              <p:cond delay="0"/>
+                            </p:stCondLst>
+                            <p:childTnLst>
+                              <p:par>
+                                <p:cTn id="12" presetID="42" presetClass="entr" presetSubtype="0" fill="hold" nodeType="clickEffect">
+                                  <p:stCondLst>
+                                    <p:cond delay="0"/>
+                                  </p:stCondLst>
+                                  <p:childTnLst>
+                                    <p:set>
+                                      <p:cBhvr>
+                                        <p:cTn id="13" dur="1" fill="hold">
+                                          <p:stCondLst>
+                                            <p:cond delay="0"/>
+                                          </p:stCondLst>
+                                        </p:cTn>
+                                        <p:tgtEl>
+                                          <p:spTgt spid="11"/>
+                                        </p:tgtEl>
+                                        <p:attrNameLst>
+                                          <p:attrName>style.visibility</p:attrName>
+                                        </p:attrNameLst>
+                                      </p:cBhvr>
+                                      <p:to>
+                                        <p:strVal val="visible"/>
+                                      </p:to>
+                                    </p:set>
+                                    <p:animEffect transition="in" filter="fade">
+                                      <p:cBhvr>
+                                        <p:cTn id="14" dur="1000"/>
+                                        <p:tgtEl>
+                                          <p:spTgt spid="11"/>
+                                        </p:tgtEl>
+                                      </p:cBhvr>
+                                    </p:animEffect>
+                                    <p:anim calcmode="lin" valueType="num">
+                                      <p:cBhvr>
+                                        <p:cTn id="15" dur="1000" fill="hold"/>
+                                        <p:tgtEl>
+                                          <p:spTgt spid="11"/>
+                                        </p:tgtEl>
+                                        <p:attrNameLst>
+                                          <p:attrName>ppt_x</p:attrName>
+                                        </p:attrNameLst>
+                                      </p:cBhvr>
+                                      <p:tavLst>
+                                        <p:tav tm="0">
+                                          <p:val>
+                                            <p:strVal val="#ppt_x"/>
+                                          </p:val>
+                                        </p:tav>
+                                        <p:tav tm="100000">
+                                          <p:val>
+                                            <p:strVal val="#ppt_x"/>
+                                          </p:val>
+                                        </p:tav>
+                                      </p:tavLst>
+                                    </p:anim>
+                                    <p:anim calcmode="lin" valueType="num">
+                                      <p:cBhvr>
+                                        <p:cTn id="16" dur="1000" fill="hold"/>
+                                        <p:tgtEl>
+                                          <p:spTgt spid="11"/>
+                                        </p:tgtEl>
+                                        <p:attrNameLst>
+                                          <p:attrName>ppt_y</p:attrName>
+                                        </p:attrNameLst>
+                                      </p:cBhvr>
+                                      <p:tavLst>
+                                        <p:tav tm="0">
+                                          <p:val>
+                                            <p:strVal val="#ppt_y+.1"/>
+                                          </p:val>
+                                        </p:tav>
+                                        <p:tav tm="100000">
+                                          <p:val>
+                                            <p:strVal val="#ppt_y"/>
+                                          </p:val>
+                                        </p:tav>
+                                      </p:tavLst>
+                                    </p:anim>
+                                  </p:childTnLst>
+                                </p:cTn>
+                              </p:par>
+                              <p:par>
+                                <p:cTn id="17" presetID="42" presetClass="entr" presetSubtype="0" fill="hold" nodeType="withEffect">
+                                  <p:stCondLst>
+                                    <p:cond delay="0"/>
+                                  </p:stCondLst>
+                                  <p:childTnLst>
+                                    <p:set>
+                                      <p:cBhvr>
+                                        <p:cTn id="18" dur="1" fill="hold">
+                                          <p:stCondLst>
+                                            <p:cond delay="0"/>
+                                          </p:stCondLst>
+                                        </p:cTn>
+                                        <p:tgtEl>
+                                          <p:spTgt spid="7"/>
+                                        </p:tgtEl>
+                                        <p:attrNameLst>
+                                          <p:attrName>style.visibility</p:attrName>
+                                        </p:attrNameLst>
+                                      </p:cBhvr>
+                                      <p:to>
+                                        <p:strVal val="visible"/>
+                                      </p:to>
+                                    </p:set>
+                                    <p:animEffect transition="in" filter="fade">
+                                      <p:cBhvr>
+                                        <p:cTn id="19" dur="1000"/>
+                                        <p:tgtEl>
+                                          <p:spTgt spid="7"/>
+                                        </p:tgtEl>
+                                      </p:cBhvr>
+                                    </p:animEffect>
+                                    <p:anim calcmode="lin" valueType="num">
+                                      <p:cBhvr>
+                                        <p:cTn id="20" dur="1000" fill="hold"/>
+                                        <p:tgtEl>
+                                          <p:spTgt spid="7"/>
+                                        </p:tgtEl>
+                                        <p:attrNameLst>
+                                          <p:attrName>ppt_x</p:attrName>
+                                        </p:attrNameLst>
+                                      </p:cBhvr>
+                                      <p:tavLst>
+                                        <p:tav tm="0">
+                                          <p:val>
+                                            <p:strVal val="#ppt_x"/>
+                                          </p:val>
+                                        </p:tav>
+                                        <p:tav tm="100000">
+                                          <p:val>
+                                            <p:strVal val="#ppt_x"/>
+                                          </p:val>
+                                        </p:tav>
+                                      </p:tavLst>
+                                    </p:anim>
+                                    <p:anim calcmode="lin" valueType="num">
+                                      <p:cBhvr>
+                                        <p:cTn id="21" dur="1000" fill="hold"/>
+                                        <p:tgtEl>
+                                          <p:spTgt spid="7"/>
+                                        </p:tgtEl>
+                                        <p:attrNameLst>
+                                          <p:attrName>ppt_y</p:attrName>
+                                        </p:attrNameLst>
+                                      </p:cBhvr>
+                                      <p:tavLst>
+                                        <p:tav tm="0">
+                                          <p:val>
+                                            <p:strVal val="#ppt_y+.1"/>
+                                          </p:val>
+                                        </p:tav>
+                                        <p:tav tm="100000">
+                                          <p:val>
+                                            <p:strVal val="#ppt_y"/>
+                                          </p:val>
+                                        </p:tav>
+                                      </p:tavLst>
+                                    </p:anim>
+                                  </p:childTnLst>
+                                </p:cTn>
+                              </p:par>
+                            </p:childTnLst>
+                          </p:cTn>
+                        </p:par>
+                      </p:childTnLst>
+                    </p:cTn>
+                  </p:par>
+                </p:childTnLst>
+              </p:cTn>
+              <p:prevCondLst>
+                <p:cond evt="onPrev" delay="0">
+                  <p:tgtEl>
+                    <p:sldTgt/>
+                  </p:tgtEl>
+                </p:cond>
+              </p:prevCondLst>
+              <p:nextCondLst>
+                <p:cond evt="onNext" delay="0">
+                  <p:tgtEl>
+                    <p:sldTgt/>
+                  </p:tgtEl>
+                </p:cond>
+              </p:nextCondLst>
+            </p:seq>
+          </p:childTnLst>
+        </p:cTn>
+      </p:par>
+    </p:tnLst>
+    <p:bldLst>
+      <p:bldP spid="2" grpId="0"/>
+    </p:bldLst>
+  </p:timing>
 </p:sld>
 </file>
 
@@ -6583,6 +7207,534 @@
   <p:clrMapOvr>
     <a:masterClrMapping/>
   </p:clrMapOvr>
+  <p:timing>
+    <p:tnLst>
+      <p:par>
+        <p:cTn id="1" dur="indefinite" restart="never" nodeType="tmRoot">
+          <p:childTnLst>
+            <p:seq concurrent="1" nextAc="seek">
+              <p:cTn id="2" dur="indefinite" nodeType="mainSeq">
+                <p:childTnLst>
+                  <p:par>
+                    <p:cTn id="3" fill="hold">
+                      <p:stCondLst>
+                        <p:cond delay="indefinite"/>
+                      </p:stCondLst>
+                      <p:childTnLst>
+                        <p:par>
+                          <p:cTn id="4" fill="hold">
+                            <p:stCondLst>
+                              <p:cond delay="0"/>
+                            </p:stCondLst>
+                            <p:childTnLst>
+                              <p:par>
+                                <p:cTn id="5" presetID="42" presetClass="entr" presetSubtype="0" fill="hold" grpId="0" nodeType="clickEffect">
+                                  <p:stCondLst>
+                                    <p:cond delay="0"/>
+                                  </p:stCondLst>
+                                  <p:childTnLst>
+                                    <p:set>
+                                      <p:cBhvr>
+                                        <p:cTn id="6" dur="1" fill="hold">
+                                          <p:stCondLst>
+                                            <p:cond delay="0"/>
+                                          </p:stCondLst>
+                                        </p:cTn>
+                                        <p:tgtEl>
+                                          <p:spTgt spid="2"/>
+                                        </p:tgtEl>
+                                        <p:attrNameLst>
+                                          <p:attrName>style.visibility</p:attrName>
+                                        </p:attrNameLst>
+                                      </p:cBhvr>
+                                      <p:to>
+                                        <p:strVal val="visible"/>
+                                      </p:to>
+                                    </p:set>
+                                    <p:animEffect transition="in" filter="fade">
+                                      <p:cBhvr>
+                                        <p:cTn id="7" dur="1000"/>
+                                        <p:tgtEl>
+                                          <p:spTgt spid="2"/>
+                                        </p:tgtEl>
+                                      </p:cBhvr>
+                                    </p:animEffect>
+                                    <p:anim calcmode="lin" valueType="num">
+                                      <p:cBhvr>
+                                        <p:cTn id="8" dur="1000" fill="hold"/>
+                                        <p:tgtEl>
+                                          <p:spTgt spid="2"/>
+                                        </p:tgtEl>
+                                        <p:attrNameLst>
+                                          <p:attrName>ppt_x</p:attrName>
+                                        </p:attrNameLst>
+                                      </p:cBhvr>
+                                      <p:tavLst>
+                                        <p:tav tm="0">
+                                          <p:val>
+                                            <p:strVal val="#ppt_x"/>
+                                          </p:val>
+                                        </p:tav>
+                                        <p:tav tm="100000">
+                                          <p:val>
+                                            <p:strVal val="#ppt_x"/>
+                                          </p:val>
+                                        </p:tav>
+                                      </p:tavLst>
+                                    </p:anim>
+                                    <p:anim calcmode="lin" valueType="num">
+                                      <p:cBhvr>
+                                        <p:cTn id="9" dur="1000" fill="hold"/>
+                                        <p:tgtEl>
+                                          <p:spTgt spid="2"/>
+                                        </p:tgtEl>
+                                        <p:attrNameLst>
+                                          <p:attrName>ppt_y</p:attrName>
+                                        </p:attrNameLst>
+                                      </p:cBhvr>
+                                      <p:tavLst>
+                                        <p:tav tm="0">
+                                          <p:val>
+                                            <p:strVal val="#ppt_y+.1"/>
+                                          </p:val>
+                                        </p:tav>
+                                        <p:tav tm="100000">
+                                          <p:val>
+                                            <p:strVal val="#ppt_y"/>
+                                          </p:val>
+                                        </p:tav>
+                                      </p:tavLst>
+                                    </p:anim>
+                                  </p:childTnLst>
+                                </p:cTn>
+                              </p:par>
+                            </p:childTnLst>
+                          </p:cTn>
+                        </p:par>
+                      </p:childTnLst>
+                    </p:cTn>
+                  </p:par>
+                  <p:par>
+                    <p:cTn id="10" fill="hold">
+                      <p:stCondLst>
+                        <p:cond delay="indefinite"/>
+                      </p:stCondLst>
+                      <p:childTnLst>
+                        <p:par>
+                          <p:cTn id="11" fill="hold">
+                            <p:stCondLst>
+                              <p:cond delay="0"/>
+                            </p:stCondLst>
+                            <p:childTnLst>
+                              <p:par>
+                                <p:cTn id="12" presetID="42" presetClass="entr" presetSubtype="0" fill="hold" nodeType="clickEffect">
+                                  <p:stCondLst>
+                                    <p:cond delay="0"/>
+                                  </p:stCondLst>
+                                  <p:childTnLst>
+                                    <p:set>
+                                      <p:cBhvr>
+                                        <p:cTn id="13" dur="1" fill="hold">
+                                          <p:stCondLst>
+                                            <p:cond delay="0"/>
+                                          </p:stCondLst>
+                                        </p:cTn>
+                                        <p:tgtEl>
+                                          <p:spTgt spid="5"/>
+                                        </p:tgtEl>
+                                        <p:attrNameLst>
+                                          <p:attrName>style.visibility</p:attrName>
+                                        </p:attrNameLst>
+                                      </p:cBhvr>
+                                      <p:to>
+                                        <p:strVal val="visible"/>
+                                      </p:to>
+                                    </p:set>
+                                    <p:animEffect transition="in" filter="fade">
+                                      <p:cBhvr>
+                                        <p:cTn id="14" dur="1000"/>
+                                        <p:tgtEl>
+                                          <p:spTgt spid="5"/>
+                                        </p:tgtEl>
+                                      </p:cBhvr>
+                                    </p:animEffect>
+                                    <p:anim calcmode="lin" valueType="num">
+                                      <p:cBhvr>
+                                        <p:cTn id="15" dur="1000" fill="hold"/>
+                                        <p:tgtEl>
+                                          <p:spTgt spid="5"/>
+                                        </p:tgtEl>
+                                        <p:attrNameLst>
+                                          <p:attrName>ppt_x</p:attrName>
+                                        </p:attrNameLst>
+                                      </p:cBhvr>
+                                      <p:tavLst>
+                                        <p:tav tm="0">
+                                          <p:val>
+                                            <p:strVal val="#ppt_x"/>
+                                          </p:val>
+                                        </p:tav>
+                                        <p:tav tm="100000">
+                                          <p:val>
+                                            <p:strVal val="#ppt_x"/>
+                                          </p:val>
+                                        </p:tav>
+                                      </p:tavLst>
+                                    </p:anim>
+                                    <p:anim calcmode="lin" valueType="num">
+                                      <p:cBhvr>
+                                        <p:cTn id="16" dur="1000" fill="hold"/>
+                                        <p:tgtEl>
+                                          <p:spTgt spid="5"/>
+                                        </p:tgtEl>
+                                        <p:attrNameLst>
+                                          <p:attrName>ppt_y</p:attrName>
+                                        </p:attrNameLst>
+                                      </p:cBhvr>
+                                      <p:tavLst>
+                                        <p:tav tm="0">
+                                          <p:val>
+                                            <p:strVal val="#ppt_y+.1"/>
+                                          </p:val>
+                                        </p:tav>
+                                        <p:tav tm="100000">
+                                          <p:val>
+                                            <p:strVal val="#ppt_y"/>
+                                          </p:val>
+                                        </p:tav>
+                                      </p:tavLst>
+                                    </p:anim>
+                                  </p:childTnLst>
+                                </p:cTn>
+                              </p:par>
+                            </p:childTnLst>
+                          </p:cTn>
+                        </p:par>
+                      </p:childTnLst>
+                    </p:cTn>
+                  </p:par>
+                  <p:par>
+                    <p:cTn id="17" fill="hold">
+                      <p:stCondLst>
+                        <p:cond delay="indefinite"/>
+                      </p:stCondLst>
+                      <p:childTnLst>
+                        <p:par>
+                          <p:cTn id="18" fill="hold">
+                            <p:stCondLst>
+                              <p:cond delay="0"/>
+                            </p:stCondLst>
+                            <p:childTnLst>
+                              <p:par>
+                                <p:cTn id="19" presetID="42" presetClass="entr" presetSubtype="0" fill="hold" nodeType="clickEffect">
+                                  <p:stCondLst>
+                                    <p:cond delay="0"/>
+                                  </p:stCondLst>
+                                  <p:childTnLst>
+                                    <p:set>
+                                      <p:cBhvr>
+                                        <p:cTn id="20" dur="1" fill="hold">
+                                          <p:stCondLst>
+                                            <p:cond delay="0"/>
+                                          </p:stCondLst>
+                                        </p:cTn>
+                                        <p:tgtEl>
+                                          <p:spTgt spid="9"/>
+                                        </p:tgtEl>
+                                        <p:attrNameLst>
+                                          <p:attrName>style.visibility</p:attrName>
+                                        </p:attrNameLst>
+                                      </p:cBhvr>
+                                      <p:to>
+                                        <p:strVal val="visible"/>
+                                      </p:to>
+                                    </p:set>
+                                    <p:animEffect transition="in" filter="fade">
+                                      <p:cBhvr>
+                                        <p:cTn id="21" dur="1000"/>
+                                        <p:tgtEl>
+                                          <p:spTgt spid="9"/>
+                                        </p:tgtEl>
+                                      </p:cBhvr>
+                                    </p:animEffect>
+                                    <p:anim calcmode="lin" valueType="num">
+                                      <p:cBhvr>
+                                        <p:cTn id="22" dur="1000" fill="hold"/>
+                                        <p:tgtEl>
+                                          <p:spTgt spid="9"/>
+                                        </p:tgtEl>
+                                        <p:attrNameLst>
+                                          <p:attrName>ppt_x</p:attrName>
+                                        </p:attrNameLst>
+                                      </p:cBhvr>
+                                      <p:tavLst>
+                                        <p:tav tm="0">
+                                          <p:val>
+                                            <p:strVal val="#ppt_x"/>
+                                          </p:val>
+                                        </p:tav>
+                                        <p:tav tm="100000">
+                                          <p:val>
+                                            <p:strVal val="#ppt_x"/>
+                                          </p:val>
+                                        </p:tav>
+                                      </p:tavLst>
+                                    </p:anim>
+                                    <p:anim calcmode="lin" valueType="num">
+                                      <p:cBhvr>
+                                        <p:cTn id="23" dur="1000" fill="hold"/>
+                                        <p:tgtEl>
+                                          <p:spTgt spid="9"/>
+                                        </p:tgtEl>
+                                        <p:attrNameLst>
+                                          <p:attrName>ppt_y</p:attrName>
+                                        </p:attrNameLst>
+                                      </p:cBhvr>
+                                      <p:tavLst>
+                                        <p:tav tm="0">
+                                          <p:val>
+                                            <p:strVal val="#ppt_y+.1"/>
+                                          </p:val>
+                                        </p:tav>
+                                        <p:tav tm="100000">
+                                          <p:val>
+                                            <p:strVal val="#ppt_y"/>
+                                          </p:val>
+                                        </p:tav>
+                                      </p:tavLst>
+                                    </p:anim>
+                                  </p:childTnLst>
+                                </p:cTn>
+                              </p:par>
+                            </p:childTnLst>
+                          </p:cTn>
+                        </p:par>
+                      </p:childTnLst>
+                    </p:cTn>
+                  </p:par>
+                  <p:par>
+                    <p:cTn id="24" fill="hold">
+                      <p:stCondLst>
+                        <p:cond delay="indefinite"/>
+                      </p:stCondLst>
+                      <p:childTnLst>
+                        <p:par>
+                          <p:cTn id="25" fill="hold">
+                            <p:stCondLst>
+                              <p:cond delay="0"/>
+                            </p:stCondLst>
+                            <p:childTnLst>
+                              <p:par>
+                                <p:cTn id="26" presetID="42" presetClass="entr" presetSubtype="0" fill="hold" nodeType="clickEffect">
+                                  <p:stCondLst>
+                                    <p:cond delay="0"/>
+                                  </p:stCondLst>
+                                  <p:childTnLst>
+                                    <p:set>
+                                      <p:cBhvr>
+                                        <p:cTn id="27" dur="1" fill="hold">
+                                          <p:stCondLst>
+                                            <p:cond delay="0"/>
+                                          </p:stCondLst>
+                                        </p:cTn>
+                                        <p:tgtEl>
+                                          <p:spTgt spid="7"/>
+                                        </p:tgtEl>
+                                        <p:attrNameLst>
+                                          <p:attrName>style.visibility</p:attrName>
+                                        </p:attrNameLst>
+                                      </p:cBhvr>
+                                      <p:to>
+                                        <p:strVal val="visible"/>
+                                      </p:to>
+                                    </p:set>
+                                    <p:animEffect transition="in" filter="fade">
+                                      <p:cBhvr>
+                                        <p:cTn id="28" dur="1000"/>
+                                        <p:tgtEl>
+                                          <p:spTgt spid="7"/>
+                                        </p:tgtEl>
+                                      </p:cBhvr>
+                                    </p:animEffect>
+                                    <p:anim calcmode="lin" valueType="num">
+                                      <p:cBhvr>
+                                        <p:cTn id="29" dur="1000" fill="hold"/>
+                                        <p:tgtEl>
+                                          <p:spTgt spid="7"/>
+                                        </p:tgtEl>
+                                        <p:attrNameLst>
+                                          <p:attrName>ppt_x</p:attrName>
+                                        </p:attrNameLst>
+                                      </p:cBhvr>
+                                      <p:tavLst>
+                                        <p:tav tm="0">
+                                          <p:val>
+                                            <p:strVal val="#ppt_x"/>
+                                          </p:val>
+                                        </p:tav>
+                                        <p:tav tm="100000">
+                                          <p:val>
+                                            <p:strVal val="#ppt_x"/>
+                                          </p:val>
+                                        </p:tav>
+                                      </p:tavLst>
+                                    </p:anim>
+                                    <p:anim calcmode="lin" valueType="num">
+                                      <p:cBhvr>
+                                        <p:cTn id="30" dur="1000" fill="hold"/>
+                                        <p:tgtEl>
+                                          <p:spTgt spid="7"/>
+                                        </p:tgtEl>
+                                        <p:attrNameLst>
+                                          <p:attrName>ppt_y</p:attrName>
+                                        </p:attrNameLst>
+                                      </p:cBhvr>
+                                      <p:tavLst>
+                                        <p:tav tm="0">
+                                          <p:val>
+                                            <p:strVal val="#ppt_y+.1"/>
+                                          </p:val>
+                                        </p:tav>
+                                        <p:tav tm="100000">
+                                          <p:val>
+                                            <p:strVal val="#ppt_y"/>
+                                          </p:val>
+                                        </p:tav>
+                                      </p:tavLst>
+                                    </p:anim>
+                                  </p:childTnLst>
+                                </p:cTn>
+                              </p:par>
+                            </p:childTnLst>
+                          </p:cTn>
+                        </p:par>
+                      </p:childTnLst>
+                    </p:cTn>
+                  </p:par>
+                  <p:par>
+                    <p:cTn id="31" fill="hold">
+                      <p:stCondLst>
+                        <p:cond delay="indefinite"/>
+                      </p:stCondLst>
+                      <p:childTnLst>
+                        <p:par>
+                          <p:cTn id="32" fill="hold">
+                            <p:stCondLst>
+                              <p:cond delay="0"/>
+                            </p:stCondLst>
+                            <p:childTnLst>
+                              <p:par>
+                                <p:cTn id="33" presetID="42" presetClass="entr" presetSubtype="0" fill="hold" nodeType="clickEffect">
+                                  <p:stCondLst>
+                                    <p:cond delay="0"/>
+                                  </p:stCondLst>
+                                  <p:childTnLst>
+                                    <p:set>
+                                      <p:cBhvr>
+                                        <p:cTn id="34" dur="1" fill="hold">
+                                          <p:stCondLst>
+                                            <p:cond delay="0"/>
+                                          </p:stCondLst>
+                                        </p:cTn>
+                                        <p:tgtEl>
+                                          <p:spTgt spid="11"/>
+                                        </p:tgtEl>
+                                        <p:attrNameLst>
+                                          <p:attrName>style.visibility</p:attrName>
+                                        </p:attrNameLst>
+                                      </p:cBhvr>
+                                      <p:to>
+                                        <p:strVal val="visible"/>
+                                      </p:to>
+                                    </p:set>
+                                    <p:animEffect transition="in" filter="fade">
+                                      <p:cBhvr>
+                                        <p:cTn id="35" dur="1000"/>
+                                        <p:tgtEl>
+                                          <p:spTgt spid="11"/>
+                                        </p:tgtEl>
+                                      </p:cBhvr>
+                                    </p:animEffect>
+                                    <p:anim calcmode="lin" valueType="num">
+                                      <p:cBhvr>
+                                        <p:cTn id="36" dur="1000" fill="hold"/>
+                                        <p:tgtEl>
+                                          <p:spTgt spid="11"/>
+                                        </p:tgtEl>
+                                        <p:attrNameLst>
+                                          <p:attrName>ppt_x</p:attrName>
+                                        </p:attrNameLst>
+                                      </p:cBhvr>
+                                      <p:tavLst>
+                                        <p:tav tm="0">
+                                          <p:val>
+                                            <p:strVal val="#ppt_x"/>
+                                          </p:val>
+                                        </p:tav>
+                                        <p:tav tm="100000">
+                                          <p:val>
+                                            <p:strVal val="#ppt_x"/>
+                                          </p:val>
+                                        </p:tav>
+                                      </p:tavLst>
+                                    </p:anim>
+                                    <p:anim calcmode="lin" valueType="num">
+                                      <p:cBhvr>
+                                        <p:cTn id="37" dur="1000" fill="hold"/>
+                                        <p:tgtEl>
+                                          <p:spTgt spid="11"/>
+                                        </p:tgtEl>
+                                        <p:attrNameLst>
+                                          <p:attrName>ppt_y</p:attrName>
+                                        </p:attrNameLst>
+                                      </p:cBhvr>
+                                      <p:tavLst>
+                                        <p:tav tm="0">
+                                          <p:val>
+                                            <p:strVal val="#ppt_y+.1"/>
+                                          </p:val>
+                                        </p:tav>
+                                        <p:tav tm="100000">
+                                          <p:val>
+                                            <p:strVal val="#ppt_y"/>
+                                          </p:val>
+                                        </p:tav>
+                                      </p:tavLst>
+                                    </p:anim>
+                                  </p:childTnLst>
+                                </p:cTn>
+                              </p:par>
+                            </p:childTnLst>
+                          </p:cTn>
+                        </p:par>
+                      </p:childTnLst>
+                    </p:cTn>
+                  </p:par>
+                </p:childTnLst>
+              </p:cTn>
+              <p:prevCondLst>
+                <p:cond evt="onPrev" delay="0">
+                  <p:tgtEl>
+                    <p:sldTgt/>
+                  </p:tgtEl>
+                </p:cond>
+              </p:prevCondLst>
+              <p:nextCondLst>
+                <p:cond evt="onNext" delay="0">
+                  <p:tgtEl>
+                    <p:sldTgt/>
+                  </p:tgtEl>
+                </p:cond>
+              </p:nextCondLst>
+            </p:seq>
+          </p:childTnLst>
+        </p:cTn>
+      </p:par>
+    </p:tnLst>
+    <p:bldLst>
+      <p:bldP spid="2" grpId="0"/>
+    </p:bldLst>
+  </p:timing>
 </p:sld>
 </file>
 
@@ -6695,6 +7847,713 @@
   <p:clrMapOvr>
     <a:masterClrMapping/>
   </p:clrMapOvr>
+  <p:timing>
+    <p:tnLst>
+      <p:par>
+        <p:cTn id="1" dur="indefinite" restart="never" nodeType="tmRoot">
+          <p:childTnLst>
+            <p:seq concurrent="1" nextAc="seek">
+              <p:cTn id="2" dur="indefinite" nodeType="mainSeq">
+                <p:childTnLst>
+                  <p:par>
+                    <p:cTn id="3" fill="hold">
+                      <p:stCondLst>
+                        <p:cond delay="indefinite"/>
+                      </p:stCondLst>
+                      <p:childTnLst>
+                        <p:par>
+                          <p:cTn id="4" fill="hold">
+                            <p:stCondLst>
+                              <p:cond delay="0"/>
+                            </p:stCondLst>
+                            <p:childTnLst>
+                              <p:par>
+                                <p:cTn id="5" presetID="42" presetClass="entr" presetSubtype="0" fill="hold" grpId="0" nodeType="clickEffect">
+                                  <p:stCondLst>
+                                    <p:cond delay="0"/>
+                                  </p:stCondLst>
+                                  <p:childTnLst>
+                                    <p:set>
+                                      <p:cBhvr>
+                                        <p:cTn id="6" dur="1" fill="hold">
+                                          <p:stCondLst>
+                                            <p:cond delay="0"/>
+                                          </p:stCondLst>
+                                        </p:cTn>
+                                        <p:tgtEl>
+                                          <p:spTgt spid="2"/>
+                                        </p:tgtEl>
+                                        <p:attrNameLst>
+                                          <p:attrName>style.visibility</p:attrName>
+                                        </p:attrNameLst>
+                                      </p:cBhvr>
+                                      <p:to>
+                                        <p:strVal val="visible"/>
+                                      </p:to>
+                                    </p:set>
+                                    <p:animEffect transition="in" filter="fade">
+                                      <p:cBhvr>
+                                        <p:cTn id="7" dur="1000"/>
+                                        <p:tgtEl>
+                                          <p:spTgt spid="2"/>
+                                        </p:tgtEl>
+                                      </p:cBhvr>
+                                    </p:animEffect>
+                                    <p:anim calcmode="lin" valueType="num">
+                                      <p:cBhvr>
+                                        <p:cTn id="8" dur="1000" fill="hold"/>
+                                        <p:tgtEl>
+                                          <p:spTgt spid="2"/>
+                                        </p:tgtEl>
+                                        <p:attrNameLst>
+                                          <p:attrName>ppt_x</p:attrName>
+                                        </p:attrNameLst>
+                                      </p:cBhvr>
+                                      <p:tavLst>
+                                        <p:tav tm="0">
+                                          <p:val>
+                                            <p:strVal val="#ppt_x"/>
+                                          </p:val>
+                                        </p:tav>
+                                        <p:tav tm="100000">
+                                          <p:val>
+                                            <p:strVal val="#ppt_x"/>
+                                          </p:val>
+                                        </p:tav>
+                                      </p:tavLst>
+                                    </p:anim>
+                                    <p:anim calcmode="lin" valueType="num">
+                                      <p:cBhvr>
+                                        <p:cTn id="9" dur="1000" fill="hold"/>
+                                        <p:tgtEl>
+                                          <p:spTgt spid="2"/>
+                                        </p:tgtEl>
+                                        <p:attrNameLst>
+                                          <p:attrName>ppt_y</p:attrName>
+                                        </p:attrNameLst>
+                                      </p:cBhvr>
+                                      <p:tavLst>
+                                        <p:tav tm="0">
+                                          <p:val>
+                                            <p:strVal val="#ppt_y+.1"/>
+                                          </p:val>
+                                        </p:tav>
+                                        <p:tav tm="100000">
+                                          <p:val>
+                                            <p:strVal val="#ppt_y"/>
+                                          </p:val>
+                                        </p:tav>
+                                      </p:tavLst>
+                                    </p:anim>
+                                  </p:childTnLst>
+                                </p:cTn>
+                              </p:par>
+                            </p:childTnLst>
+                          </p:cTn>
+                        </p:par>
+                      </p:childTnLst>
+                    </p:cTn>
+                  </p:par>
+                  <p:par>
+                    <p:cTn id="10" fill="hold">
+                      <p:stCondLst>
+                        <p:cond delay="indefinite"/>
+                      </p:stCondLst>
+                      <p:childTnLst>
+                        <p:par>
+                          <p:cTn id="11" fill="hold">
+                            <p:stCondLst>
+                              <p:cond delay="0"/>
+                            </p:stCondLst>
+                            <p:childTnLst>
+                              <p:par>
+                                <p:cTn id="12" presetID="42" presetClass="entr" presetSubtype="0" fill="hold" nodeType="clickEffect">
+                                  <p:stCondLst>
+                                    <p:cond delay="0"/>
+                                  </p:stCondLst>
+                                  <p:childTnLst>
+                                    <p:set>
+                                      <p:cBhvr>
+                                        <p:cTn id="13" dur="1" fill="hold">
+                                          <p:stCondLst>
+                                            <p:cond delay="0"/>
+                                          </p:stCondLst>
+                                        </p:cTn>
+                                        <p:tgtEl>
+                                          <p:spTgt spid="3">
+                                            <p:txEl>
+                                              <p:pRg st="0" end="0"/>
+                                            </p:txEl>
+                                          </p:spTgt>
+                                        </p:tgtEl>
+                                        <p:attrNameLst>
+                                          <p:attrName>style.visibility</p:attrName>
+                                        </p:attrNameLst>
+                                      </p:cBhvr>
+                                      <p:to>
+                                        <p:strVal val="visible"/>
+                                      </p:to>
+                                    </p:set>
+                                    <p:animEffect transition="in" filter="fade">
+                                      <p:cBhvr>
+                                        <p:cTn id="14" dur="1000"/>
+                                        <p:tgtEl>
+                                          <p:spTgt spid="3">
+                                            <p:txEl>
+                                              <p:pRg st="0" end="0"/>
+                                            </p:txEl>
+                                          </p:spTgt>
+                                        </p:tgtEl>
+                                      </p:cBhvr>
+                                    </p:animEffect>
+                                    <p:anim calcmode="lin" valueType="num">
+                                      <p:cBhvr>
+                                        <p:cTn id="15" dur="1000" fill="hold"/>
+                                        <p:tgtEl>
+                                          <p:spTgt spid="3">
+                                            <p:txEl>
+                                              <p:pRg st="0" end="0"/>
+                                            </p:txEl>
+                                          </p:spTgt>
+                                        </p:tgtEl>
+                                        <p:attrNameLst>
+                                          <p:attrName>ppt_x</p:attrName>
+                                        </p:attrNameLst>
+                                      </p:cBhvr>
+                                      <p:tavLst>
+                                        <p:tav tm="0">
+                                          <p:val>
+                                            <p:strVal val="#ppt_x"/>
+                                          </p:val>
+                                        </p:tav>
+                                        <p:tav tm="100000">
+                                          <p:val>
+                                            <p:strVal val="#ppt_x"/>
+                                          </p:val>
+                                        </p:tav>
+                                      </p:tavLst>
+                                    </p:anim>
+                                    <p:anim calcmode="lin" valueType="num">
+                                      <p:cBhvr>
+                                        <p:cTn id="16" dur="1000" fill="hold"/>
+                                        <p:tgtEl>
+                                          <p:spTgt spid="3">
+                                            <p:txEl>
+                                              <p:pRg st="0" end="0"/>
+                                            </p:txEl>
+                                          </p:spTgt>
+                                        </p:tgtEl>
+                                        <p:attrNameLst>
+                                          <p:attrName>ppt_y</p:attrName>
+                                        </p:attrNameLst>
+                                      </p:cBhvr>
+                                      <p:tavLst>
+                                        <p:tav tm="0">
+                                          <p:val>
+                                            <p:strVal val="#ppt_y+.1"/>
+                                          </p:val>
+                                        </p:tav>
+                                        <p:tav tm="100000">
+                                          <p:val>
+                                            <p:strVal val="#ppt_y"/>
+                                          </p:val>
+                                        </p:tav>
+                                      </p:tavLst>
+                                    </p:anim>
+                                  </p:childTnLst>
+                                </p:cTn>
+                              </p:par>
+                            </p:childTnLst>
+                          </p:cTn>
+                        </p:par>
+                      </p:childTnLst>
+                    </p:cTn>
+                  </p:par>
+                  <p:par>
+                    <p:cTn id="17" fill="hold">
+                      <p:stCondLst>
+                        <p:cond delay="indefinite"/>
+                      </p:stCondLst>
+                      <p:childTnLst>
+                        <p:par>
+                          <p:cTn id="18" fill="hold">
+                            <p:stCondLst>
+                              <p:cond delay="0"/>
+                            </p:stCondLst>
+                            <p:childTnLst>
+                              <p:par>
+                                <p:cTn id="19" presetID="42" presetClass="entr" presetSubtype="0" fill="hold" nodeType="clickEffect">
+                                  <p:stCondLst>
+                                    <p:cond delay="0"/>
+                                  </p:stCondLst>
+                                  <p:childTnLst>
+                                    <p:set>
+                                      <p:cBhvr>
+                                        <p:cTn id="20" dur="1" fill="hold">
+                                          <p:stCondLst>
+                                            <p:cond delay="0"/>
+                                          </p:stCondLst>
+                                        </p:cTn>
+                                        <p:tgtEl>
+                                          <p:spTgt spid="3">
+                                            <p:txEl>
+                                              <p:pRg st="1" end="1"/>
+                                            </p:txEl>
+                                          </p:spTgt>
+                                        </p:tgtEl>
+                                        <p:attrNameLst>
+                                          <p:attrName>style.visibility</p:attrName>
+                                        </p:attrNameLst>
+                                      </p:cBhvr>
+                                      <p:to>
+                                        <p:strVal val="visible"/>
+                                      </p:to>
+                                    </p:set>
+                                    <p:animEffect transition="in" filter="fade">
+                                      <p:cBhvr>
+                                        <p:cTn id="21" dur="1000"/>
+                                        <p:tgtEl>
+                                          <p:spTgt spid="3">
+                                            <p:txEl>
+                                              <p:pRg st="1" end="1"/>
+                                            </p:txEl>
+                                          </p:spTgt>
+                                        </p:tgtEl>
+                                      </p:cBhvr>
+                                    </p:animEffect>
+                                    <p:anim calcmode="lin" valueType="num">
+                                      <p:cBhvr>
+                                        <p:cTn id="22" dur="1000" fill="hold"/>
+                                        <p:tgtEl>
+                                          <p:spTgt spid="3">
+                                            <p:txEl>
+                                              <p:pRg st="1" end="1"/>
+                                            </p:txEl>
+                                          </p:spTgt>
+                                        </p:tgtEl>
+                                        <p:attrNameLst>
+                                          <p:attrName>ppt_x</p:attrName>
+                                        </p:attrNameLst>
+                                      </p:cBhvr>
+                                      <p:tavLst>
+                                        <p:tav tm="0">
+                                          <p:val>
+                                            <p:strVal val="#ppt_x"/>
+                                          </p:val>
+                                        </p:tav>
+                                        <p:tav tm="100000">
+                                          <p:val>
+                                            <p:strVal val="#ppt_x"/>
+                                          </p:val>
+                                        </p:tav>
+                                      </p:tavLst>
+                                    </p:anim>
+                                    <p:anim calcmode="lin" valueType="num">
+                                      <p:cBhvr>
+                                        <p:cTn id="23" dur="1000" fill="hold"/>
+                                        <p:tgtEl>
+                                          <p:spTgt spid="3">
+                                            <p:txEl>
+                                              <p:pRg st="1" end="1"/>
+                                            </p:txEl>
+                                          </p:spTgt>
+                                        </p:tgtEl>
+                                        <p:attrNameLst>
+                                          <p:attrName>ppt_y</p:attrName>
+                                        </p:attrNameLst>
+                                      </p:cBhvr>
+                                      <p:tavLst>
+                                        <p:tav tm="0">
+                                          <p:val>
+                                            <p:strVal val="#ppt_y+.1"/>
+                                          </p:val>
+                                        </p:tav>
+                                        <p:tav tm="100000">
+                                          <p:val>
+                                            <p:strVal val="#ppt_y"/>
+                                          </p:val>
+                                        </p:tav>
+                                      </p:tavLst>
+                                    </p:anim>
+                                  </p:childTnLst>
+                                </p:cTn>
+                              </p:par>
+                            </p:childTnLst>
+                          </p:cTn>
+                        </p:par>
+                      </p:childTnLst>
+                    </p:cTn>
+                  </p:par>
+                  <p:par>
+                    <p:cTn id="24" fill="hold">
+                      <p:stCondLst>
+                        <p:cond delay="indefinite"/>
+                      </p:stCondLst>
+                      <p:childTnLst>
+                        <p:par>
+                          <p:cTn id="25" fill="hold">
+                            <p:stCondLst>
+                              <p:cond delay="0"/>
+                            </p:stCondLst>
+                            <p:childTnLst>
+                              <p:par>
+                                <p:cTn id="26" presetID="42" presetClass="entr" presetSubtype="0" fill="hold" nodeType="clickEffect">
+                                  <p:stCondLst>
+                                    <p:cond delay="0"/>
+                                  </p:stCondLst>
+                                  <p:childTnLst>
+                                    <p:set>
+                                      <p:cBhvr>
+                                        <p:cTn id="27" dur="1" fill="hold">
+                                          <p:stCondLst>
+                                            <p:cond delay="0"/>
+                                          </p:stCondLst>
+                                        </p:cTn>
+                                        <p:tgtEl>
+                                          <p:spTgt spid="3">
+                                            <p:txEl>
+                                              <p:pRg st="2" end="2"/>
+                                            </p:txEl>
+                                          </p:spTgt>
+                                        </p:tgtEl>
+                                        <p:attrNameLst>
+                                          <p:attrName>style.visibility</p:attrName>
+                                        </p:attrNameLst>
+                                      </p:cBhvr>
+                                      <p:to>
+                                        <p:strVal val="visible"/>
+                                      </p:to>
+                                    </p:set>
+                                    <p:animEffect transition="in" filter="fade">
+                                      <p:cBhvr>
+                                        <p:cTn id="28" dur="1000"/>
+                                        <p:tgtEl>
+                                          <p:spTgt spid="3">
+                                            <p:txEl>
+                                              <p:pRg st="2" end="2"/>
+                                            </p:txEl>
+                                          </p:spTgt>
+                                        </p:tgtEl>
+                                      </p:cBhvr>
+                                    </p:animEffect>
+                                    <p:anim calcmode="lin" valueType="num">
+                                      <p:cBhvr>
+                                        <p:cTn id="29" dur="1000" fill="hold"/>
+                                        <p:tgtEl>
+                                          <p:spTgt spid="3">
+                                            <p:txEl>
+                                              <p:pRg st="2" end="2"/>
+                                            </p:txEl>
+                                          </p:spTgt>
+                                        </p:tgtEl>
+                                        <p:attrNameLst>
+                                          <p:attrName>ppt_x</p:attrName>
+                                        </p:attrNameLst>
+                                      </p:cBhvr>
+                                      <p:tavLst>
+                                        <p:tav tm="0">
+                                          <p:val>
+                                            <p:strVal val="#ppt_x"/>
+                                          </p:val>
+                                        </p:tav>
+                                        <p:tav tm="100000">
+                                          <p:val>
+                                            <p:strVal val="#ppt_x"/>
+                                          </p:val>
+                                        </p:tav>
+                                      </p:tavLst>
+                                    </p:anim>
+                                    <p:anim calcmode="lin" valueType="num">
+                                      <p:cBhvr>
+                                        <p:cTn id="30" dur="1000" fill="hold"/>
+                                        <p:tgtEl>
+                                          <p:spTgt spid="3">
+                                            <p:txEl>
+                                              <p:pRg st="2" end="2"/>
+                                            </p:txEl>
+                                          </p:spTgt>
+                                        </p:tgtEl>
+                                        <p:attrNameLst>
+                                          <p:attrName>ppt_y</p:attrName>
+                                        </p:attrNameLst>
+                                      </p:cBhvr>
+                                      <p:tavLst>
+                                        <p:tav tm="0">
+                                          <p:val>
+                                            <p:strVal val="#ppt_y+.1"/>
+                                          </p:val>
+                                        </p:tav>
+                                        <p:tav tm="100000">
+                                          <p:val>
+                                            <p:strVal val="#ppt_y"/>
+                                          </p:val>
+                                        </p:tav>
+                                      </p:tavLst>
+                                    </p:anim>
+                                  </p:childTnLst>
+                                </p:cTn>
+                              </p:par>
+                            </p:childTnLst>
+                          </p:cTn>
+                        </p:par>
+                      </p:childTnLst>
+                    </p:cTn>
+                  </p:par>
+                  <p:par>
+                    <p:cTn id="31" fill="hold">
+                      <p:stCondLst>
+                        <p:cond delay="indefinite"/>
+                      </p:stCondLst>
+                      <p:childTnLst>
+                        <p:par>
+                          <p:cTn id="32" fill="hold">
+                            <p:stCondLst>
+                              <p:cond delay="0"/>
+                            </p:stCondLst>
+                            <p:childTnLst>
+                              <p:par>
+                                <p:cTn id="33" presetID="42" presetClass="entr" presetSubtype="0" fill="hold" nodeType="clickEffect">
+                                  <p:stCondLst>
+                                    <p:cond delay="0"/>
+                                  </p:stCondLst>
+                                  <p:childTnLst>
+                                    <p:set>
+                                      <p:cBhvr>
+                                        <p:cTn id="34" dur="1" fill="hold">
+                                          <p:stCondLst>
+                                            <p:cond delay="0"/>
+                                          </p:stCondLst>
+                                        </p:cTn>
+                                        <p:tgtEl>
+                                          <p:spTgt spid="3">
+                                            <p:txEl>
+                                              <p:pRg st="3" end="3"/>
+                                            </p:txEl>
+                                          </p:spTgt>
+                                        </p:tgtEl>
+                                        <p:attrNameLst>
+                                          <p:attrName>style.visibility</p:attrName>
+                                        </p:attrNameLst>
+                                      </p:cBhvr>
+                                      <p:to>
+                                        <p:strVal val="visible"/>
+                                      </p:to>
+                                    </p:set>
+                                    <p:animEffect transition="in" filter="fade">
+                                      <p:cBhvr>
+                                        <p:cTn id="35" dur="1000"/>
+                                        <p:tgtEl>
+                                          <p:spTgt spid="3">
+                                            <p:txEl>
+                                              <p:pRg st="3" end="3"/>
+                                            </p:txEl>
+                                          </p:spTgt>
+                                        </p:tgtEl>
+                                      </p:cBhvr>
+                                    </p:animEffect>
+                                    <p:anim calcmode="lin" valueType="num">
+                                      <p:cBhvr>
+                                        <p:cTn id="36" dur="1000" fill="hold"/>
+                                        <p:tgtEl>
+                                          <p:spTgt spid="3">
+                                            <p:txEl>
+                                              <p:pRg st="3" end="3"/>
+                                            </p:txEl>
+                                          </p:spTgt>
+                                        </p:tgtEl>
+                                        <p:attrNameLst>
+                                          <p:attrName>ppt_x</p:attrName>
+                                        </p:attrNameLst>
+                                      </p:cBhvr>
+                                      <p:tavLst>
+                                        <p:tav tm="0">
+                                          <p:val>
+                                            <p:strVal val="#ppt_x"/>
+                                          </p:val>
+                                        </p:tav>
+                                        <p:tav tm="100000">
+                                          <p:val>
+                                            <p:strVal val="#ppt_x"/>
+                                          </p:val>
+                                        </p:tav>
+                                      </p:tavLst>
+                                    </p:anim>
+                                    <p:anim calcmode="lin" valueType="num">
+                                      <p:cBhvr>
+                                        <p:cTn id="37" dur="1000" fill="hold"/>
+                                        <p:tgtEl>
+                                          <p:spTgt spid="3">
+                                            <p:txEl>
+                                              <p:pRg st="3" end="3"/>
+                                            </p:txEl>
+                                          </p:spTgt>
+                                        </p:tgtEl>
+                                        <p:attrNameLst>
+                                          <p:attrName>ppt_y</p:attrName>
+                                        </p:attrNameLst>
+                                      </p:cBhvr>
+                                      <p:tavLst>
+                                        <p:tav tm="0">
+                                          <p:val>
+                                            <p:strVal val="#ppt_y+.1"/>
+                                          </p:val>
+                                        </p:tav>
+                                        <p:tav tm="100000">
+                                          <p:val>
+                                            <p:strVal val="#ppt_y"/>
+                                          </p:val>
+                                        </p:tav>
+                                      </p:tavLst>
+                                    </p:anim>
+                                  </p:childTnLst>
+                                </p:cTn>
+                              </p:par>
+                            </p:childTnLst>
+                          </p:cTn>
+                        </p:par>
+                      </p:childTnLst>
+                    </p:cTn>
+                  </p:par>
+                  <p:par>
+                    <p:cTn id="38" fill="hold">
+                      <p:stCondLst>
+                        <p:cond delay="indefinite"/>
+                      </p:stCondLst>
+                      <p:childTnLst>
+                        <p:par>
+                          <p:cTn id="39" fill="hold">
+                            <p:stCondLst>
+                              <p:cond delay="0"/>
+                            </p:stCondLst>
+                            <p:childTnLst>
+                              <p:par>
+                                <p:cTn id="40" presetID="42" presetClass="entr" presetSubtype="0" fill="hold" nodeType="clickEffect">
+                                  <p:stCondLst>
+                                    <p:cond delay="0"/>
+                                  </p:stCondLst>
+                                  <p:childTnLst>
+                                    <p:set>
+                                      <p:cBhvr>
+                                        <p:cTn id="41" dur="1" fill="hold">
+                                          <p:stCondLst>
+                                            <p:cond delay="0"/>
+                                          </p:stCondLst>
+                                        </p:cTn>
+                                        <p:tgtEl>
+                                          <p:spTgt spid="3">
+                                            <p:txEl>
+                                              <p:pRg st="4" end="4"/>
+                                            </p:txEl>
+                                          </p:spTgt>
+                                        </p:tgtEl>
+                                        <p:attrNameLst>
+                                          <p:attrName>style.visibility</p:attrName>
+                                        </p:attrNameLst>
+                                      </p:cBhvr>
+                                      <p:to>
+                                        <p:strVal val="visible"/>
+                                      </p:to>
+                                    </p:set>
+                                    <p:animEffect transition="in" filter="fade">
+                                      <p:cBhvr>
+                                        <p:cTn id="42" dur="1000"/>
+                                        <p:tgtEl>
+                                          <p:spTgt spid="3">
+                                            <p:txEl>
+                                              <p:pRg st="4" end="4"/>
+                                            </p:txEl>
+                                          </p:spTgt>
+                                        </p:tgtEl>
+                                      </p:cBhvr>
+                                    </p:animEffect>
+                                    <p:anim calcmode="lin" valueType="num">
+                                      <p:cBhvr>
+                                        <p:cTn id="43" dur="1000" fill="hold"/>
+                                        <p:tgtEl>
+                                          <p:spTgt spid="3">
+                                            <p:txEl>
+                                              <p:pRg st="4" end="4"/>
+                                            </p:txEl>
+                                          </p:spTgt>
+                                        </p:tgtEl>
+                                        <p:attrNameLst>
+                                          <p:attrName>ppt_x</p:attrName>
+                                        </p:attrNameLst>
+                                      </p:cBhvr>
+                                      <p:tavLst>
+                                        <p:tav tm="0">
+                                          <p:val>
+                                            <p:strVal val="#ppt_x"/>
+                                          </p:val>
+                                        </p:tav>
+                                        <p:tav tm="100000">
+                                          <p:val>
+                                            <p:strVal val="#ppt_x"/>
+                                          </p:val>
+                                        </p:tav>
+                                      </p:tavLst>
+                                    </p:anim>
+                                    <p:anim calcmode="lin" valueType="num">
+                                      <p:cBhvr>
+                                        <p:cTn id="44" dur="1000" fill="hold"/>
+                                        <p:tgtEl>
+                                          <p:spTgt spid="3">
+                                            <p:txEl>
+                                              <p:pRg st="4" end="4"/>
+                                            </p:txEl>
+                                          </p:spTgt>
+                                        </p:tgtEl>
+                                        <p:attrNameLst>
+                                          <p:attrName>ppt_y</p:attrName>
+                                        </p:attrNameLst>
+                                      </p:cBhvr>
+                                      <p:tavLst>
+                                        <p:tav tm="0">
+                                          <p:val>
+                                            <p:strVal val="#ppt_y+.1"/>
+                                          </p:val>
+                                        </p:tav>
+                                        <p:tav tm="100000">
+                                          <p:val>
+                                            <p:strVal val="#ppt_y"/>
+                                          </p:val>
+                                        </p:tav>
+                                      </p:tavLst>
+                                    </p:anim>
+                                  </p:childTnLst>
+                                </p:cTn>
+                              </p:par>
+                            </p:childTnLst>
+                          </p:cTn>
+                        </p:par>
+                      </p:childTnLst>
+                    </p:cTn>
+                  </p:par>
+                </p:childTnLst>
+              </p:cTn>
+              <p:prevCondLst>
+                <p:cond evt="onPrev" delay="0">
+                  <p:tgtEl>
+                    <p:sldTgt/>
+                  </p:tgtEl>
+                </p:cond>
+              </p:prevCondLst>
+              <p:nextCondLst>
+                <p:cond evt="onNext" delay="0">
+                  <p:tgtEl>
+                    <p:sldTgt/>
+                  </p:tgtEl>
+                </p:cond>
+              </p:nextCondLst>
+            </p:seq>
+          </p:childTnLst>
+        </p:cTn>
+      </p:par>
+    </p:tnLst>
+    <p:bldLst>
+      <p:bldP spid="2" grpId="0"/>
+    </p:bldLst>
+  </p:timing>
 </p:sld>
 </file>
 
@@ -6753,6 +8612,138 @@
   <p:clrMapOvr>
     <a:masterClrMapping/>
   </p:clrMapOvr>
+  <p:timing>
+    <p:tnLst>
+      <p:par>
+        <p:cTn id="1" dur="indefinite" restart="never" nodeType="tmRoot">
+          <p:childTnLst>
+            <p:seq concurrent="1" nextAc="seek">
+              <p:cTn id="2" dur="indefinite" nodeType="mainSeq">
+                <p:childTnLst>
+                  <p:par>
+                    <p:cTn id="3" fill="hold">
+                      <p:stCondLst>
+                        <p:cond delay="indefinite"/>
+                      </p:stCondLst>
+                      <p:childTnLst>
+                        <p:par>
+                          <p:cTn id="4" fill="hold">
+                            <p:stCondLst>
+                              <p:cond delay="0"/>
+                            </p:stCondLst>
+                            <p:childTnLst>
+                              <p:par>
+                                <p:cTn id="5" presetID="42" presetClass="entr" presetSubtype="0" fill="hold" grpId="0" nodeType="clickEffect">
+                                  <p:stCondLst>
+                                    <p:cond delay="0"/>
+                                  </p:stCondLst>
+                                  <p:childTnLst>
+                                    <p:set>
+                                      <p:cBhvr>
+                                        <p:cTn id="6" dur="1" fill="hold">
+                                          <p:stCondLst>
+                                            <p:cond delay="0"/>
+                                          </p:stCondLst>
+                                        </p:cTn>
+                                        <p:tgtEl>
+                                          <p:spTgt spid="2"/>
+                                        </p:tgtEl>
+                                        <p:attrNameLst>
+                                          <p:attrName>style.visibility</p:attrName>
+                                        </p:attrNameLst>
+                                      </p:cBhvr>
+                                      <p:to>
+                                        <p:strVal val="visible"/>
+                                      </p:to>
+                                    </p:set>
+                                    <p:animEffect transition="in" filter="fade">
+                                      <p:cBhvr>
+                                        <p:cTn id="7" dur="1000"/>
+                                        <p:tgtEl>
+                                          <p:spTgt spid="2"/>
+                                        </p:tgtEl>
+                                      </p:cBhvr>
+                                    </p:animEffect>
+                                    <p:anim calcmode="lin" valueType="num">
+                                      <p:cBhvr>
+                                        <p:cTn id="8" dur="1000" fill="hold"/>
+                                        <p:tgtEl>
+                                          <p:spTgt spid="2"/>
+                                        </p:tgtEl>
+                                        <p:attrNameLst>
+                                          <p:attrName>ppt_x</p:attrName>
+                                        </p:attrNameLst>
+                                      </p:cBhvr>
+                                      <p:tavLst>
+                                        <p:tav tm="0">
+                                          <p:val>
+                                            <p:strVal val="#ppt_x"/>
+                                          </p:val>
+                                        </p:tav>
+                                        <p:tav tm="100000">
+                                          <p:val>
+                                            <p:strVal val="#ppt_x"/>
+                                          </p:val>
+                                        </p:tav>
+                                      </p:tavLst>
+                                    </p:anim>
+                                    <p:anim calcmode="lin" valueType="num">
+                                      <p:cBhvr>
+                                        <p:cTn id="9" dur="1000" fill="hold"/>
+                                        <p:tgtEl>
+                                          <p:spTgt spid="2"/>
+                                        </p:tgtEl>
+                                        <p:attrNameLst>
+                                          <p:attrName>ppt_y</p:attrName>
+                                        </p:attrNameLst>
+                                      </p:cBhvr>
+                                      <p:tavLst>
+                                        <p:tav tm="0">
+                                          <p:val>
+                                            <p:strVal val="#ppt_y+.1"/>
+                                          </p:val>
+                                        </p:tav>
+                                        <p:tav tm="100000">
+                                          <p:val>
+                                            <p:strVal val="#ppt_y"/>
+                                          </p:val>
+                                        </p:tav>
+                                      </p:tavLst>
+                                    </p:anim>
+                                  </p:childTnLst>
+                                </p:cTn>
+                              </p:par>
+                            </p:childTnLst>
+                          </p:cTn>
+                        </p:par>
+                      </p:childTnLst>
+                    </p:cTn>
+                  </p:par>
+                </p:childTnLst>
+              </p:cTn>
+              <p:prevCondLst>
+                <p:cond evt="onPrev" delay="0">
+                  <p:tgtEl>
+                    <p:sldTgt/>
+                  </p:tgtEl>
+                </p:cond>
+              </p:prevCondLst>
+              <p:nextCondLst>
+                <p:cond evt="onNext" delay="0">
+                  <p:tgtEl>
+                    <p:sldTgt/>
+                  </p:tgtEl>
+                </p:cond>
+              </p:nextCondLst>
+            </p:seq>
+          </p:childTnLst>
+        </p:cTn>
+      </p:par>
+    </p:tnLst>
+    <p:bldLst>
+      <p:bldP spid="2" grpId="0"/>
+    </p:bldLst>
+  </p:timing>
 </p:sld>
 </file>
 
@@ -6866,6 +8857,138 @@
   <p:clrMapOvr>
     <a:masterClrMapping/>
   </p:clrMapOvr>
+  <p:timing>
+    <p:tnLst>
+      <p:par>
+        <p:cTn id="1" dur="indefinite" restart="never" nodeType="tmRoot">
+          <p:childTnLst>
+            <p:seq concurrent="1" nextAc="seek">
+              <p:cTn id="2" dur="indefinite" nodeType="mainSeq">
+                <p:childTnLst>
+                  <p:par>
+                    <p:cTn id="3" fill="hold">
+                      <p:stCondLst>
+                        <p:cond delay="indefinite"/>
+                      </p:stCondLst>
+                      <p:childTnLst>
+                        <p:par>
+                          <p:cTn id="4" fill="hold">
+                            <p:stCondLst>
+                              <p:cond delay="0"/>
+                            </p:stCondLst>
+                            <p:childTnLst>
+                              <p:par>
+                                <p:cTn id="5" presetID="42" presetClass="entr" presetSubtype="0" fill="hold" grpId="0" nodeType="clickEffect">
+                                  <p:stCondLst>
+                                    <p:cond delay="0"/>
+                                  </p:stCondLst>
+                                  <p:childTnLst>
+                                    <p:set>
+                                      <p:cBhvr>
+                                        <p:cTn id="6" dur="1" fill="hold">
+                                          <p:stCondLst>
+                                            <p:cond delay="0"/>
+                                          </p:stCondLst>
+                                        </p:cTn>
+                                        <p:tgtEl>
+                                          <p:spTgt spid="2"/>
+                                        </p:tgtEl>
+                                        <p:attrNameLst>
+                                          <p:attrName>style.visibility</p:attrName>
+                                        </p:attrNameLst>
+                                      </p:cBhvr>
+                                      <p:to>
+                                        <p:strVal val="visible"/>
+                                      </p:to>
+                                    </p:set>
+                                    <p:animEffect transition="in" filter="fade">
+                                      <p:cBhvr>
+                                        <p:cTn id="7" dur="1000"/>
+                                        <p:tgtEl>
+                                          <p:spTgt spid="2"/>
+                                        </p:tgtEl>
+                                      </p:cBhvr>
+                                    </p:animEffect>
+                                    <p:anim calcmode="lin" valueType="num">
+                                      <p:cBhvr>
+                                        <p:cTn id="8" dur="1000" fill="hold"/>
+                                        <p:tgtEl>
+                                          <p:spTgt spid="2"/>
+                                        </p:tgtEl>
+                                        <p:attrNameLst>
+                                          <p:attrName>ppt_x</p:attrName>
+                                        </p:attrNameLst>
+                                      </p:cBhvr>
+                                      <p:tavLst>
+                                        <p:tav tm="0">
+                                          <p:val>
+                                            <p:strVal val="#ppt_x"/>
+                                          </p:val>
+                                        </p:tav>
+                                        <p:tav tm="100000">
+                                          <p:val>
+                                            <p:strVal val="#ppt_x"/>
+                                          </p:val>
+                                        </p:tav>
+                                      </p:tavLst>
+                                    </p:anim>
+                                    <p:anim calcmode="lin" valueType="num">
+                                      <p:cBhvr>
+                                        <p:cTn id="9" dur="1000" fill="hold"/>
+                                        <p:tgtEl>
+                                          <p:spTgt spid="2"/>
+                                        </p:tgtEl>
+                                        <p:attrNameLst>
+                                          <p:attrName>ppt_y</p:attrName>
+                                        </p:attrNameLst>
+                                      </p:cBhvr>
+                                      <p:tavLst>
+                                        <p:tav tm="0">
+                                          <p:val>
+                                            <p:strVal val="#ppt_y+.1"/>
+                                          </p:val>
+                                        </p:tav>
+                                        <p:tav tm="100000">
+                                          <p:val>
+                                            <p:strVal val="#ppt_y"/>
+                                          </p:val>
+                                        </p:tav>
+                                      </p:tavLst>
+                                    </p:anim>
+                                  </p:childTnLst>
+                                </p:cTn>
+                              </p:par>
+                            </p:childTnLst>
+                          </p:cTn>
+                        </p:par>
+                      </p:childTnLst>
+                    </p:cTn>
+                  </p:par>
+                </p:childTnLst>
+              </p:cTn>
+              <p:prevCondLst>
+                <p:cond evt="onPrev" delay="0">
+                  <p:tgtEl>
+                    <p:sldTgt/>
+                  </p:tgtEl>
+                </p:cond>
+              </p:prevCondLst>
+              <p:nextCondLst>
+                <p:cond evt="onNext" delay="0">
+                  <p:tgtEl>
+                    <p:sldTgt/>
+                  </p:tgtEl>
+                </p:cond>
+              </p:nextCondLst>
+            </p:seq>
+          </p:childTnLst>
+        </p:cTn>
+      </p:par>
+    </p:tnLst>
+    <p:bldLst>
+      <p:bldP spid="2" grpId="0"/>
+    </p:bldLst>
+  </p:timing>
 </p:sld>
 </file>
 
@@ -6934,6 +9057,80 @@
         <p:txBody>
           <a:bodyPr/>
           <a:lstStyle/>
+          <a:p>
+            <a:r>
+              <a:rPr lang="lv-LV" dirty="0"/>
+              <a:t>Java mācību materiāli no Liepājas Valsts tehnikuma mācību kursa (Kristaps </a:t>
+            </a:r>
+            <a:r>
+              <a:rPr lang="lv-LV" dirty="0" err="1"/>
+              <a:t>Rāvalds</a:t>
+            </a:r>
+            <a:r>
+              <a:rPr lang="lv-LV" dirty="0"/>
+              <a:t>) </a:t>
+            </a:r>
+            <a:r>
+              <a:rPr lang="lv-LV" dirty="0">
+                <a:hlinkClick r:id="rId2"/>
+              </a:rPr>
+              <a:t>https://skolo.lv/pluginfile.php/78273365/mod_resource/content/0/Skaitliskie%20un%20simboliskie%20datu%20tipi.pdf</a:t>
+            </a:r>
+            <a:endParaRPr lang="lv-LV" dirty="0"/>
+          </a:p>
+          <a:p>
+            <a:r>
+              <a:rPr lang="en-US" dirty="0"/>
+              <a:t>W3Schools – Java Tutorial: </a:t>
+            </a:r>
+            <a:r>
+              <a:rPr lang="en-US" dirty="0">
+                <a:hlinkClick r:id="rId3"/>
+              </a:rPr>
+              <a:t>https://www.w3schools.com/java/</a:t>
+            </a:r>
+            <a:endParaRPr lang="lv-LV" dirty="0"/>
+          </a:p>
+          <a:p>
+            <a:r>
+              <a:rPr lang="en-US" dirty="0" err="1"/>
+              <a:t>GeeksforGeeks</a:t>
+            </a:r>
+            <a:r>
+              <a:rPr lang="en-US" dirty="0"/>
+              <a:t> – Java Variables: </a:t>
+            </a:r>
+            <a:r>
+              <a:rPr lang="en-US" dirty="0">
+                <a:hlinkClick r:id="rId4"/>
+              </a:rPr>
+              <a:t>https://www.geeksforgeeks.org/variables-in-java/</a:t>
+            </a:r>
+            <a:endParaRPr lang="lv-LV" dirty="0"/>
+          </a:p>
+          <a:p>
+            <a:r>
+              <a:rPr lang="lv-LV" dirty="0"/>
+              <a:t>Paša izstrādātie un saglabātie koda piemēri mācību nolūkos</a:t>
+            </a:r>
+          </a:p>
+          <a:p>
+            <a:r>
+              <a:rPr lang="lv-LV" dirty="0" err="1"/>
+              <a:t>Stackoverflow</a:t>
+            </a:r>
+            <a:r>
+              <a:rPr lang="lv-LV" dirty="0"/>
+              <a:t> – programmas funkcionalitāte, problēmu risināšana: </a:t>
+            </a:r>
+            <a:r>
+              <a:rPr lang="lv-LV" dirty="0">
+                <a:hlinkClick r:id="rId5"/>
+              </a:rPr>
+              <a:t>https://stackoverflow.com</a:t>
+            </a:r>
+            <a:endParaRPr lang="lv-LV" dirty="0"/>
+          </a:p>
           <a:p>
             <a:endParaRPr lang="lv-LV" dirty="0"/>
           </a:p>

</xml_diff>

<commit_message>
Pabeigta prezentācija, pēdējais commit ;]
</commit_message>
<xml_diff>
--- a/macibu_materiali/eksamens_krumins.pptx
+++ b/macibu_materiali/eksamens_krumins.pptx
@@ -4,15 +4,19 @@
   <p:sldMasterIdLst>
     <p:sldMasterId id="2147483660" r:id="rId1"/>
   </p:sldMasterIdLst>
+  <p:notesMasterIdLst>
+    <p:notesMasterId r:id="rId11"/>
+  </p:notesMasterIdLst>
   <p:sldIdLst>
     <p:sldId id="256" r:id="rId2"/>
     <p:sldId id="257" r:id="rId3"/>
     <p:sldId id="258" r:id="rId4"/>
     <p:sldId id="259" r:id="rId5"/>
     <p:sldId id="260" r:id="rId6"/>
-    <p:sldId id="261" r:id="rId7"/>
+    <p:sldId id="265" r:id="rId7"/>
     <p:sldId id="262" r:id="rId8"/>
     <p:sldId id="263" r:id="rId9"/>
+    <p:sldId id="264" r:id="rId10"/>
   </p:sldIdLst>
   <p:sldSz cx="12192000" cy="6858000"/>
   <p:notesSz cx="6858000" cy="9144000"/>
@@ -117,6 +121,451 @@
     </p:ext>
   </p:extLst>
 </p:presentation>
+</file>
+
+<file path=ppt/notesMasters/notesMaster1.xml><?xml version="1.0" encoding="utf-8"?>
+<p:notesMaster xmlns:a="http://schemas.openxmlformats.org/drawingml/2006/main" xmlns:r="http://schemas.openxmlformats.org/officeDocument/2006/relationships" xmlns:p="http://schemas.openxmlformats.org/presentationml/2006/main">
+  <p:cSld>
+    <p:bg>
+      <p:bgRef idx="1001">
+        <a:schemeClr val="bg1"/>
+      </p:bgRef>
+    </p:bg>
+    <p:spTree>
+      <p:nvGrpSpPr>
+        <p:cNvPr id="1" name=""/>
+        <p:cNvGrpSpPr/>
+        <p:nvPr/>
+      </p:nvGrpSpPr>
+      <p:grpSpPr>
+        <a:xfrm>
+          <a:off x="0" y="0"/>
+          <a:ext cx="0" cy="0"/>
+          <a:chOff x="0" y="0"/>
+          <a:chExt cx="0" cy="0"/>
+        </a:xfrm>
+      </p:grpSpPr>
+      <p:sp>
+        <p:nvSpPr>
+          <p:cNvPr id="2" name="Header Placeholder 1"/>
+          <p:cNvSpPr>
+            <a:spLocks noGrp="1"/>
+          </p:cNvSpPr>
+          <p:nvPr>
+            <p:ph type="hdr" sz="quarter"/>
+          </p:nvPr>
+        </p:nvSpPr>
+        <p:spPr>
+          <a:xfrm>
+            <a:off x="0" y="0"/>
+            <a:ext cx="2971800" cy="458788"/>
+          </a:xfrm>
+          <a:prstGeom prst="rect">
+            <a:avLst/>
+          </a:prstGeom>
+        </p:spPr>
+        <p:txBody>
+          <a:bodyPr vert="horz" lIns="91440" tIns="45720" rIns="91440" bIns="45720" rtlCol="0"/>
+          <a:lstStyle>
+            <a:lvl1pPr algn="l">
+              <a:defRPr sz="1200"/>
+            </a:lvl1pPr>
+          </a:lstStyle>
+          <a:p>
+            <a:endParaRPr lang="lv-LV"/>
+          </a:p>
+        </p:txBody>
+      </p:sp>
+      <p:sp>
+        <p:nvSpPr>
+          <p:cNvPr id="3" name="Date Placeholder 2"/>
+          <p:cNvSpPr>
+            <a:spLocks noGrp="1"/>
+          </p:cNvSpPr>
+          <p:nvPr>
+            <p:ph type="dt" idx="1"/>
+          </p:nvPr>
+        </p:nvSpPr>
+        <p:spPr>
+          <a:xfrm>
+            <a:off x="3884613" y="0"/>
+            <a:ext cx="2971800" cy="458788"/>
+          </a:xfrm>
+          <a:prstGeom prst="rect">
+            <a:avLst/>
+          </a:prstGeom>
+        </p:spPr>
+        <p:txBody>
+          <a:bodyPr vert="horz" lIns="91440" tIns="45720" rIns="91440" bIns="45720" rtlCol="0"/>
+          <a:lstStyle>
+            <a:lvl1pPr algn="r">
+              <a:defRPr sz="1200"/>
+            </a:lvl1pPr>
+          </a:lstStyle>
+          <a:p>
+            <a:fld id="{EB344A5E-2F32-43AE-8C28-673DEC5DAA6B}" type="datetimeFigureOut">
+              <a:rPr lang="lv-LV" smtClean="0"/>
+              <a:t>10.06.2025</a:t>
+            </a:fld>
+            <a:endParaRPr lang="lv-LV"/>
+          </a:p>
+        </p:txBody>
+      </p:sp>
+      <p:sp>
+        <p:nvSpPr>
+          <p:cNvPr id="4" name="Slide Image Placeholder 3"/>
+          <p:cNvSpPr>
+            <a:spLocks noGrp="1" noRot="1" noChangeAspect="1"/>
+          </p:cNvSpPr>
+          <p:nvPr>
+            <p:ph type="sldImg" idx="2"/>
+          </p:nvPr>
+        </p:nvSpPr>
+        <p:spPr>
+          <a:xfrm>
+            <a:off x="685800" y="1143000"/>
+            <a:ext cx="5486400" cy="3086100"/>
+          </a:xfrm>
+          <a:prstGeom prst="rect">
+            <a:avLst/>
+          </a:prstGeom>
+          <a:noFill/>
+          <a:ln w="12700">
+            <a:solidFill>
+              <a:prstClr val="black"/>
+            </a:solidFill>
+          </a:ln>
+        </p:spPr>
+        <p:txBody>
+          <a:bodyPr vert="horz" lIns="91440" tIns="45720" rIns="91440" bIns="45720" rtlCol="0" anchor="ctr"/>
+          <a:lstStyle/>
+          <a:p>
+            <a:endParaRPr lang="lv-LV"/>
+          </a:p>
+        </p:txBody>
+      </p:sp>
+      <p:sp>
+        <p:nvSpPr>
+          <p:cNvPr id="5" name="Notes Placeholder 4"/>
+          <p:cNvSpPr>
+            <a:spLocks noGrp="1"/>
+          </p:cNvSpPr>
+          <p:nvPr>
+            <p:ph type="body" sz="quarter" idx="3"/>
+          </p:nvPr>
+        </p:nvSpPr>
+        <p:spPr>
+          <a:xfrm>
+            <a:off x="685800" y="4400550"/>
+            <a:ext cx="5486400" cy="3600450"/>
+          </a:xfrm>
+          <a:prstGeom prst="rect">
+            <a:avLst/>
+          </a:prstGeom>
+        </p:spPr>
+        <p:txBody>
+          <a:bodyPr vert="horz" lIns="91440" tIns="45720" rIns="91440" bIns="45720" rtlCol="0"/>
+          <a:lstStyle/>
+          <a:p>
+            <a:pPr lvl="0"/>
+            <a:r>
+              <a:rPr lang="en-US"/>
+              <a:t>Click to edit Master text styles</a:t>
+            </a:r>
+          </a:p>
+          <a:p>
+            <a:pPr lvl="1"/>
+            <a:r>
+              <a:rPr lang="en-US"/>
+              <a:t>Second level</a:t>
+            </a:r>
+          </a:p>
+          <a:p>
+            <a:pPr lvl="2"/>
+            <a:r>
+              <a:rPr lang="en-US"/>
+              <a:t>Third level</a:t>
+            </a:r>
+          </a:p>
+          <a:p>
+            <a:pPr lvl="3"/>
+            <a:r>
+              <a:rPr lang="en-US"/>
+              <a:t>Fourth level</a:t>
+            </a:r>
+          </a:p>
+          <a:p>
+            <a:pPr lvl="4"/>
+            <a:r>
+              <a:rPr lang="en-US"/>
+              <a:t>Fifth level</a:t>
+            </a:r>
+            <a:endParaRPr lang="lv-LV"/>
+          </a:p>
+        </p:txBody>
+      </p:sp>
+      <p:sp>
+        <p:nvSpPr>
+          <p:cNvPr id="6" name="Footer Placeholder 5"/>
+          <p:cNvSpPr>
+            <a:spLocks noGrp="1"/>
+          </p:cNvSpPr>
+          <p:nvPr>
+            <p:ph type="ftr" sz="quarter" idx="4"/>
+          </p:nvPr>
+        </p:nvSpPr>
+        <p:spPr>
+          <a:xfrm>
+            <a:off x="0" y="8685213"/>
+            <a:ext cx="2971800" cy="458787"/>
+          </a:xfrm>
+          <a:prstGeom prst="rect">
+            <a:avLst/>
+          </a:prstGeom>
+        </p:spPr>
+        <p:txBody>
+          <a:bodyPr vert="horz" lIns="91440" tIns="45720" rIns="91440" bIns="45720" rtlCol="0" anchor="b"/>
+          <a:lstStyle>
+            <a:lvl1pPr algn="l">
+              <a:defRPr sz="1200"/>
+            </a:lvl1pPr>
+          </a:lstStyle>
+          <a:p>
+            <a:endParaRPr lang="lv-LV"/>
+          </a:p>
+        </p:txBody>
+      </p:sp>
+      <p:sp>
+        <p:nvSpPr>
+          <p:cNvPr id="7" name="Slide Number Placeholder 6"/>
+          <p:cNvSpPr>
+            <a:spLocks noGrp="1"/>
+          </p:cNvSpPr>
+          <p:nvPr>
+            <p:ph type="sldNum" sz="quarter" idx="5"/>
+          </p:nvPr>
+        </p:nvSpPr>
+        <p:spPr>
+          <a:xfrm>
+            <a:off x="3884613" y="8685213"/>
+            <a:ext cx="2971800" cy="458787"/>
+          </a:xfrm>
+          <a:prstGeom prst="rect">
+            <a:avLst/>
+          </a:prstGeom>
+        </p:spPr>
+        <p:txBody>
+          <a:bodyPr vert="horz" lIns="91440" tIns="45720" rIns="91440" bIns="45720" rtlCol="0" anchor="b"/>
+          <a:lstStyle>
+            <a:lvl1pPr algn="r">
+              <a:defRPr sz="1200"/>
+            </a:lvl1pPr>
+          </a:lstStyle>
+          <a:p>
+            <a:fld id="{B3147DA8-35EA-406C-821C-897FADD8DEBB}" type="slidenum">
+              <a:rPr lang="lv-LV" smtClean="0"/>
+              <a:t>‹#›</a:t>
+            </a:fld>
+            <a:endParaRPr lang="lv-LV"/>
+          </a:p>
+        </p:txBody>
+      </p:sp>
+    </p:spTree>
+    <p:extLst>
+      <p:ext uri="{BB962C8B-B14F-4D97-AF65-F5344CB8AC3E}">
+        <p14:creationId xmlns:p14="http://schemas.microsoft.com/office/powerpoint/2010/main" val="3843963081"/>
+      </p:ext>
+    </p:extLst>
+  </p:cSld>
+  <p:clrMap bg1="lt1" tx1="dk1" bg2="lt2" tx2="dk2" accent1="accent1" accent2="accent2" accent3="accent3" accent4="accent4" accent5="accent5" accent6="accent6" hlink="hlink" folHlink="folHlink"/>
+  <p:notesStyle>
+    <a:lvl1pPr marL="0" algn="l" defTabSz="914400" rtl="0" eaLnBrk="1" latinLnBrk="0" hangingPunct="1">
+      <a:defRPr sz="1200" kern="1200">
+        <a:solidFill>
+          <a:schemeClr val="tx1"/>
+        </a:solidFill>
+        <a:latin typeface="+mn-lt"/>
+        <a:ea typeface="+mn-ea"/>
+        <a:cs typeface="+mn-cs"/>
+      </a:defRPr>
+    </a:lvl1pPr>
+    <a:lvl2pPr marL="457200" algn="l" defTabSz="914400" rtl="0" eaLnBrk="1" latinLnBrk="0" hangingPunct="1">
+      <a:defRPr sz="1200" kern="1200">
+        <a:solidFill>
+          <a:schemeClr val="tx1"/>
+        </a:solidFill>
+        <a:latin typeface="+mn-lt"/>
+        <a:ea typeface="+mn-ea"/>
+        <a:cs typeface="+mn-cs"/>
+      </a:defRPr>
+    </a:lvl2pPr>
+    <a:lvl3pPr marL="914400" algn="l" defTabSz="914400" rtl="0" eaLnBrk="1" latinLnBrk="0" hangingPunct="1">
+      <a:defRPr sz="1200" kern="1200">
+        <a:solidFill>
+          <a:schemeClr val="tx1"/>
+        </a:solidFill>
+        <a:latin typeface="+mn-lt"/>
+        <a:ea typeface="+mn-ea"/>
+        <a:cs typeface="+mn-cs"/>
+      </a:defRPr>
+    </a:lvl3pPr>
+    <a:lvl4pPr marL="1371600" algn="l" defTabSz="914400" rtl="0" eaLnBrk="1" latinLnBrk="0" hangingPunct="1">
+      <a:defRPr sz="1200" kern="1200">
+        <a:solidFill>
+          <a:schemeClr val="tx1"/>
+        </a:solidFill>
+        <a:latin typeface="+mn-lt"/>
+        <a:ea typeface="+mn-ea"/>
+        <a:cs typeface="+mn-cs"/>
+      </a:defRPr>
+    </a:lvl4pPr>
+    <a:lvl5pPr marL="1828800" algn="l" defTabSz="914400" rtl="0" eaLnBrk="1" latinLnBrk="0" hangingPunct="1">
+      <a:defRPr sz="1200" kern="1200">
+        <a:solidFill>
+          <a:schemeClr val="tx1"/>
+        </a:solidFill>
+        <a:latin typeface="+mn-lt"/>
+        <a:ea typeface="+mn-ea"/>
+        <a:cs typeface="+mn-cs"/>
+      </a:defRPr>
+    </a:lvl5pPr>
+    <a:lvl6pPr marL="2286000" algn="l" defTabSz="914400" rtl="0" eaLnBrk="1" latinLnBrk="0" hangingPunct="1">
+      <a:defRPr sz="1200" kern="1200">
+        <a:solidFill>
+          <a:schemeClr val="tx1"/>
+        </a:solidFill>
+        <a:latin typeface="+mn-lt"/>
+        <a:ea typeface="+mn-ea"/>
+        <a:cs typeface="+mn-cs"/>
+      </a:defRPr>
+    </a:lvl6pPr>
+    <a:lvl7pPr marL="2743200" algn="l" defTabSz="914400" rtl="0" eaLnBrk="1" latinLnBrk="0" hangingPunct="1">
+      <a:defRPr sz="1200" kern="1200">
+        <a:solidFill>
+          <a:schemeClr val="tx1"/>
+        </a:solidFill>
+        <a:latin typeface="+mn-lt"/>
+        <a:ea typeface="+mn-ea"/>
+        <a:cs typeface="+mn-cs"/>
+      </a:defRPr>
+    </a:lvl7pPr>
+    <a:lvl8pPr marL="3200400" algn="l" defTabSz="914400" rtl="0" eaLnBrk="1" latinLnBrk="0" hangingPunct="1">
+      <a:defRPr sz="1200" kern="1200">
+        <a:solidFill>
+          <a:schemeClr val="tx1"/>
+        </a:solidFill>
+        <a:latin typeface="+mn-lt"/>
+        <a:ea typeface="+mn-ea"/>
+        <a:cs typeface="+mn-cs"/>
+      </a:defRPr>
+    </a:lvl8pPr>
+    <a:lvl9pPr marL="3657600" algn="l" defTabSz="914400" rtl="0" eaLnBrk="1" latinLnBrk="0" hangingPunct="1">
+      <a:defRPr sz="1200" kern="1200">
+        <a:solidFill>
+          <a:schemeClr val="tx1"/>
+        </a:solidFill>
+        <a:latin typeface="+mn-lt"/>
+        <a:ea typeface="+mn-ea"/>
+        <a:cs typeface="+mn-cs"/>
+      </a:defRPr>
+    </a:lvl9pPr>
+  </p:notesStyle>
+</p:notesMaster>
+</file>
+
+<file path=ppt/notesSlides/notesSlide1.xml><?xml version="1.0" encoding="utf-8"?>
+<p:notes xmlns:a="http://schemas.openxmlformats.org/drawingml/2006/main" xmlns:r="http://schemas.openxmlformats.org/officeDocument/2006/relationships" xmlns:p="http://schemas.openxmlformats.org/presentationml/2006/main">
+  <p:cSld>
+    <p:spTree>
+      <p:nvGrpSpPr>
+        <p:cNvPr id="1" name=""/>
+        <p:cNvGrpSpPr/>
+        <p:nvPr/>
+      </p:nvGrpSpPr>
+      <p:grpSpPr>
+        <a:xfrm>
+          <a:off x="0" y="0"/>
+          <a:ext cx="0" cy="0"/>
+          <a:chOff x="0" y="0"/>
+          <a:chExt cx="0" cy="0"/>
+        </a:xfrm>
+      </p:grpSpPr>
+      <p:sp>
+        <p:nvSpPr>
+          <p:cNvPr id="2" name="Slide Image Placeholder 1"/>
+          <p:cNvSpPr>
+            <a:spLocks noGrp="1" noRot="1" noChangeAspect="1"/>
+          </p:cNvSpPr>
+          <p:nvPr>
+            <p:ph type="sldImg"/>
+          </p:nvPr>
+        </p:nvSpPr>
+        <p:spPr/>
+      </p:sp>
+      <p:sp>
+        <p:nvSpPr>
+          <p:cNvPr id="3" name="Notes Placeholder 2"/>
+          <p:cNvSpPr>
+            <a:spLocks noGrp="1"/>
+          </p:cNvSpPr>
+          <p:nvPr>
+            <p:ph type="body" idx="1"/>
+          </p:nvPr>
+        </p:nvSpPr>
+        <p:spPr/>
+        <p:txBody>
+          <a:bodyPr/>
+          <a:lstStyle/>
+          <a:p>
+            <a:r>
+              <a:rPr lang="lv-LV" dirty="0"/>
+              <a:t>Piemēram, kā saskaitīt </a:t>
+            </a:r>
+            <a:r>
+              <a:rPr lang="lv-LV" dirty="0" err="1"/>
+              <a:t>String</a:t>
+            </a:r>
+            <a:r>
+              <a:rPr lang="lv-LV" dirty="0"/>
+              <a:t> virknes, vidējā aritmētiskā vērtība, pāra/nepāra skaitlis</a:t>
+            </a:r>
+          </a:p>
+        </p:txBody>
+      </p:sp>
+      <p:sp>
+        <p:nvSpPr>
+          <p:cNvPr id="4" name="Slide Number Placeholder 3"/>
+          <p:cNvSpPr>
+            <a:spLocks noGrp="1"/>
+          </p:cNvSpPr>
+          <p:nvPr>
+            <p:ph type="sldNum" sz="quarter" idx="5"/>
+          </p:nvPr>
+        </p:nvSpPr>
+        <p:spPr/>
+        <p:txBody>
+          <a:bodyPr/>
+          <a:lstStyle/>
+          <a:p>
+            <a:fld id="{B3147DA8-35EA-406C-821C-897FADD8DEBB}" type="slidenum">
+              <a:rPr lang="lv-LV" smtClean="0"/>
+              <a:t>4</a:t>
+            </a:fld>
+            <a:endParaRPr lang="lv-LV"/>
+          </a:p>
+        </p:txBody>
+      </p:sp>
+    </p:spTree>
+    <p:extLst>
+      <p:ext uri="{BB962C8B-B14F-4D97-AF65-F5344CB8AC3E}">
+        <p14:creationId xmlns:p14="http://schemas.microsoft.com/office/powerpoint/2010/main" val="1999026480"/>
+      </p:ext>
+    </p:extLst>
+  </p:cSld>
+  <p:clrMapOvr>
+    <a:masterClrMapping/>
+  </p:clrMapOvr>
+</p:notes>
 </file>
 
 <file path=ppt/slideLayouts/slideLayout1.xml><?xml version="1.0" encoding="utf-8"?>
@@ -6164,6 +6613,9 @@
   <p:clrMapOvr>
     <a:masterClrMapping/>
   </p:clrMapOvr>
+  <p:transition spd="slow">
+    <p:wipe/>
+  </p:transition>
 </p:sld>
 </file>
 
@@ -6287,6 +6739,9 @@
   <p:clrMapOvr>
     <a:masterClrMapping/>
   </p:clrMapOvr>
+  <p:transition spd="slow">
+    <p:wipe/>
+  </p:transition>
   <p:timing>
     <p:tnLst>
       <p:par>
@@ -6717,6 +7172,9 @@
   <p:clrMapOvr>
     <a:masterClrMapping/>
   </p:clrMapOvr>
+  <p:transition spd="slow">
+    <p:wipe/>
+  </p:transition>
   <p:timing>
     <p:tnLst>
       <p:par>
@@ -7092,7 +7550,7 @@
           <p:nvPr/>
         </p:nvPicPr>
         <p:blipFill>
-          <a:blip r:embed="rId2"/>
+          <a:blip r:embed="rId3"/>
           <a:stretch>
             <a:fillRect/>
           </a:stretch>
@@ -7122,7 +7580,7 @@
           <p:nvPr/>
         </p:nvPicPr>
         <p:blipFill>
-          <a:blip r:embed="rId3"/>
+          <a:blip r:embed="rId4"/>
           <a:stretch>
             <a:fillRect/>
           </a:stretch>
@@ -7152,7 +7610,7 @@
           <p:nvPr/>
         </p:nvPicPr>
         <p:blipFill>
-          <a:blip r:embed="rId4"/>
+          <a:blip r:embed="rId5"/>
           <a:stretch>
             <a:fillRect/>
           </a:stretch>
@@ -7182,7 +7640,7 @@
           <p:nvPr/>
         </p:nvPicPr>
         <p:blipFill>
-          <a:blip r:embed="rId5"/>
+          <a:blip r:embed="rId6"/>
           <a:stretch>
             <a:fillRect/>
           </a:stretch>
@@ -7207,6 +7665,9 @@
   <p:clrMapOvr>
     <a:masterClrMapping/>
   </p:clrMapOvr>
+  <p:transition spd="slow">
+    <p:wipe/>
+  </p:transition>
   <p:timing>
     <p:tnLst>
       <p:par>
@@ -7799,7 +8260,12 @@
             <p:ph idx="1"/>
           </p:nvPr>
         </p:nvSpPr>
-        <p:spPr/>
+        <p:spPr>
+          <a:xfrm>
+            <a:off x="1103312" y="1853248"/>
+            <a:ext cx="8946541" cy="4395151"/>
+          </a:xfrm>
+        </p:spPr>
         <p:txBody>
           <a:bodyPr>
             <a:normAutofit/>
@@ -7808,6 +8274,12 @@
           <a:p>
             <a:r>
               <a:rPr lang="lv-LV" sz="3000" dirty="0"/>
+              <a:t>Word -&gt; PDF formāts</a:t>
+            </a:r>
+          </a:p>
+          <a:p>
+            <a:r>
+              <a:rPr lang="lv-LV" sz="3000" dirty="0"/>
               <a:t>Teorijas izklāsts</a:t>
             </a:r>
           </a:p>
@@ -7833,6 +8305,12 @@
             <a:r>
               <a:rPr lang="lv-LV" sz="3000" dirty="0"/>
               <a:t>Kopējais laiks ~5h</a:t>
+            </a:r>
+          </a:p>
+          <a:p>
+            <a:r>
+              <a:rPr lang="lv-LV" sz="3000" dirty="0"/>
+              <a:t>Šķēršļi – atrast kvalitatīvu info par doto tēmu</a:t>
             </a:r>
           </a:p>
         </p:txBody>
@@ -7847,6 +8325,9 @@
   <p:clrMapOvr>
     <a:masterClrMapping/>
   </p:clrMapOvr>
+  <p:transition spd="slow">
+    <p:wipe/>
+  </p:transition>
   <p:timing>
     <p:tnLst>
       <p:par>
@@ -7982,7 +8463,7 @@
                                         <p:tgtEl>
                                           <p:spTgt spid="3">
                                             <p:txEl>
-                                              <p:pRg st="0" end="0"/>
+                                              <p:pRg st="1" end="1"/>
                                             </p:txEl>
                                           </p:spTgt>
                                         </p:tgtEl>
@@ -8000,7 +8481,7 @@
                                         <p:tgtEl>
                                           <p:spTgt spid="3">
                                             <p:txEl>
-                                              <p:pRg st="0" end="0"/>
+                                              <p:pRg st="1" end="1"/>
                                             </p:txEl>
                                           </p:spTgt>
                                         </p:tgtEl>
@@ -8012,7 +8493,7 @@
                                         <p:tgtEl>
                                           <p:spTgt spid="3">
                                             <p:txEl>
-                                              <p:pRg st="0" end="0"/>
+                                              <p:pRg st="1" end="1"/>
                                             </p:txEl>
                                           </p:spTgt>
                                         </p:tgtEl>
@@ -8039,7 +8520,7 @@
                                         <p:tgtEl>
                                           <p:spTgt spid="3">
                                             <p:txEl>
-                                              <p:pRg st="0" end="0"/>
+                                              <p:pRg st="1" end="1"/>
                                             </p:txEl>
                                           </p:spTgt>
                                         </p:tgtEl>
@@ -8097,7 +8578,7 @@
                                         <p:tgtEl>
                                           <p:spTgt spid="3">
                                             <p:txEl>
-                                              <p:pRg st="1" end="1"/>
+                                              <p:pRg st="0" end="0"/>
                                             </p:txEl>
                                           </p:spTgt>
                                         </p:tgtEl>
@@ -8115,7 +8596,7 @@
                                         <p:tgtEl>
                                           <p:spTgt spid="3">
                                             <p:txEl>
-                                              <p:pRg st="1" end="1"/>
+                                              <p:pRg st="0" end="0"/>
                                             </p:txEl>
                                           </p:spTgt>
                                         </p:tgtEl>
@@ -8127,7 +8608,7 @@
                                         <p:tgtEl>
                                           <p:spTgt spid="3">
                                             <p:txEl>
-                                              <p:pRg st="1" end="1"/>
+                                              <p:pRg st="0" end="0"/>
                                             </p:txEl>
                                           </p:spTgt>
                                         </p:tgtEl>
@@ -8154,7 +8635,7 @@
                                         <p:tgtEl>
                                           <p:spTgt spid="3">
                                             <p:txEl>
-                                              <p:pRg st="1" end="1"/>
+                                              <p:pRg st="0" end="0"/>
                                             </p:txEl>
                                           </p:spTgt>
                                         </p:tgtEl>
@@ -8500,6 +8981,236 @@
                                           <p:spTgt spid="3">
                                             <p:txEl>
                                               <p:pRg st="4" end="4"/>
+                                            </p:txEl>
+                                          </p:spTgt>
+                                        </p:tgtEl>
+                                        <p:attrNameLst>
+                                          <p:attrName>ppt_y</p:attrName>
+                                        </p:attrNameLst>
+                                      </p:cBhvr>
+                                      <p:tavLst>
+                                        <p:tav tm="0">
+                                          <p:val>
+                                            <p:strVal val="#ppt_y+.1"/>
+                                          </p:val>
+                                        </p:tav>
+                                        <p:tav tm="100000">
+                                          <p:val>
+                                            <p:strVal val="#ppt_y"/>
+                                          </p:val>
+                                        </p:tav>
+                                      </p:tavLst>
+                                    </p:anim>
+                                  </p:childTnLst>
+                                </p:cTn>
+                              </p:par>
+                            </p:childTnLst>
+                          </p:cTn>
+                        </p:par>
+                      </p:childTnLst>
+                    </p:cTn>
+                  </p:par>
+                  <p:par>
+                    <p:cTn id="45" fill="hold">
+                      <p:stCondLst>
+                        <p:cond delay="indefinite"/>
+                      </p:stCondLst>
+                      <p:childTnLst>
+                        <p:par>
+                          <p:cTn id="46" fill="hold">
+                            <p:stCondLst>
+                              <p:cond delay="0"/>
+                            </p:stCondLst>
+                            <p:childTnLst>
+                              <p:par>
+                                <p:cTn id="47" presetID="42" presetClass="entr" presetSubtype="0" fill="hold" nodeType="clickEffect">
+                                  <p:stCondLst>
+                                    <p:cond delay="0"/>
+                                  </p:stCondLst>
+                                  <p:childTnLst>
+                                    <p:set>
+                                      <p:cBhvr>
+                                        <p:cTn id="48" dur="1" fill="hold">
+                                          <p:stCondLst>
+                                            <p:cond delay="0"/>
+                                          </p:stCondLst>
+                                        </p:cTn>
+                                        <p:tgtEl>
+                                          <p:spTgt spid="3">
+                                            <p:txEl>
+                                              <p:pRg st="5" end="5"/>
+                                            </p:txEl>
+                                          </p:spTgt>
+                                        </p:tgtEl>
+                                        <p:attrNameLst>
+                                          <p:attrName>style.visibility</p:attrName>
+                                        </p:attrNameLst>
+                                      </p:cBhvr>
+                                      <p:to>
+                                        <p:strVal val="visible"/>
+                                      </p:to>
+                                    </p:set>
+                                    <p:animEffect transition="in" filter="fade">
+                                      <p:cBhvr>
+                                        <p:cTn id="49" dur="1000"/>
+                                        <p:tgtEl>
+                                          <p:spTgt spid="3">
+                                            <p:txEl>
+                                              <p:pRg st="5" end="5"/>
+                                            </p:txEl>
+                                          </p:spTgt>
+                                        </p:tgtEl>
+                                      </p:cBhvr>
+                                    </p:animEffect>
+                                    <p:anim calcmode="lin" valueType="num">
+                                      <p:cBhvr>
+                                        <p:cTn id="50" dur="1000" fill="hold"/>
+                                        <p:tgtEl>
+                                          <p:spTgt spid="3">
+                                            <p:txEl>
+                                              <p:pRg st="5" end="5"/>
+                                            </p:txEl>
+                                          </p:spTgt>
+                                        </p:tgtEl>
+                                        <p:attrNameLst>
+                                          <p:attrName>ppt_x</p:attrName>
+                                        </p:attrNameLst>
+                                      </p:cBhvr>
+                                      <p:tavLst>
+                                        <p:tav tm="0">
+                                          <p:val>
+                                            <p:strVal val="#ppt_x"/>
+                                          </p:val>
+                                        </p:tav>
+                                        <p:tav tm="100000">
+                                          <p:val>
+                                            <p:strVal val="#ppt_x"/>
+                                          </p:val>
+                                        </p:tav>
+                                      </p:tavLst>
+                                    </p:anim>
+                                    <p:anim calcmode="lin" valueType="num">
+                                      <p:cBhvr>
+                                        <p:cTn id="51" dur="1000" fill="hold"/>
+                                        <p:tgtEl>
+                                          <p:spTgt spid="3">
+                                            <p:txEl>
+                                              <p:pRg st="5" end="5"/>
+                                            </p:txEl>
+                                          </p:spTgt>
+                                        </p:tgtEl>
+                                        <p:attrNameLst>
+                                          <p:attrName>ppt_y</p:attrName>
+                                        </p:attrNameLst>
+                                      </p:cBhvr>
+                                      <p:tavLst>
+                                        <p:tav tm="0">
+                                          <p:val>
+                                            <p:strVal val="#ppt_y+.1"/>
+                                          </p:val>
+                                        </p:tav>
+                                        <p:tav tm="100000">
+                                          <p:val>
+                                            <p:strVal val="#ppt_y"/>
+                                          </p:val>
+                                        </p:tav>
+                                      </p:tavLst>
+                                    </p:anim>
+                                  </p:childTnLst>
+                                </p:cTn>
+                              </p:par>
+                            </p:childTnLst>
+                          </p:cTn>
+                        </p:par>
+                      </p:childTnLst>
+                    </p:cTn>
+                  </p:par>
+                  <p:par>
+                    <p:cTn id="52" fill="hold">
+                      <p:stCondLst>
+                        <p:cond delay="indefinite"/>
+                      </p:stCondLst>
+                      <p:childTnLst>
+                        <p:par>
+                          <p:cTn id="53" fill="hold">
+                            <p:stCondLst>
+                              <p:cond delay="0"/>
+                            </p:stCondLst>
+                            <p:childTnLst>
+                              <p:par>
+                                <p:cTn id="54" presetID="42" presetClass="entr" presetSubtype="0" fill="hold" nodeType="clickEffect">
+                                  <p:stCondLst>
+                                    <p:cond delay="0"/>
+                                  </p:stCondLst>
+                                  <p:childTnLst>
+                                    <p:set>
+                                      <p:cBhvr>
+                                        <p:cTn id="55" dur="1" fill="hold">
+                                          <p:stCondLst>
+                                            <p:cond delay="0"/>
+                                          </p:stCondLst>
+                                        </p:cTn>
+                                        <p:tgtEl>
+                                          <p:spTgt spid="3">
+                                            <p:txEl>
+                                              <p:pRg st="6" end="6"/>
+                                            </p:txEl>
+                                          </p:spTgt>
+                                        </p:tgtEl>
+                                        <p:attrNameLst>
+                                          <p:attrName>style.visibility</p:attrName>
+                                        </p:attrNameLst>
+                                      </p:cBhvr>
+                                      <p:to>
+                                        <p:strVal val="visible"/>
+                                      </p:to>
+                                    </p:set>
+                                    <p:animEffect transition="in" filter="fade">
+                                      <p:cBhvr>
+                                        <p:cTn id="56" dur="1000"/>
+                                        <p:tgtEl>
+                                          <p:spTgt spid="3">
+                                            <p:txEl>
+                                              <p:pRg st="6" end="6"/>
+                                            </p:txEl>
+                                          </p:spTgt>
+                                        </p:tgtEl>
+                                      </p:cBhvr>
+                                    </p:animEffect>
+                                    <p:anim calcmode="lin" valueType="num">
+                                      <p:cBhvr>
+                                        <p:cTn id="57" dur="1000" fill="hold"/>
+                                        <p:tgtEl>
+                                          <p:spTgt spid="3">
+                                            <p:txEl>
+                                              <p:pRg st="6" end="6"/>
+                                            </p:txEl>
+                                          </p:spTgt>
+                                        </p:tgtEl>
+                                        <p:attrNameLst>
+                                          <p:attrName>ppt_x</p:attrName>
+                                        </p:attrNameLst>
+                                      </p:cBhvr>
+                                      <p:tavLst>
+                                        <p:tav tm="0">
+                                          <p:val>
+                                            <p:strVal val="#ppt_x"/>
+                                          </p:val>
+                                        </p:tav>
+                                        <p:tav tm="100000">
+                                          <p:val>
+                                            <p:strVal val="#ppt_x"/>
+                                          </p:val>
+                                        </p:tav>
+                                      </p:tavLst>
+                                    </p:anim>
+                                    <p:anim calcmode="lin" valueType="num">
+                                      <p:cBhvr>
+                                        <p:cTn id="58" dur="1000" fill="hold"/>
+                                        <p:tgtEl>
+                                          <p:spTgt spid="3">
+                                            <p:txEl>
+                                              <p:pRg st="6" end="6"/>
                                             </p:txEl>
                                           </p:spTgt>
                                         </p:tgtEl>
@@ -8579,7 +9290,7 @@
           <p:cNvPr id="2" name="Title 1">
             <a:extLst>
               <a:ext uri="{FF2B5EF4-FFF2-40B4-BE49-F238E27FC236}">
-                <a16:creationId xmlns:a16="http://schemas.microsoft.com/office/drawing/2014/main" id="{8430584F-E0D2-4C8B-9805-43BA57D0889C}"/>
+                <a16:creationId xmlns:a16="http://schemas.microsoft.com/office/drawing/2014/main" id="{BAD9EFD7-7A10-47DE-A618-6ED364C24EA9}"/>
               </a:ext>
             </a:extLst>
           </p:cNvPr>
@@ -8602,16 +9313,130 @@
           </a:p>
         </p:txBody>
       </p:sp>
+      <p:sp>
+        <p:nvSpPr>
+          <p:cNvPr id="3" name="Content Placeholder 2">
+            <a:extLst>
+              <a:ext uri="{FF2B5EF4-FFF2-40B4-BE49-F238E27FC236}">
+                <a16:creationId xmlns:a16="http://schemas.microsoft.com/office/drawing/2014/main" id="{92605ED6-1530-4C82-B9D4-25FCA810A262}"/>
+              </a:ext>
+            </a:extLst>
+          </p:cNvPr>
+          <p:cNvSpPr>
+            <a:spLocks noGrp="1"/>
+          </p:cNvSpPr>
+          <p:nvPr>
+            <p:ph idx="1"/>
+          </p:nvPr>
+        </p:nvSpPr>
+        <p:spPr>
+          <a:xfrm>
+            <a:off x="408918" y="1489153"/>
+            <a:ext cx="9539479" cy="3103473"/>
+          </a:xfrm>
+        </p:spPr>
+        <p:txBody>
+          <a:bodyPr>
+            <a:normAutofit/>
+          </a:bodyPr>
+          <a:lstStyle/>
+          <a:p>
+            <a:r>
+              <a:rPr lang="lv-LV" sz="3000" dirty="0"/>
+              <a:t>Live </a:t>
+            </a:r>
+            <a:r>
+              <a:rPr lang="lv-LV" sz="3000" dirty="0" err="1"/>
+              <a:t>timer</a:t>
+            </a:r>
+            <a:r>
+              <a:rPr lang="lv-LV" sz="3000" dirty="0"/>
+              <a:t> un jautājumu skaitītājs</a:t>
+            </a:r>
+          </a:p>
+          <a:p>
+            <a:r>
+              <a:rPr lang="lv-LV" sz="3000" dirty="0"/>
+              <a:t>Poga </a:t>
+            </a:r>
+            <a:r>
+              <a:rPr lang="lv-LV" sz="3000" b="1" dirty="0"/>
+              <a:t>Nav ne jausmas</a:t>
+            </a:r>
+          </a:p>
+          <a:p>
+            <a:r>
+              <a:rPr lang="lv-LV" sz="3000" dirty="0"/>
+              <a:t>Jautājumus iespējams nolasīt no .</a:t>
+            </a:r>
+            <a:r>
+              <a:rPr lang="lv-LV" sz="3000" dirty="0" err="1"/>
+              <a:t>txt</a:t>
+            </a:r>
+            <a:r>
+              <a:rPr lang="lv-LV" sz="3000" dirty="0"/>
+              <a:t> faila</a:t>
+            </a:r>
+          </a:p>
+          <a:p>
+            <a:r>
+              <a:rPr lang="lv-LV" sz="3000" dirty="0"/>
+              <a:t>Personalizētas ikonas katram logam (</a:t>
+            </a:r>
+            <a:r>
+              <a:rPr lang="lv-LV" sz="3000" dirty="0" err="1"/>
+              <a:t>random</a:t>
+            </a:r>
+            <a:r>
+              <a:rPr lang="lv-LV" sz="3000" dirty="0"/>
+              <a:t> pie katra jautājuma)</a:t>
+            </a:r>
+          </a:p>
+        </p:txBody>
+      </p:sp>
+      <p:pic>
+        <p:nvPicPr>
+          <p:cNvPr id="5" name="Picture 4">
+            <a:extLst>
+              <a:ext uri="{FF2B5EF4-FFF2-40B4-BE49-F238E27FC236}">
+                <a16:creationId xmlns:a16="http://schemas.microsoft.com/office/drawing/2014/main" id="{1B82701F-D74B-49BA-8681-75D803C8EECA}"/>
+              </a:ext>
+            </a:extLst>
+          </p:cNvPr>
+          <p:cNvPicPr>
+            <a:picLocks noChangeAspect="1"/>
+          </p:cNvPicPr>
+          <p:nvPr/>
+        </p:nvPicPr>
+        <p:blipFill>
+          <a:blip r:embed="rId2"/>
+          <a:stretch>
+            <a:fillRect/>
+          </a:stretch>
+        </p:blipFill>
+        <p:spPr>
+          <a:xfrm>
+            <a:off x="5649113" y="3826796"/>
+            <a:ext cx="6045582" cy="2896436"/>
+          </a:xfrm>
+          <a:prstGeom prst="rect">
+            <a:avLst/>
+          </a:prstGeom>
+        </p:spPr>
+      </p:pic>
     </p:spTree>
     <p:extLst>
       <p:ext uri="{BB962C8B-B14F-4D97-AF65-F5344CB8AC3E}">
-        <p14:creationId xmlns:p14="http://schemas.microsoft.com/office/powerpoint/2010/main" val="3588800781"/>
+        <p14:creationId xmlns:p14="http://schemas.microsoft.com/office/powerpoint/2010/main" val="648211019"/>
       </p:ext>
     </p:extLst>
   </p:cSld>
   <p:clrMapOvr>
     <a:masterClrMapping/>
   </p:clrMapOvr>
+  <p:transition spd="slow">
+    <p:wipe/>
+  </p:transition>
   <p:timing>
     <p:tnLst>
       <p:par>
@@ -8692,6 +9517,565 @@
                                         <p:cTn id="9" dur="1000" fill="hold"/>
                                         <p:tgtEl>
                                           <p:spTgt spid="2"/>
+                                        </p:tgtEl>
+                                        <p:attrNameLst>
+                                          <p:attrName>ppt_y</p:attrName>
+                                        </p:attrNameLst>
+                                      </p:cBhvr>
+                                      <p:tavLst>
+                                        <p:tav tm="0">
+                                          <p:val>
+                                            <p:strVal val="#ppt_y+.1"/>
+                                          </p:val>
+                                        </p:tav>
+                                        <p:tav tm="100000">
+                                          <p:val>
+                                            <p:strVal val="#ppt_y"/>
+                                          </p:val>
+                                        </p:tav>
+                                      </p:tavLst>
+                                    </p:anim>
+                                  </p:childTnLst>
+                                </p:cTn>
+                              </p:par>
+                            </p:childTnLst>
+                          </p:cTn>
+                        </p:par>
+                      </p:childTnLst>
+                    </p:cTn>
+                  </p:par>
+                  <p:par>
+                    <p:cTn id="10" fill="hold">
+                      <p:stCondLst>
+                        <p:cond delay="indefinite"/>
+                      </p:stCondLst>
+                      <p:childTnLst>
+                        <p:par>
+                          <p:cTn id="11" fill="hold">
+                            <p:stCondLst>
+                              <p:cond delay="0"/>
+                            </p:stCondLst>
+                            <p:childTnLst>
+                              <p:par>
+                                <p:cTn id="12" presetID="42" presetClass="entr" presetSubtype="0" fill="hold" nodeType="clickEffect">
+                                  <p:stCondLst>
+                                    <p:cond delay="0"/>
+                                  </p:stCondLst>
+                                  <p:childTnLst>
+                                    <p:set>
+                                      <p:cBhvr>
+                                        <p:cTn id="13" dur="1" fill="hold">
+                                          <p:stCondLst>
+                                            <p:cond delay="0"/>
+                                          </p:stCondLst>
+                                        </p:cTn>
+                                        <p:tgtEl>
+                                          <p:spTgt spid="3">
+                                            <p:txEl>
+                                              <p:pRg st="0" end="0"/>
+                                            </p:txEl>
+                                          </p:spTgt>
+                                        </p:tgtEl>
+                                        <p:attrNameLst>
+                                          <p:attrName>style.visibility</p:attrName>
+                                        </p:attrNameLst>
+                                      </p:cBhvr>
+                                      <p:to>
+                                        <p:strVal val="visible"/>
+                                      </p:to>
+                                    </p:set>
+                                    <p:animEffect transition="in" filter="fade">
+                                      <p:cBhvr>
+                                        <p:cTn id="14" dur="1000"/>
+                                        <p:tgtEl>
+                                          <p:spTgt spid="3">
+                                            <p:txEl>
+                                              <p:pRg st="0" end="0"/>
+                                            </p:txEl>
+                                          </p:spTgt>
+                                        </p:tgtEl>
+                                      </p:cBhvr>
+                                    </p:animEffect>
+                                    <p:anim calcmode="lin" valueType="num">
+                                      <p:cBhvr>
+                                        <p:cTn id="15" dur="1000" fill="hold"/>
+                                        <p:tgtEl>
+                                          <p:spTgt spid="3">
+                                            <p:txEl>
+                                              <p:pRg st="0" end="0"/>
+                                            </p:txEl>
+                                          </p:spTgt>
+                                        </p:tgtEl>
+                                        <p:attrNameLst>
+                                          <p:attrName>ppt_x</p:attrName>
+                                        </p:attrNameLst>
+                                      </p:cBhvr>
+                                      <p:tavLst>
+                                        <p:tav tm="0">
+                                          <p:val>
+                                            <p:strVal val="#ppt_x"/>
+                                          </p:val>
+                                        </p:tav>
+                                        <p:tav tm="100000">
+                                          <p:val>
+                                            <p:strVal val="#ppt_x"/>
+                                          </p:val>
+                                        </p:tav>
+                                      </p:tavLst>
+                                    </p:anim>
+                                    <p:anim calcmode="lin" valueType="num">
+                                      <p:cBhvr>
+                                        <p:cTn id="16" dur="1000" fill="hold"/>
+                                        <p:tgtEl>
+                                          <p:spTgt spid="3">
+                                            <p:txEl>
+                                              <p:pRg st="0" end="0"/>
+                                            </p:txEl>
+                                          </p:spTgt>
+                                        </p:tgtEl>
+                                        <p:attrNameLst>
+                                          <p:attrName>ppt_y</p:attrName>
+                                        </p:attrNameLst>
+                                      </p:cBhvr>
+                                      <p:tavLst>
+                                        <p:tav tm="0">
+                                          <p:val>
+                                            <p:strVal val="#ppt_y+.1"/>
+                                          </p:val>
+                                        </p:tav>
+                                        <p:tav tm="100000">
+                                          <p:val>
+                                            <p:strVal val="#ppt_y"/>
+                                          </p:val>
+                                        </p:tav>
+                                      </p:tavLst>
+                                    </p:anim>
+                                  </p:childTnLst>
+                                </p:cTn>
+                              </p:par>
+                            </p:childTnLst>
+                          </p:cTn>
+                        </p:par>
+                      </p:childTnLst>
+                    </p:cTn>
+                  </p:par>
+                  <p:par>
+                    <p:cTn id="17" fill="hold">
+                      <p:stCondLst>
+                        <p:cond delay="indefinite"/>
+                      </p:stCondLst>
+                      <p:childTnLst>
+                        <p:par>
+                          <p:cTn id="18" fill="hold">
+                            <p:stCondLst>
+                              <p:cond delay="0"/>
+                            </p:stCondLst>
+                            <p:childTnLst>
+                              <p:par>
+                                <p:cTn id="19" presetID="42" presetClass="entr" presetSubtype="0" fill="hold" nodeType="clickEffect">
+                                  <p:stCondLst>
+                                    <p:cond delay="0"/>
+                                  </p:stCondLst>
+                                  <p:childTnLst>
+                                    <p:set>
+                                      <p:cBhvr>
+                                        <p:cTn id="20" dur="1" fill="hold">
+                                          <p:stCondLst>
+                                            <p:cond delay="0"/>
+                                          </p:stCondLst>
+                                        </p:cTn>
+                                        <p:tgtEl>
+                                          <p:spTgt spid="3">
+                                            <p:txEl>
+                                              <p:pRg st="1" end="1"/>
+                                            </p:txEl>
+                                          </p:spTgt>
+                                        </p:tgtEl>
+                                        <p:attrNameLst>
+                                          <p:attrName>style.visibility</p:attrName>
+                                        </p:attrNameLst>
+                                      </p:cBhvr>
+                                      <p:to>
+                                        <p:strVal val="visible"/>
+                                      </p:to>
+                                    </p:set>
+                                    <p:animEffect transition="in" filter="fade">
+                                      <p:cBhvr>
+                                        <p:cTn id="21" dur="1000"/>
+                                        <p:tgtEl>
+                                          <p:spTgt spid="3">
+                                            <p:txEl>
+                                              <p:pRg st="1" end="1"/>
+                                            </p:txEl>
+                                          </p:spTgt>
+                                        </p:tgtEl>
+                                      </p:cBhvr>
+                                    </p:animEffect>
+                                    <p:anim calcmode="lin" valueType="num">
+                                      <p:cBhvr>
+                                        <p:cTn id="22" dur="1000" fill="hold"/>
+                                        <p:tgtEl>
+                                          <p:spTgt spid="3">
+                                            <p:txEl>
+                                              <p:pRg st="1" end="1"/>
+                                            </p:txEl>
+                                          </p:spTgt>
+                                        </p:tgtEl>
+                                        <p:attrNameLst>
+                                          <p:attrName>ppt_x</p:attrName>
+                                        </p:attrNameLst>
+                                      </p:cBhvr>
+                                      <p:tavLst>
+                                        <p:tav tm="0">
+                                          <p:val>
+                                            <p:strVal val="#ppt_x"/>
+                                          </p:val>
+                                        </p:tav>
+                                        <p:tav tm="100000">
+                                          <p:val>
+                                            <p:strVal val="#ppt_x"/>
+                                          </p:val>
+                                        </p:tav>
+                                      </p:tavLst>
+                                    </p:anim>
+                                    <p:anim calcmode="lin" valueType="num">
+                                      <p:cBhvr>
+                                        <p:cTn id="23" dur="1000" fill="hold"/>
+                                        <p:tgtEl>
+                                          <p:spTgt spid="3">
+                                            <p:txEl>
+                                              <p:pRg st="1" end="1"/>
+                                            </p:txEl>
+                                          </p:spTgt>
+                                        </p:tgtEl>
+                                        <p:attrNameLst>
+                                          <p:attrName>ppt_y</p:attrName>
+                                        </p:attrNameLst>
+                                      </p:cBhvr>
+                                      <p:tavLst>
+                                        <p:tav tm="0">
+                                          <p:val>
+                                            <p:strVal val="#ppt_y+.1"/>
+                                          </p:val>
+                                        </p:tav>
+                                        <p:tav tm="100000">
+                                          <p:val>
+                                            <p:strVal val="#ppt_y"/>
+                                          </p:val>
+                                        </p:tav>
+                                      </p:tavLst>
+                                    </p:anim>
+                                  </p:childTnLst>
+                                </p:cTn>
+                              </p:par>
+                            </p:childTnLst>
+                          </p:cTn>
+                        </p:par>
+                      </p:childTnLst>
+                    </p:cTn>
+                  </p:par>
+                  <p:par>
+                    <p:cTn id="24" fill="hold">
+                      <p:stCondLst>
+                        <p:cond delay="indefinite"/>
+                      </p:stCondLst>
+                      <p:childTnLst>
+                        <p:par>
+                          <p:cTn id="25" fill="hold">
+                            <p:stCondLst>
+                              <p:cond delay="0"/>
+                            </p:stCondLst>
+                            <p:childTnLst>
+                              <p:par>
+                                <p:cTn id="26" presetID="42" presetClass="entr" presetSubtype="0" fill="hold" nodeType="clickEffect">
+                                  <p:stCondLst>
+                                    <p:cond delay="0"/>
+                                  </p:stCondLst>
+                                  <p:childTnLst>
+                                    <p:set>
+                                      <p:cBhvr>
+                                        <p:cTn id="27" dur="1" fill="hold">
+                                          <p:stCondLst>
+                                            <p:cond delay="0"/>
+                                          </p:stCondLst>
+                                        </p:cTn>
+                                        <p:tgtEl>
+                                          <p:spTgt spid="3">
+                                            <p:txEl>
+                                              <p:pRg st="2" end="2"/>
+                                            </p:txEl>
+                                          </p:spTgt>
+                                        </p:tgtEl>
+                                        <p:attrNameLst>
+                                          <p:attrName>style.visibility</p:attrName>
+                                        </p:attrNameLst>
+                                      </p:cBhvr>
+                                      <p:to>
+                                        <p:strVal val="visible"/>
+                                      </p:to>
+                                    </p:set>
+                                    <p:animEffect transition="in" filter="fade">
+                                      <p:cBhvr>
+                                        <p:cTn id="28" dur="1000"/>
+                                        <p:tgtEl>
+                                          <p:spTgt spid="3">
+                                            <p:txEl>
+                                              <p:pRg st="2" end="2"/>
+                                            </p:txEl>
+                                          </p:spTgt>
+                                        </p:tgtEl>
+                                      </p:cBhvr>
+                                    </p:animEffect>
+                                    <p:anim calcmode="lin" valueType="num">
+                                      <p:cBhvr>
+                                        <p:cTn id="29" dur="1000" fill="hold"/>
+                                        <p:tgtEl>
+                                          <p:spTgt spid="3">
+                                            <p:txEl>
+                                              <p:pRg st="2" end="2"/>
+                                            </p:txEl>
+                                          </p:spTgt>
+                                        </p:tgtEl>
+                                        <p:attrNameLst>
+                                          <p:attrName>ppt_x</p:attrName>
+                                        </p:attrNameLst>
+                                      </p:cBhvr>
+                                      <p:tavLst>
+                                        <p:tav tm="0">
+                                          <p:val>
+                                            <p:strVal val="#ppt_x"/>
+                                          </p:val>
+                                        </p:tav>
+                                        <p:tav tm="100000">
+                                          <p:val>
+                                            <p:strVal val="#ppt_x"/>
+                                          </p:val>
+                                        </p:tav>
+                                      </p:tavLst>
+                                    </p:anim>
+                                    <p:anim calcmode="lin" valueType="num">
+                                      <p:cBhvr>
+                                        <p:cTn id="30" dur="1000" fill="hold"/>
+                                        <p:tgtEl>
+                                          <p:spTgt spid="3">
+                                            <p:txEl>
+                                              <p:pRg st="2" end="2"/>
+                                            </p:txEl>
+                                          </p:spTgt>
+                                        </p:tgtEl>
+                                        <p:attrNameLst>
+                                          <p:attrName>ppt_y</p:attrName>
+                                        </p:attrNameLst>
+                                      </p:cBhvr>
+                                      <p:tavLst>
+                                        <p:tav tm="0">
+                                          <p:val>
+                                            <p:strVal val="#ppt_y+.1"/>
+                                          </p:val>
+                                        </p:tav>
+                                        <p:tav tm="100000">
+                                          <p:val>
+                                            <p:strVal val="#ppt_y"/>
+                                          </p:val>
+                                        </p:tav>
+                                      </p:tavLst>
+                                    </p:anim>
+                                  </p:childTnLst>
+                                </p:cTn>
+                              </p:par>
+                            </p:childTnLst>
+                          </p:cTn>
+                        </p:par>
+                      </p:childTnLst>
+                    </p:cTn>
+                  </p:par>
+                  <p:par>
+                    <p:cTn id="31" fill="hold">
+                      <p:stCondLst>
+                        <p:cond delay="indefinite"/>
+                      </p:stCondLst>
+                      <p:childTnLst>
+                        <p:par>
+                          <p:cTn id="32" fill="hold">
+                            <p:stCondLst>
+                              <p:cond delay="0"/>
+                            </p:stCondLst>
+                            <p:childTnLst>
+                              <p:par>
+                                <p:cTn id="33" presetID="42" presetClass="entr" presetSubtype="0" fill="hold" nodeType="clickEffect">
+                                  <p:stCondLst>
+                                    <p:cond delay="0"/>
+                                  </p:stCondLst>
+                                  <p:childTnLst>
+                                    <p:set>
+                                      <p:cBhvr>
+                                        <p:cTn id="34" dur="1" fill="hold">
+                                          <p:stCondLst>
+                                            <p:cond delay="0"/>
+                                          </p:stCondLst>
+                                        </p:cTn>
+                                        <p:tgtEl>
+                                          <p:spTgt spid="3">
+                                            <p:txEl>
+                                              <p:pRg st="3" end="3"/>
+                                            </p:txEl>
+                                          </p:spTgt>
+                                        </p:tgtEl>
+                                        <p:attrNameLst>
+                                          <p:attrName>style.visibility</p:attrName>
+                                        </p:attrNameLst>
+                                      </p:cBhvr>
+                                      <p:to>
+                                        <p:strVal val="visible"/>
+                                      </p:to>
+                                    </p:set>
+                                    <p:animEffect transition="in" filter="fade">
+                                      <p:cBhvr>
+                                        <p:cTn id="35" dur="1000"/>
+                                        <p:tgtEl>
+                                          <p:spTgt spid="3">
+                                            <p:txEl>
+                                              <p:pRg st="3" end="3"/>
+                                            </p:txEl>
+                                          </p:spTgt>
+                                        </p:tgtEl>
+                                      </p:cBhvr>
+                                    </p:animEffect>
+                                    <p:anim calcmode="lin" valueType="num">
+                                      <p:cBhvr>
+                                        <p:cTn id="36" dur="1000" fill="hold"/>
+                                        <p:tgtEl>
+                                          <p:spTgt spid="3">
+                                            <p:txEl>
+                                              <p:pRg st="3" end="3"/>
+                                            </p:txEl>
+                                          </p:spTgt>
+                                        </p:tgtEl>
+                                        <p:attrNameLst>
+                                          <p:attrName>ppt_x</p:attrName>
+                                        </p:attrNameLst>
+                                      </p:cBhvr>
+                                      <p:tavLst>
+                                        <p:tav tm="0">
+                                          <p:val>
+                                            <p:strVal val="#ppt_x"/>
+                                          </p:val>
+                                        </p:tav>
+                                        <p:tav tm="100000">
+                                          <p:val>
+                                            <p:strVal val="#ppt_x"/>
+                                          </p:val>
+                                        </p:tav>
+                                      </p:tavLst>
+                                    </p:anim>
+                                    <p:anim calcmode="lin" valueType="num">
+                                      <p:cBhvr>
+                                        <p:cTn id="37" dur="1000" fill="hold"/>
+                                        <p:tgtEl>
+                                          <p:spTgt spid="3">
+                                            <p:txEl>
+                                              <p:pRg st="3" end="3"/>
+                                            </p:txEl>
+                                          </p:spTgt>
+                                        </p:tgtEl>
+                                        <p:attrNameLst>
+                                          <p:attrName>ppt_y</p:attrName>
+                                        </p:attrNameLst>
+                                      </p:cBhvr>
+                                      <p:tavLst>
+                                        <p:tav tm="0">
+                                          <p:val>
+                                            <p:strVal val="#ppt_y+.1"/>
+                                          </p:val>
+                                        </p:tav>
+                                        <p:tav tm="100000">
+                                          <p:val>
+                                            <p:strVal val="#ppt_y"/>
+                                          </p:val>
+                                        </p:tav>
+                                      </p:tavLst>
+                                    </p:anim>
+                                  </p:childTnLst>
+                                </p:cTn>
+                              </p:par>
+                            </p:childTnLst>
+                          </p:cTn>
+                        </p:par>
+                      </p:childTnLst>
+                    </p:cTn>
+                  </p:par>
+                  <p:par>
+                    <p:cTn id="38" fill="hold">
+                      <p:stCondLst>
+                        <p:cond delay="indefinite"/>
+                      </p:stCondLst>
+                      <p:childTnLst>
+                        <p:par>
+                          <p:cTn id="39" fill="hold">
+                            <p:stCondLst>
+                              <p:cond delay="0"/>
+                            </p:stCondLst>
+                            <p:childTnLst>
+                              <p:par>
+                                <p:cTn id="40" presetID="42" presetClass="entr" presetSubtype="0" fill="hold" nodeType="clickEffect">
+                                  <p:stCondLst>
+                                    <p:cond delay="0"/>
+                                  </p:stCondLst>
+                                  <p:childTnLst>
+                                    <p:set>
+                                      <p:cBhvr>
+                                        <p:cTn id="41" dur="1" fill="hold">
+                                          <p:stCondLst>
+                                            <p:cond delay="0"/>
+                                          </p:stCondLst>
+                                        </p:cTn>
+                                        <p:tgtEl>
+                                          <p:spTgt spid="5"/>
+                                        </p:tgtEl>
+                                        <p:attrNameLst>
+                                          <p:attrName>style.visibility</p:attrName>
+                                        </p:attrNameLst>
+                                      </p:cBhvr>
+                                      <p:to>
+                                        <p:strVal val="visible"/>
+                                      </p:to>
+                                    </p:set>
+                                    <p:animEffect transition="in" filter="fade">
+                                      <p:cBhvr>
+                                        <p:cTn id="42" dur="1000"/>
+                                        <p:tgtEl>
+                                          <p:spTgt spid="5"/>
+                                        </p:tgtEl>
+                                      </p:cBhvr>
+                                    </p:animEffect>
+                                    <p:anim calcmode="lin" valueType="num">
+                                      <p:cBhvr>
+                                        <p:cTn id="43" dur="1000" fill="hold"/>
+                                        <p:tgtEl>
+                                          <p:spTgt spid="5"/>
+                                        </p:tgtEl>
+                                        <p:attrNameLst>
+                                          <p:attrName>ppt_x</p:attrName>
+                                        </p:attrNameLst>
+                                      </p:cBhvr>
+                                      <p:tavLst>
+                                        <p:tav tm="0">
+                                          <p:val>
+                                            <p:strVal val="#ppt_x"/>
+                                          </p:val>
+                                        </p:tav>
+                                        <p:tav tm="100000">
+                                          <p:val>
+                                            <p:strVal val="#ppt_x"/>
+                                          </p:val>
+                                        </p:tav>
+                                      </p:tavLst>
+                                    </p:anim>
+                                    <p:anim calcmode="lin" valueType="num">
+                                      <p:cBhvr>
+                                        <p:cTn id="44" dur="1000" fill="hold"/>
+                                        <p:tgtEl>
+                                          <p:spTgt spid="5"/>
                                         </p:tgtEl>
                                         <p:attrNameLst>
                                           <p:attrName>ppt_y</p:attrName>
@@ -8808,7 +10192,12 @@
             <p:ph idx="1"/>
           </p:nvPr>
         </p:nvSpPr>
-        <p:spPr/>
+        <p:spPr>
+          <a:xfrm>
+            <a:off x="309228" y="1613142"/>
+            <a:ext cx="8946541" cy="4195481"/>
+          </a:xfrm>
+        </p:spPr>
         <p:txBody>
           <a:bodyPr>
             <a:normAutofit/>
@@ -8817,19 +10206,56 @@
           <a:p>
             <a:r>
               <a:rPr lang="lv-LV" sz="3000" dirty="0"/>
-              <a:t>Strādāju tik stundas</a:t>
-            </a:r>
-          </a:p>
-          <a:p>
+              <a:t>Java 17</a:t>
+            </a:r>
+          </a:p>
+          <a:p>
+            <a:r>
+              <a:rPr lang="lv-LV" sz="3000" dirty="0" err="1"/>
+              <a:t>Swing</a:t>
+            </a:r>
             <a:r>
               <a:rPr lang="lv-LV" sz="3000" dirty="0"/>
-              <a:t>Uzrakstīju tik koda rindiņas</a:t>
-            </a:r>
-          </a:p>
-          <a:p>
+              <a:t> GUI</a:t>
+            </a:r>
+          </a:p>
+          <a:p>
+            <a:r>
+              <a:rPr lang="lv-LV" sz="3000" dirty="0" err="1"/>
+              <a:t>Git</a:t>
+            </a:r>
             <a:r>
               <a:rPr lang="lv-LV" sz="3000" dirty="0"/>
-              <a:t>Veicu tik </a:t>
+              <a:t> versiju kontrole ar regulāriem </a:t>
+            </a:r>
+            <a:r>
+              <a:rPr lang="lv-LV" sz="3000" dirty="0" err="1"/>
+              <a:t>commit’iem</a:t>
+            </a:r>
+            <a:endParaRPr lang="lv-LV" sz="3000" dirty="0"/>
+          </a:p>
+          <a:p>
+            <a:pPr marL="0" indent="0">
+              <a:buNone/>
+            </a:pPr>
+            <a:endParaRPr lang="lv-LV" sz="3000" dirty="0"/>
+          </a:p>
+          <a:p>
+            <a:r>
+              <a:rPr lang="lv-LV" sz="3000" dirty="0"/>
+              <a:t>Strādāju ~3 pilnas dienas</a:t>
+            </a:r>
+          </a:p>
+          <a:p>
+            <a:r>
+              <a:rPr lang="lv-LV" sz="3000" dirty="0"/>
+              <a:t>Uzrakstīju ~450 koda rindiņas</a:t>
+            </a:r>
+          </a:p>
+          <a:p>
+            <a:r>
+              <a:rPr lang="lv-LV" sz="3000" dirty="0"/>
+              <a:t>Veicu 39 </a:t>
             </a:r>
             <a:r>
               <a:rPr lang="lv-LV" sz="3000" dirty="0" err="1"/>
@@ -8847,6 +10273,36 @@
           </a:p>
         </p:txBody>
       </p:sp>
+      <p:pic>
+        <p:nvPicPr>
+          <p:cNvPr id="5" name="Picture 4">
+            <a:extLst>
+              <a:ext uri="{FF2B5EF4-FFF2-40B4-BE49-F238E27FC236}">
+                <a16:creationId xmlns:a16="http://schemas.microsoft.com/office/drawing/2014/main" id="{0FE4A550-1661-4296-8DA2-F42B5A6EBCB7}"/>
+              </a:ext>
+            </a:extLst>
+          </p:cNvPr>
+          <p:cNvPicPr>
+            <a:picLocks noChangeAspect="1"/>
+          </p:cNvPicPr>
+          <p:nvPr/>
+        </p:nvPicPr>
+        <p:blipFill>
+          <a:blip r:embed="rId2"/>
+          <a:stretch>
+            <a:fillRect/>
+          </a:stretch>
+        </p:blipFill>
+        <p:spPr>
+          <a:xfrm>
+            <a:off x="6228502" y="3428999"/>
+            <a:ext cx="5887872" cy="3274422"/>
+          </a:xfrm>
+          <a:prstGeom prst="rect">
+            <a:avLst/>
+          </a:prstGeom>
+        </p:spPr>
+      </p:pic>
     </p:spTree>
     <p:extLst>
       <p:ext uri="{BB962C8B-B14F-4D97-AF65-F5344CB8AC3E}">
@@ -8857,6 +10313,9 @@
   <p:clrMapOvr>
     <a:masterClrMapping/>
   </p:clrMapOvr>
+  <p:transition spd="slow">
+    <p:wipe/>
+  </p:transition>
   <p:timing>
     <p:tnLst>
       <p:par>
@@ -8937,6 +10396,723 @@
                                         <p:cTn id="9" dur="1000" fill="hold"/>
                                         <p:tgtEl>
                                           <p:spTgt spid="2"/>
+                                        </p:tgtEl>
+                                        <p:attrNameLst>
+                                          <p:attrName>ppt_y</p:attrName>
+                                        </p:attrNameLst>
+                                      </p:cBhvr>
+                                      <p:tavLst>
+                                        <p:tav tm="0">
+                                          <p:val>
+                                            <p:strVal val="#ppt_y+.1"/>
+                                          </p:val>
+                                        </p:tav>
+                                        <p:tav tm="100000">
+                                          <p:val>
+                                            <p:strVal val="#ppt_y"/>
+                                          </p:val>
+                                        </p:tav>
+                                      </p:tavLst>
+                                    </p:anim>
+                                  </p:childTnLst>
+                                </p:cTn>
+                              </p:par>
+                            </p:childTnLst>
+                          </p:cTn>
+                        </p:par>
+                      </p:childTnLst>
+                    </p:cTn>
+                  </p:par>
+                  <p:par>
+                    <p:cTn id="10" fill="hold">
+                      <p:stCondLst>
+                        <p:cond delay="indefinite"/>
+                      </p:stCondLst>
+                      <p:childTnLst>
+                        <p:par>
+                          <p:cTn id="11" fill="hold">
+                            <p:stCondLst>
+                              <p:cond delay="0"/>
+                            </p:stCondLst>
+                            <p:childTnLst>
+                              <p:par>
+                                <p:cTn id="12" presetID="42" presetClass="entr" presetSubtype="0" fill="hold" nodeType="clickEffect">
+                                  <p:stCondLst>
+                                    <p:cond delay="0"/>
+                                  </p:stCondLst>
+                                  <p:childTnLst>
+                                    <p:set>
+                                      <p:cBhvr>
+                                        <p:cTn id="13" dur="1" fill="hold">
+                                          <p:stCondLst>
+                                            <p:cond delay="0"/>
+                                          </p:stCondLst>
+                                        </p:cTn>
+                                        <p:tgtEl>
+                                          <p:spTgt spid="5"/>
+                                        </p:tgtEl>
+                                        <p:attrNameLst>
+                                          <p:attrName>style.visibility</p:attrName>
+                                        </p:attrNameLst>
+                                      </p:cBhvr>
+                                      <p:to>
+                                        <p:strVal val="visible"/>
+                                      </p:to>
+                                    </p:set>
+                                    <p:animEffect transition="in" filter="fade">
+                                      <p:cBhvr>
+                                        <p:cTn id="14" dur="1000"/>
+                                        <p:tgtEl>
+                                          <p:spTgt spid="5"/>
+                                        </p:tgtEl>
+                                      </p:cBhvr>
+                                    </p:animEffect>
+                                    <p:anim calcmode="lin" valueType="num">
+                                      <p:cBhvr>
+                                        <p:cTn id="15" dur="1000" fill="hold"/>
+                                        <p:tgtEl>
+                                          <p:spTgt spid="5"/>
+                                        </p:tgtEl>
+                                        <p:attrNameLst>
+                                          <p:attrName>ppt_x</p:attrName>
+                                        </p:attrNameLst>
+                                      </p:cBhvr>
+                                      <p:tavLst>
+                                        <p:tav tm="0">
+                                          <p:val>
+                                            <p:strVal val="#ppt_x"/>
+                                          </p:val>
+                                        </p:tav>
+                                        <p:tav tm="100000">
+                                          <p:val>
+                                            <p:strVal val="#ppt_x"/>
+                                          </p:val>
+                                        </p:tav>
+                                      </p:tavLst>
+                                    </p:anim>
+                                    <p:anim calcmode="lin" valueType="num">
+                                      <p:cBhvr>
+                                        <p:cTn id="16" dur="1000" fill="hold"/>
+                                        <p:tgtEl>
+                                          <p:spTgt spid="5"/>
+                                        </p:tgtEl>
+                                        <p:attrNameLst>
+                                          <p:attrName>ppt_y</p:attrName>
+                                        </p:attrNameLst>
+                                      </p:cBhvr>
+                                      <p:tavLst>
+                                        <p:tav tm="0">
+                                          <p:val>
+                                            <p:strVal val="#ppt_y+.1"/>
+                                          </p:val>
+                                        </p:tav>
+                                        <p:tav tm="100000">
+                                          <p:val>
+                                            <p:strVal val="#ppt_y"/>
+                                          </p:val>
+                                        </p:tav>
+                                      </p:tavLst>
+                                    </p:anim>
+                                  </p:childTnLst>
+                                </p:cTn>
+                              </p:par>
+                            </p:childTnLst>
+                          </p:cTn>
+                        </p:par>
+                      </p:childTnLst>
+                    </p:cTn>
+                  </p:par>
+                  <p:par>
+                    <p:cTn id="17" fill="hold">
+                      <p:stCondLst>
+                        <p:cond delay="indefinite"/>
+                      </p:stCondLst>
+                      <p:childTnLst>
+                        <p:par>
+                          <p:cTn id="18" fill="hold">
+                            <p:stCondLst>
+                              <p:cond delay="0"/>
+                            </p:stCondLst>
+                            <p:childTnLst>
+                              <p:par>
+                                <p:cTn id="19" presetID="42" presetClass="entr" presetSubtype="0" fill="hold" nodeType="clickEffect">
+                                  <p:stCondLst>
+                                    <p:cond delay="0"/>
+                                  </p:stCondLst>
+                                  <p:childTnLst>
+                                    <p:set>
+                                      <p:cBhvr>
+                                        <p:cTn id="20" dur="1" fill="hold">
+                                          <p:stCondLst>
+                                            <p:cond delay="0"/>
+                                          </p:stCondLst>
+                                        </p:cTn>
+                                        <p:tgtEl>
+                                          <p:spTgt spid="3">
+                                            <p:txEl>
+                                              <p:pRg st="0" end="0"/>
+                                            </p:txEl>
+                                          </p:spTgt>
+                                        </p:tgtEl>
+                                        <p:attrNameLst>
+                                          <p:attrName>style.visibility</p:attrName>
+                                        </p:attrNameLst>
+                                      </p:cBhvr>
+                                      <p:to>
+                                        <p:strVal val="visible"/>
+                                      </p:to>
+                                    </p:set>
+                                    <p:animEffect transition="in" filter="fade">
+                                      <p:cBhvr>
+                                        <p:cTn id="21" dur="1000"/>
+                                        <p:tgtEl>
+                                          <p:spTgt spid="3">
+                                            <p:txEl>
+                                              <p:pRg st="0" end="0"/>
+                                            </p:txEl>
+                                          </p:spTgt>
+                                        </p:tgtEl>
+                                      </p:cBhvr>
+                                    </p:animEffect>
+                                    <p:anim calcmode="lin" valueType="num">
+                                      <p:cBhvr>
+                                        <p:cTn id="22" dur="1000" fill="hold"/>
+                                        <p:tgtEl>
+                                          <p:spTgt spid="3">
+                                            <p:txEl>
+                                              <p:pRg st="0" end="0"/>
+                                            </p:txEl>
+                                          </p:spTgt>
+                                        </p:tgtEl>
+                                        <p:attrNameLst>
+                                          <p:attrName>ppt_x</p:attrName>
+                                        </p:attrNameLst>
+                                      </p:cBhvr>
+                                      <p:tavLst>
+                                        <p:tav tm="0">
+                                          <p:val>
+                                            <p:strVal val="#ppt_x"/>
+                                          </p:val>
+                                        </p:tav>
+                                        <p:tav tm="100000">
+                                          <p:val>
+                                            <p:strVal val="#ppt_x"/>
+                                          </p:val>
+                                        </p:tav>
+                                      </p:tavLst>
+                                    </p:anim>
+                                    <p:anim calcmode="lin" valueType="num">
+                                      <p:cBhvr>
+                                        <p:cTn id="23" dur="1000" fill="hold"/>
+                                        <p:tgtEl>
+                                          <p:spTgt spid="3">
+                                            <p:txEl>
+                                              <p:pRg st="0" end="0"/>
+                                            </p:txEl>
+                                          </p:spTgt>
+                                        </p:tgtEl>
+                                        <p:attrNameLst>
+                                          <p:attrName>ppt_y</p:attrName>
+                                        </p:attrNameLst>
+                                      </p:cBhvr>
+                                      <p:tavLst>
+                                        <p:tav tm="0">
+                                          <p:val>
+                                            <p:strVal val="#ppt_y+.1"/>
+                                          </p:val>
+                                        </p:tav>
+                                        <p:tav tm="100000">
+                                          <p:val>
+                                            <p:strVal val="#ppt_y"/>
+                                          </p:val>
+                                        </p:tav>
+                                      </p:tavLst>
+                                    </p:anim>
+                                  </p:childTnLst>
+                                </p:cTn>
+                              </p:par>
+                              <p:par>
+                                <p:cTn id="24" presetID="42" presetClass="entr" presetSubtype="0" fill="hold" nodeType="withEffect">
+                                  <p:stCondLst>
+                                    <p:cond delay="0"/>
+                                  </p:stCondLst>
+                                  <p:childTnLst>
+                                    <p:set>
+                                      <p:cBhvr>
+                                        <p:cTn id="25" dur="1" fill="hold">
+                                          <p:stCondLst>
+                                            <p:cond delay="0"/>
+                                          </p:stCondLst>
+                                        </p:cTn>
+                                        <p:tgtEl>
+                                          <p:spTgt spid="3">
+                                            <p:txEl>
+                                              <p:pRg st="1" end="1"/>
+                                            </p:txEl>
+                                          </p:spTgt>
+                                        </p:tgtEl>
+                                        <p:attrNameLst>
+                                          <p:attrName>style.visibility</p:attrName>
+                                        </p:attrNameLst>
+                                      </p:cBhvr>
+                                      <p:to>
+                                        <p:strVal val="visible"/>
+                                      </p:to>
+                                    </p:set>
+                                    <p:animEffect transition="in" filter="fade">
+                                      <p:cBhvr>
+                                        <p:cTn id="26" dur="1000"/>
+                                        <p:tgtEl>
+                                          <p:spTgt spid="3">
+                                            <p:txEl>
+                                              <p:pRg st="1" end="1"/>
+                                            </p:txEl>
+                                          </p:spTgt>
+                                        </p:tgtEl>
+                                      </p:cBhvr>
+                                    </p:animEffect>
+                                    <p:anim calcmode="lin" valueType="num">
+                                      <p:cBhvr>
+                                        <p:cTn id="27" dur="1000" fill="hold"/>
+                                        <p:tgtEl>
+                                          <p:spTgt spid="3">
+                                            <p:txEl>
+                                              <p:pRg st="1" end="1"/>
+                                            </p:txEl>
+                                          </p:spTgt>
+                                        </p:tgtEl>
+                                        <p:attrNameLst>
+                                          <p:attrName>ppt_x</p:attrName>
+                                        </p:attrNameLst>
+                                      </p:cBhvr>
+                                      <p:tavLst>
+                                        <p:tav tm="0">
+                                          <p:val>
+                                            <p:strVal val="#ppt_x"/>
+                                          </p:val>
+                                        </p:tav>
+                                        <p:tav tm="100000">
+                                          <p:val>
+                                            <p:strVal val="#ppt_x"/>
+                                          </p:val>
+                                        </p:tav>
+                                      </p:tavLst>
+                                    </p:anim>
+                                    <p:anim calcmode="lin" valueType="num">
+                                      <p:cBhvr>
+                                        <p:cTn id="28" dur="1000" fill="hold"/>
+                                        <p:tgtEl>
+                                          <p:spTgt spid="3">
+                                            <p:txEl>
+                                              <p:pRg st="1" end="1"/>
+                                            </p:txEl>
+                                          </p:spTgt>
+                                        </p:tgtEl>
+                                        <p:attrNameLst>
+                                          <p:attrName>ppt_y</p:attrName>
+                                        </p:attrNameLst>
+                                      </p:cBhvr>
+                                      <p:tavLst>
+                                        <p:tav tm="0">
+                                          <p:val>
+                                            <p:strVal val="#ppt_y+.1"/>
+                                          </p:val>
+                                        </p:tav>
+                                        <p:tav tm="100000">
+                                          <p:val>
+                                            <p:strVal val="#ppt_y"/>
+                                          </p:val>
+                                        </p:tav>
+                                      </p:tavLst>
+                                    </p:anim>
+                                  </p:childTnLst>
+                                </p:cTn>
+                              </p:par>
+                              <p:par>
+                                <p:cTn id="29" presetID="42" presetClass="entr" presetSubtype="0" fill="hold" nodeType="withEffect">
+                                  <p:stCondLst>
+                                    <p:cond delay="0"/>
+                                  </p:stCondLst>
+                                  <p:childTnLst>
+                                    <p:set>
+                                      <p:cBhvr>
+                                        <p:cTn id="30" dur="1" fill="hold">
+                                          <p:stCondLst>
+                                            <p:cond delay="0"/>
+                                          </p:stCondLst>
+                                        </p:cTn>
+                                        <p:tgtEl>
+                                          <p:spTgt spid="3">
+                                            <p:txEl>
+                                              <p:pRg st="2" end="2"/>
+                                            </p:txEl>
+                                          </p:spTgt>
+                                        </p:tgtEl>
+                                        <p:attrNameLst>
+                                          <p:attrName>style.visibility</p:attrName>
+                                        </p:attrNameLst>
+                                      </p:cBhvr>
+                                      <p:to>
+                                        <p:strVal val="visible"/>
+                                      </p:to>
+                                    </p:set>
+                                    <p:animEffect transition="in" filter="fade">
+                                      <p:cBhvr>
+                                        <p:cTn id="31" dur="1000"/>
+                                        <p:tgtEl>
+                                          <p:spTgt spid="3">
+                                            <p:txEl>
+                                              <p:pRg st="2" end="2"/>
+                                            </p:txEl>
+                                          </p:spTgt>
+                                        </p:tgtEl>
+                                      </p:cBhvr>
+                                    </p:animEffect>
+                                    <p:anim calcmode="lin" valueType="num">
+                                      <p:cBhvr>
+                                        <p:cTn id="32" dur="1000" fill="hold"/>
+                                        <p:tgtEl>
+                                          <p:spTgt spid="3">
+                                            <p:txEl>
+                                              <p:pRg st="2" end="2"/>
+                                            </p:txEl>
+                                          </p:spTgt>
+                                        </p:tgtEl>
+                                        <p:attrNameLst>
+                                          <p:attrName>ppt_x</p:attrName>
+                                        </p:attrNameLst>
+                                      </p:cBhvr>
+                                      <p:tavLst>
+                                        <p:tav tm="0">
+                                          <p:val>
+                                            <p:strVal val="#ppt_x"/>
+                                          </p:val>
+                                        </p:tav>
+                                        <p:tav tm="100000">
+                                          <p:val>
+                                            <p:strVal val="#ppt_x"/>
+                                          </p:val>
+                                        </p:tav>
+                                      </p:tavLst>
+                                    </p:anim>
+                                    <p:anim calcmode="lin" valueType="num">
+                                      <p:cBhvr>
+                                        <p:cTn id="33" dur="1000" fill="hold"/>
+                                        <p:tgtEl>
+                                          <p:spTgt spid="3">
+                                            <p:txEl>
+                                              <p:pRg st="2" end="2"/>
+                                            </p:txEl>
+                                          </p:spTgt>
+                                        </p:tgtEl>
+                                        <p:attrNameLst>
+                                          <p:attrName>ppt_y</p:attrName>
+                                        </p:attrNameLst>
+                                      </p:cBhvr>
+                                      <p:tavLst>
+                                        <p:tav tm="0">
+                                          <p:val>
+                                            <p:strVal val="#ppt_y+.1"/>
+                                          </p:val>
+                                        </p:tav>
+                                        <p:tav tm="100000">
+                                          <p:val>
+                                            <p:strVal val="#ppt_y"/>
+                                          </p:val>
+                                        </p:tav>
+                                      </p:tavLst>
+                                    </p:anim>
+                                  </p:childTnLst>
+                                </p:cTn>
+                              </p:par>
+                            </p:childTnLst>
+                          </p:cTn>
+                        </p:par>
+                      </p:childTnLst>
+                    </p:cTn>
+                  </p:par>
+                  <p:par>
+                    <p:cTn id="34" fill="hold">
+                      <p:stCondLst>
+                        <p:cond delay="indefinite"/>
+                      </p:stCondLst>
+                      <p:childTnLst>
+                        <p:par>
+                          <p:cTn id="35" fill="hold">
+                            <p:stCondLst>
+                              <p:cond delay="0"/>
+                            </p:stCondLst>
+                            <p:childTnLst>
+                              <p:par>
+                                <p:cTn id="36" presetID="42" presetClass="entr" presetSubtype="0" fill="hold" nodeType="clickEffect">
+                                  <p:stCondLst>
+                                    <p:cond delay="0"/>
+                                  </p:stCondLst>
+                                  <p:childTnLst>
+                                    <p:set>
+                                      <p:cBhvr>
+                                        <p:cTn id="37" dur="1" fill="hold">
+                                          <p:stCondLst>
+                                            <p:cond delay="0"/>
+                                          </p:stCondLst>
+                                        </p:cTn>
+                                        <p:tgtEl>
+                                          <p:spTgt spid="3">
+                                            <p:txEl>
+                                              <p:pRg st="4" end="4"/>
+                                            </p:txEl>
+                                          </p:spTgt>
+                                        </p:tgtEl>
+                                        <p:attrNameLst>
+                                          <p:attrName>style.visibility</p:attrName>
+                                        </p:attrNameLst>
+                                      </p:cBhvr>
+                                      <p:to>
+                                        <p:strVal val="visible"/>
+                                      </p:to>
+                                    </p:set>
+                                    <p:animEffect transition="in" filter="fade">
+                                      <p:cBhvr>
+                                        <p:cTn id="38" dur="1000"/>
+                                        <p:tgtEl>
+                                          <p:spTgt spid="3">
+                                            <p:txEl>
+                                              <p:pRg st="4" end="4"/>
+                                            </p:txEl>
+                                          </p:spTgt>
+                                        </p:tgtEl>
+                                      </p:cBhvr>
+                                    </p:animEffect>
+                                    <p:anim calcmode="lin" valueType="num">
+                                      <p:cBhvr>
+                                        <p:cTn id="39" dur="1000" fill="hold"/>
+                                        <p:tgtEl>
+                                          <p:spTgt spid="3">
+                                            <p:txEl>
+                                              <p:pRg st="4" end="4"/>
+                                            </p:txEl>
+                                          </p:spTgt>
+                                        </p:tgtEl>
+                                        <p:attrNameLst>
+                                          <p:attrName>ppt_x</p:attrName>
+                                        </p:attrNameLst>
+                                      </p:cBhvr>
+                                      <p:tavLst>
+                                        <p:tav tm="0">
+                                          <p:val>
+                                            <p:strVal val="#ppt_x"/>
+                                          </p:val>
+                                        </p:tav>
+                                        <p:tav tm="100000">
+                                          <p:val>
+                                            <p:strVal val="#ppt_x"/>
+                                          </p:val>
+                                        </p:tav>
+                                      </p:tavLst>
+                                    </p:anim>
+                                    <p:anim calcmode="lin" valueType="num">
+                                      <p:cBhvr>
+                                        <p:cTn id="40" dur="1000" fill="hold"/>
+                                        <p:tgtEl>
+                                          <p:spTgt spid="3">
+                                            <p:txEl>
+                                              <p:pRg st="4" end="4"/>
+                                            </p:txEl>
+                                          </p:spTgt>
+                                        </p:tgtEl>
+                                        <p:attrNameLst>
+                                          <p:attrName>ppt_y</p:attrName>
+                                        </p:attrNameLst>
+                                      </p:cBhvr>
+                                      <p:tavLst>
+                                        <p:tav tm="0">
+                                          <p:val>
+                                            <p:strVal val="#ppt_y+.1"/>
+                                          </p:val>
+                                        </p:tav>
+                                        <p:tav tm="100000">
+                                          <p:val>
+                                            <p:strVal val="#ppt_y"/>
+                                          </p:val>
+                                        </p:tav>
+                                      </p:tavLst>
+                                    </p:anim>
+                                  </p:childTnLst>
+                                </p:cTn>
+                              </p:par>
+                              <p:par>
+                                <p:cTn id="41" presetID="42" presetClass="entr" presetSubtype="0" fill="hold" nodeType="withEffect">
+                                  <p:stCondLst>
+                                    <p:cond delay="0"/>
+                                  </p:stCondLst>
+                                  <p:childTnLst>
+                                    <p:set>
+                                      <p:cBhvr>
+                                        <p:cTn id="42" dur="1" fill="hold">
+                                          <p:stCondLst>
+                                            <p:cond delay="0"/>
+                                          </p:stCondLst>
+                                        </p:cTn>
+                                        <p:tgtEl>
+                                          <p:spTgt spid="3">
+                                            <p:txEl>
+                                              <p:pRg st="5" end="5"/>
+                                            </p:txEl>
+                                          </p:spTgt>
+                                        </p:tgtEl>
+                                        <p:attrNameLst>
+                                          <p:attrName>style.visibility</p:attrName>
+                                        </p:attrNameLst>
+                                      </p:cBhvr>
+                                      <p:to>
+                                        <p:strVal val="visible"/>
+                                      </p:to>
+                                    </p:set>
+                                    <p:animEffect transition="in" filter="fade">
+                                      <p:cBhvr>
+                                        <p:cTn id="43" dur="1000"/>
+                                        <p:tgtEl>
+                                          <p:spTgt spid="3">
+                                            <p:txEl>
+                                              <p:pRg st="5" end="5"/>
+                                            </p:txEl>
+                                          </p:spTgt>
+                                        </p:tgtEl>
+                                      </p:cBhvr>
+                                    </p:animEffect>
+                                    <p:anim calcmode="lin" valueType="num">
+                                      <p:cBhvr>
+                                        <p:cTn id="44" dur="1000" fill="hold"/>
+                                        <p:tgtEl>
+                                          <p:spTgt spid="3">
+                                            <p:txEl>
+                                              <p:pRg st="5" end="5"/>
+                                            </p:txEl>
+                                          </p:spTgt>
+                                        </p:tgtEl>
+                                        <p:attrNameLst>
+                                          <p:attrName>ppt_x</p:attrName>
+                                        </p:attrNameLst>
+                                      </p:cBhvr>
+                                      <p:tavLst>
+                                        <p:tav tm="0">
+                                          <p:val>
+                                            <p:strVal val="#ppt_x"/>
+                                          </p:val>
+                                        </p:tav>
+                                        <p:tav tm="100000">
+                                          <p:val>
+                                            <p:strVal val="#ppt_x"/>
+                                          </p:val>
+                                        </p:tav>
+                                      </p:tavLst>
+                                    </p:anim>
+                                    <p:anim calcmode="lin" valueType="num">
+                                      <p:cBhvr>
+                                        <p:cTn id="45" dur="1000" fill="hold"/>
+                                        <p:tgtEl>
+                                          <p:spTgt spid="3">
+                                            <p:txEl>
+                                              <p:pRg st="5" end="5"/>
+                                            </p:txEl>
+                                          </p:spTgt>
+                                        </p:tgtEl>
+                                        <p:attrNameLst>
+                                          <p:attrName>ppt_y</p:attrName>
+                                        </p:attrNameLst>
+                                      </p:cBhvr>
+                                      <p:tavLst>
+                                        <p:tav tm="0">
+                                          <p:val>
+                                            <p:strVal val="#ppt_y+.1"/>
+                                          </p:val>
+                                        </p:tav>
+                                        <p:tav tm="100000">
+                                          <p:val>
+                                            <p:strVal val="#ppt_y"/>
+                                          </p:val>
+                                        </p:tav>
+                                      </p:tavLst>
+                                    </p:anim>
+                                  </p:childTnLst>
+                                </p:cTn>
+                              </p:par>
+                              <p:par>
+                                <p:cTn id="46" presetID="42" presetClass="entr" presetSubtype="0" fill="hold" nodeType="withEffect">
+                                  <p:stCondLst>
+                                    <p:cond delay="0"/>
+                                  </p:stCondLst>
+                                  <p:childTnLst>
+                                    <p:set>
+                                      <p:cBhvr>
+                                        <p:cTn id="47" dur="1" fill="hold">
+                                          <p:stCondLst>
+                                            <p:cond delay="0"/>
+                                          </p:stCondLst>
+                                        </p:cTn>
+                                        <p:tgtEl>
+                                          <p:spTgt spid="3">
+                                            <p:txEl>
+                                              <p:pRg st="6" end="6"/>
+                                            </p:txEl>
+                                          </p:spTgt>
+                                        </p:tgtEl>
+                                        <p:attrNameLst>
+                                          <p:attrName>style.visibility</p:attrName>
+                                        </p:attrNameLst>
+                                      </p:cBhvr>
+                                      <p:to>
+                                        <p:strVal val="visible"/>
+                                      </p:to>
+                                    </p:set>
+                                    <p:animEffect transition="in" filter="fade">
+                                      <p:cBhvr>
+                                        <p:cTn id="48" dur="1000"/>
+                                        <p:tgtEl>
+                                          <p:spTgt spid="3">
+                                            <p:txEl>
+                                              <p:pRg st="6" end="6"/>
+                                            </p:txEl>
+                                          </p:spTgt>
+                                        </p:tgtEl>
+                                      </p:cBhvr>
+                                    </p:animEffect>
+                                    <p:anim calcmode="lin" valueType="num">
+                                      <p:cBhvr>
+                                        <p:cTn id="49" dur="1000" fill="hold"/>
+                                        <p:tgtEl>
+                                          <p:spTgt spid="3">
+                                            <p:txEl>
+                                              <p:pRg st="6" end="6"/>
+                                            </p:txEl>
+                                          </p:spTgt>
+                                        </p:tgtEl>
+                                        <p:attrNameLst>
+                                          <p:attrName>ppt_x</p:attrName>
+                                        </p:attrNameLst>
+                                      </p:cBhvr>
+                                      <p:tavLst>
+                                        <p:tav tm="0">
+                                          <p:val>
+                                            <p:strVal val="#ppt_x"/>
+                                          </p:val>
+                                        </p:tav>
+                                        <p:tav tm="100000">
+                                          <p:val>
+                                            <p:strVal val="#ppt_x"/>
+                                          </p:val>
+                                        </p:tav>
+                                      </p:tavLst>
+                                    </p:anim>
+                                    <p:anim calcmode="lin" valueType="num">
+                                      <p:cBhvr>
+                                        <p:cTn id="50" dur="1000" fill="hold"/>
+                                        <p:tgtEl>
+                                          <p:spTgt spid="3">
+                                            <p:txEl>
+                                              <p:pRg st="6" end="6"/>
+                                            </p:txEl>
+                                          </p:spTgt>
                                         </p:tgtEl>
                                         <p:attrNameLst>
                                           <p:attrName>ppt_y</p:attrName>
@@ -9121,6 +11297,14 @@
             </a:r>
             <a:r>
               <a:rPr lang="lv-LV" dirty="0"/>
+              <a:t> un </a:t>
+            </a:r>
+            <a:r>
+              <a:rPr lang="lv-LV" dirty="0" err="1"/>
+              <a:t>Reddit</a:t>
+            </a:r>
+            <a:r>
+              <a:rPr lang="lv-LV" dirty="0"/>
               <a:t> – programmas funkcionalitāte, problēmu risināšana: </a:t>
             </a:r>
             <a:r>
@@ -9128,6 +11312,16 @@
                 <a:hlinkClick r:id="rId5"/>
               </a:rPr>
               <a:t>https://stackoverflow.com</a:t>
+            </a:r>
+            <a:r>
+              <a:rPr lang="lv-LV" dirty="0"/>
+              <a:t>, </a:t>
+            </a:r>
+            <a:r>
+              <a:rPr lang="lv-LV" dirty="0">
+                <a:hlinkClick r:id="rId6"/>
+              </a:rPr>
+              <a:t>https://www.reddit.com</a:t>
             </a:r>
             <a:endParaRPr lang="lv-LV" dirty="0"/>
           </a:p>
@@ -9146,6 +11340,1056 @@
   <p:clrMapOvr>
     <a:masterClrMapping/>
   </p:clrMapOvr>
+  <p:transition spd="slow">
+    <p:wipe/>
+  </p:transition>
+  <p:timing>
+    <p:tnLst>
+      <p:par>
+        <p:cTn id="1" dur="indefinite" restart="never" nodeType="tmRoot">
+          <p:childTnLst>
+            <p:seq concurrent="1" nextAc="seek">
+              <p:cTn id="2" dur="indefinite" nodeType="mainSeq">
+                <p:childTnLst>
+                  <p:par>
+                    <p:cTn id="3" fill="hold">
+                      <p:stCondLst>
+                        <p:cond delay="indefinite"/>
+                      </p:stCondLst>
+                      <p:childTnLst>
+                        <p:par>
+                          <p:cTn id="4" fill="hold">
+                            <p:stCondLst>
+                              <p:cond delay="0"/>
+                            </p:stCondLst>
+                            <p:childTnLst>
+                              <p:par>
+                                <p:cTn id="5" presetID="42" presetClass="entr" presetSubtype="0" fill="hold" grpId="0" nodeType="clickEffect">
+                                  <p:stCondLst>
+                                    <p:cond delay="0"/>
+                                  </p:stCondLst>
+                                  <p:childTnLst>
+                                    <p:set>
+                                      <p:cBhvr>
+                                        <p:cTn id="6" dur="1" fill="hold">
+                                          <p:stCondLst>
+                                            <p:cond delay="0"/>
+                                          </p:stCondLst>
+                                        </p:cTn>
+                                        <p:tgtEl>
+                                          <p:spTgt spid="2"/>
+                                        </p:tgtEl>
+                                        <p:attrNameLst>
+                                          <p:attrName>style.visibility</p:attrName>
+                                        </p:attrNameLst>
+                                      </p:cBhvr>
+                                      <p:to>
+                                        <p:strVal val="visible"/>
+                                      </p:to>
+                                    </p:set>
+                                    <p:animEffect transition="in" filter="fade">
+                                      <p:cBhvr>
+                                        <p:cTn id="7" dur="1000"/>
+                                        <p:tgtEl>
+                                          <p:spTgt spid="2"/>
+                                        </p:tgtEl>
+                                      </p:cBhvr>
+                                    </p:animEffect>
+                                    <p:anim calcmode="lin" valueType="num">
+                                      <p:cBhvr>
+                                        <p:cTn id="8" dur="1000" fill="hold"/>
+                                        <p:tgtEl>
+                                          <p:spTgt spid="2"/>
+                                        </p:tgtEl>
+                                        <p:attrNameLst>
+                                          <p:attrName>ppt_x</p:attrName>
+                                        </p:attrNameLst>
+                                      </p:cBhvr>
+                                      <p:tavLst>
+                                        <p:tav tm="0">
+                                          <p:val>
+                                            <p:strVal val="#ppt_x"/>
+                                          </p:val>
+                                        </p:tav>
+                                        <p:tav tm="100000">
+                                          <p:val>
+                                            <p:strVal val="#ppt_x"/>
+                                          </p:val>
+                                        </p:tav>
+                                      </p:tavLst>
+                                    </p:anim>
+                                    <p:anim calcmode="lin" valueType="num">
+                                      <p:cBhvr>
+                                        <p:cTn id="9" dur="1000" fill="hold"/>
+                                        <p:tgtEl>
+                                          <p:spTgt spid="2"/>
+                                        </p:tgtEl>
+                                        <p:attrNameLst>
+                                          <p:attrName>ppt_y</p:attrName>
+                                        </p:attrNameLst>
+                                      </p:cBhvr>
+                                      <p:tavLst>
+                                        <p:tav tm="0">
+                                          <p:val>
+                                            <p:strVal val="#ppt_y+.1"/>
+                                          </p:val>
+                                        </p:tav>
+                                        <p:tav tm="100000">
+                                          <p:val>
+                                            <p:strVal val="#ppt_y"/>
+                                          </p:val>
+                                        </p:tav>
+                                      </p:tavLst>
+                                    </p:anim>
+                                  </p:childTnLst>
+                                </p:cTn>
+                              </p:par>
+                            </p:childTnLst>
+                          </p:cTn>
+                        </p:par>
+                      </p:childTnLst>
+                    </p:cTn>
+                  </p:par>
+                  <p:par>
+                    <p:cTn id="10" fill="hold">
+                      <p:stCondLst>
+                        <p:cond delay="indefinite"/>
+                      </p:stCondLst>
+                      <p:childTnLst>
+                        <p:par>
+                          <p:cTn id="11" fill="hold">
+                            <p:stCondLst>
+                              <p:cond delay="0"/>
+                            </p:stCondLst>
+                            <p:childTnLst>
+                              <p:par>
+                                <p:cTn id="12" presetID="42" presetClass="entr" presetSubtype="0" fill="hold" grpId="0" nodeType="clickEffect">
+                                  <p:stCondLst>
+                                    <p:cond delay="0"/>
+                                  </p:stCondLst>
+                                  <p:childTnLst>
+                                    <p:set>
+                                      <p:cBhvr>
+                                        <p:cTn id="13" dur="1" fill="hold">
+                                          <p:stCondLst>
+                                            <p:cond delay="0"/>
+                                          </p:stCondLst>
+                                        </p:cTn>
+                                        <p:tgtEl>
+                                          <p:spTgt spid="3">
+                                            <p:txEl>
+                                              <p:pRg st="0" end="0"/>
+                                            </p:txEl>
+                                          </p:spTgt>
+                                        </p:tgtEl>
+                                        <p:attrNameLst>
+                                          <p:attrName>style.visibility</p:attrName>
+                                        </p:attrNameLst>
+                                      </p:cBhvr>
+                                      <p:to>
+                                        <p:strVal val="visible"/>
+                                      </p:to>
+                                    </p:set>
+                                    <p:animEffect transition="in" filter="fade">
+                                      <p:cBhvr>
+                                        <p:cTn id="14" dur="1000"/>
+                                        <p:tgtEl>
+                                          <p:spTgt spid="3">
+                                            <p:txEl>
+                                              <p:pRg st="0" end="0"/>
+                                            </p:txEl>
+                                          </p:spTgt>
+                                        </p:tgtEl>
+                                      </p:cBhvr>
+                                    </p:animEffect>
+                                    <p:anim calcmode="lin" valueType="num">
+                                      <p:cBhvr>
+                                        <p:cTn id="15" dur="1000" fill="hold"/>
+                                        <p:tgtEl>
+                                          <p:spTgt spid="3">
+                                            <p:txEl>
+                                              <p:pRg st="0" end="0"/>
+                                            </p:txEl>
+                                          </p:spTgt>
+                                        </p:tgtEl>
+                                        <p:attrNameLst>
+                                          <p:attrName>ppt_x</p:attrName>
+                                        </p:attrNameLst>
+                                      </p:cBhvr>
+                                      <p:tavLst>
+                                        <p:tav tm="0">
+                                          <p:val>
+                                            <p:strVal val="#ppt_x"/>
+                                          </p:val>
+                                        </p:tav>
+                                        <p:tav tm="100000">
+                                          <p:val>
+                                            <p:strVal val="#ppt_x"/>
+                                          </p:val>
+                                        </p:tav>
+                                      </p:tavLst>
+                                    </p:anim>
+                                    <p:anim calcmode="lin" valueType="num">
+                                      <p:cBhvr>
+                                        <p:cTn id="16" dur="1000" fill="hold"/>
+                                        <p:tgtEl>
+                                          <p:spTgt spid="3">
+                                            <p:txEl>
+                                              <p:pRg st="0" end="0"/>
+                                            </p:txEl>
+                                          </p:spTgt>
+                                        </p:tgtEl>
+                                        <p:attrNameLst>
+                                          <p:attrName>ppt_y</p:attrName>
+                                        </p:attrNameLst>
+                                      </p:cBhvr>
+                                      <p:tavLst>
+                                        <p:tav tm="0">
+                                          <p:val>
+                                            <p:strVal val="#ppt_y+.1"/>
+                                          </p:val>
+                                        </p:tav>
+                                        <p:tav tm="100000">
+                                          <p:val>
+                                            <p:strVal val="#ppt_y"/>
+                                          </p:val>
+                                        </p:tav>
+                                      </p:tavLst>
+                                    </p:anim>
+                                  </p:childTnLst>
+                                </p:cTn>
+                              </p:par>
+                            </p:childTnLst>
+                          </p:cTn>
+                        </p:par>
+                      </p:childTnLst>
+                    </p:cTn>
+                  </p:par>
+                  <p:par>
+                    <p:cTn id="17" fill="hold">
+                      <p:stCondLst>
+                        <p:cond delay="indefinite"/>
+                      </p:stCondLst>
+                      <p:childTnLst>
+                        <p:par>
+                          <p:cTn id="18" fill="hold">
+                            <p:stCondLst>
+                              <p:cond delay="0"/>
+                            </p:stCondLst>
+                            <p:childTnLst>
+                              <p:par>
+                                <p:cTn id="19" presetID="42" presetClass="entr" presetSubtype="0" fill="hold" grpId="0" nodeType="clickEffect">
+                                  <p:stCondLst>
+                                    <p:cond delay="0"/>
+                                  </p:stCondLst>
+                                  <p:childTnLst>
+                                    <p:set>
+                                      <p:cBhvr>
+                                        <p:cTn id="20" dur="1" fill="hold">
+                                          <p:stCondLst>
+                                            <p:cond delay="0"/>
+                                          </p:stCondLst>
+                                        </p:cTn>
+                                        <p:tgtEl>
+                                          <p:spTgt spid="3">
+                                            <p:txEl>
+                                              <p:pRg st="1" end="1"/>
+                                            </p:txEl>
+                                          </p:spTgt>
+                                        </p:tgtEl>
+                                        <p:attrNameLst>
+                                          <p:attrName>style.visibility</p:attrName>
+                                        </p:attrNameLst>
+                                      </p:cBhvr>
+                                      <p:to>
+                                        <p:strVal val="visible"/>
+                                      </p:to>
+                                    </p:set>
+                                    <p:animEffect transition="in" filter="fade">
+                                      <p:cBhvr>
+                                        <p:cTn id="21" dur="1000"/>
+                                        <p:tgtEl>
+                                          <p:spTgt spid="3">
+                                            <p:txEl>
+                                              <p:pRg st="1" end="1"/>
+                                            </p:txEl>
+                                          </p:spTgt>
+                                        </p:tgtEl>
+                                      </p:cBhvr>
+                                    </p:animEffect>
+                                    <p:anim calcmode="lin" valueType="num">
+                                      <p:cBhvr>
+                                        <p:cTn id="22" dur="1000" fill="hold"/>
+                                        <p:tgtEl>
+                                          <p:spTgt spid="3">
+                                            <p:txEl>
+                                              <p:pRg st="1" end="1"/>
+                                            </p:txEl>
+                                          </p:spTgt>
+                                        </p:tgtEl>
+                                        <p:attrNameLst>
+                                          <p:attrName>ppt_x</p:attrName>
+                                        </p:attrNameLst>
+                                      </p:cBhvr>
+                                      <p:tavLst>
+                                        <p:tav tm="0">
+                                          <p:val>
+                                            <p:strVal val="#ppt_x"/>
+                                          </p:val>
+                                        </p:tav>
+                                        <p:tav tm="100000">
+                                          <p:val>
+                                            <p:strVal val="#ppt_x"/>
+                                          </p:val>
+                                        </p:tav>
+                                      </p:tavLst>
+                                    </p:anim>
+                                    <p:anim calcmode="lin" valueType="num">
+                                      <p:cBhvr>
+                                        <p:cTn id="23" dur="1000" fill="hold"/>
+                                        <p:tgtEl>
+                                          <p:spTgt spid="3">
+                                            <p:txEl>
+                                              <p:pRg st="1" end="1"/>
+                                            </p:txEl>
+                                          </p:spTgt>
+                                        </p:tgtEl>
+                                        <p:attrNameLst>
+                                          <p:attrName>ppt_y</p:attrName>
+                                        </p:attrNameLst>
+                                      </p:cBhvr>
+                                      <p:tavLst>
+                                        <p:tav tm="0">
+                                          <p:val>
+                                            <p:strVal val="#ppt_y+.1"/>
+                                          </p:val>
+                                        </p:tav>
+                                        <p:tav tm="100000">
+                                          <p:val>
+                                            <p:strVal val="#ppt_y"/>
+                                          </p:val>
+                                        </p:tav>
+                                      </p:tavLst>
+                                    </p:anim>
+                                  </p:childTnLst>
+                                </p:cTn>
+                              </p:par>
+                            </p:childTnLst>
+                          </p:cTn>
+                        </p:par>
+                      </p:childTnLst>
+                    </p:cTn>
+                  </p:par>
+                  <p:par>
+                    <p:cTn id="24" fill="hold">
+                      <p:stCondLst>
+                        <p:cond delay="indefinite"/>
+                      </p:stCondLst>
+                      <p:childTnLst>
+                        <p:par>
+                          <p:cTn id="25" fill="hold">
+                            <p:stCondLst>
+                              <p:cond delay="0"/>
+                            </p:stCondLst>
+                            <p:childTnLst>
+                              <p:par>
+                                <p:cTn id="26" presetID="42" presetClass="entr" presetSubtype="0" fill="hold" grpId="0" nodeType="clickEffect">
+                                  <p:stCondLst>
+                                    <p:cond delay="0"/>
+                                  </p:stCondLst>
+                                  <p:childTnLst>
+                                    <p:set>
+                                      <p:cBhvr>
+                                        <p:cTn id="27" dur="1" fill="hold">
+                                          <p:stCondLst>
+                                            <p:cond delay="0"/>
+                                          </p:stCondLst>
+                                        </p:cTn>
+                                        <p:tgtEl>
+                                          <p:spTgt spid="3">
+                                            <p:txEl>
+                                              <p:pRg st="2" end="2"/>
+                                            </p:txEl>
+                                          </p:spTgt>
+                                        </p:tgtEl>
+                                        <p:attrNameLst>
+                                          <p:attrName>style.visibility</p:attrName>
+                                        </p:attrNameLst>
+                                      </p:cBhvr>
+                                      <p:to>
+                                        <p:strVal val="visible"/>
+                                      </p:to>
+                                    </p:set>
+                                    <p:animEffect transition="in" filter="fade">
+                                      <p:cBhvr>
+                                        <p:cTn id="28" dur="1000"/>
+                                        <p:tgtEl>
+                                          <p:spTgt spid="3">
+                                            <p:txEl>
+                                              <p:pRg st="2" end="2"/>
+                                            </p:txEl>
+                                          </p:spTgt>
+                                        </p:tgtEl>
+                                      </p:cBhvr>
+                                    </p:animEffect>
+                                    <p:anim calcmode="lin" valueType="num">
+                                      <p:cBhvr>
+                                        <p:cTn id="29" dur="1000" fill="hold"/>
+                                        <p:tgtEl>
+                                          <p:spTgt spid="3">
+                                            <p:txEl>
+                                              <p:pRg st="2" end="2"/>
+                                            </p:txEl>
+                                          </p:spTgt>
+                                        </p:tgtEl>
+                                        <p:attrNameLst>
+                                          <p:attrName>ppt_x</p:attrName>
+                                        </p:attrNameLst>
+                                      </p:cBhvr>
+                                      <p:tavLst>
+                                        <p:tav tm="0">
+                                          <p:val>
+                                            <p:strVal val="#ppt_x"/>
+                                          </p:val>
+                                        </p:tav>
+                                        <p:tav tm="100000">
+                                          <p:val>
+                                            <p:strVal val="#ppt_x"/>
+                                          </p:val>
+                                        </p:tav>
+                                      </p:tavLst>
+                                    </p:anim>
+                                    <p:anim calcmode="lin" valueType="num">
+                                      <p:cBhvr>
+                                        <p:cTn id="30" dur="1000" fill="hold"/>
+                                        <p:tgtEl>
+                                          <p:spTgt spid="3">
+                                            <p:txEl>
+                                              <p:pRg st="2" end="2"/>
+                                            </p:txEl>
+                                          </p:spTgt>
+                                        </p:tgtEl>
+                                        <p:attrNameLst>
+                                          <p:attrName>ppt_y</p:attrName>
+                                        </p:attrNameLst>
+                                      </p:cBhvr>
+                                      <p:tavLst>
+                                        <p:tav tm="0">
+                                          <p:val>
+                                            <p:strVal val="#ppt_y+.1"/>
+                                          </p:val>
+                                        </p:tav>
+                                        <p:tav tm="100000">
+                                          <p:val>
+                                            <p:strVal val="#ppt_y"/>
+                                          </p:val>
+                                        </p:tav>
+                                      </p:tavLst>
+                                    </p:anim>
+                                  </p:childTnLst>
+                                </p:cTn>
+                              </p:par>
+                            </p:childTnLst>
+                          </p:cTn>
+                        </p:par>
+                      </p:childTnLst>
+                    </p:cTn>
+                  </p:par>
+                  <p:par>
+                    <p:cTn id="31" fill="hold">
+                      <p:stCondLst>
+                        <p:cond delay="indefinite"/>
+                      </p:stCondLst>
+                      <p:childTnLst>
+                        <p:par>
+                          <p:cTn id="32" fill="hold">
+                            <p:stCondLst>
+                              <p:cond delay="0"/>
+                            </p:stCondLst>
+                            <p:childTnLst>
+                              <p:par>
+                                <p:cTn id="33" presetID="42" presetClass="entr" presetSubtype="0" fill="hold" grpId="0" nodeType="clickEffect">
+                                  <p:stCondLst>
+                                    <p:cond delay="0"/>
+                                  </p:stCondLst>
+                                  <p:childTnLst>
+                                    <p:set>
+                                      <p:cBhvr>
+                                        <p:cTn id="34" dur="1" fill="hold">
+                                          <p:stCondLst>
+                                            <p:cond delay="0"/>
+                                          </p:stCondLst>
+                                        </p:cTn>
+                                        <p:tgtEl>
+                                          <p:spTgt spid="3">
+                                            <p:txEl>
+                                              <p:pRg st="3" end="3"/>
+                                            </p:txEl>
+                                          </p:spTgt>
+                                        </p:tgtEl>
+                                        <p:attrNameLst>
+                                          <p:attrName>style.visibility</p:attrName>
+                                        </p:attrNameLst>
+                                      </p:cBhvr>
+                                      <p:to>
+                                        <p:strVal val="visible"/>
+                                      </p:to>
+                                    </p:set>
+                                    <p:animEffect transition="in" filter="fade">
+                                      <p:cBhvr>
+                                        <p:cTn id="35" dur="1000"/>
+                                        <p:tgtEl>
+                                          <p:spTgt spid="3">
+                                            <p:txEl>
+                                              <p:pRg st="3" end="3"/>
+                                            </p:txEl>
+                                          </p:spTgt>
+                                        </p:tgtEl>
+                                      </p:cBhvr>
+                                    </p:animEffect>
+                                    <p:anim calcmode="lin" valueType="num">
+                                      <p:cBhvr>
+                                        <p:cTn id="36" dur="1000" fill="hold"/>
+                                        <p:tgtEl>
+                                          <p:spTgt spid="3">
+                                            <p:txEl>
+                                              <p:pRg st="3" end="3"/>
+                                            </p:txEl>
+                                          </p:spTgt>
+                                        </p:tgtEl>
+                                        <p:attrNameLst>
+                                          <p:attrName>ppt_x</p:attrName>
+                                        </p:attrNameLst>
+                                      </p:cBhvr>
+                                      <p:tavLst>
+                                        <p:tav tm="0">
+                                          <p:val>
+                                            <p:strVal val="#ppt_x"/>
+                                          </p:val>
+                                        </p:tav>
+                                        <p:tav tm="100000">
+                                          <p:val>
+                                            <p:strVal val="#ppt_x"/>
+                                          </p:val>
+                                        </p:tav>
+                                      </p:tavLst>
+                                    </p:anim>
+                                    <p:anim calcmode="lin" valueType="num">
+                                      <p:cBhvr>
+                                        <p:cTn id="37" dur="1000" fill="hold"/>
+                                        <p:tgtEl>
+                                          <p:spTgt spid="3">
+                                            <p:txEl>
+                                              <p:pRg st="3" end="3"/>
+                                            </p:txEl>
+                                          </p:spTgt>
+                                        </p:tgtEl>
+                                        <p:attrNameLst>
+                                          <p:attrName>ppt_y</p:attrName>
+                                        </p:attrNameLst>
+                                      </p:cBhvr>
+                                      <p:tavLst>
+                                        <p:tav tm="0">
+                                          <p:val>
+                                            <p:strVal val="#ppt_y+.1"/>
+                                          </p:val>
+                                        </p:tav>
+                                        <p:tav tm="100000">
+                                          <p:val>
+                                            <p:strVal val="#ppt_y"/>
+                                          </p:val>
+                                        </p:tav>
+                                      </p:tavLst>
+                                    </p:anim>
+                                  </p:childTnLst>
+                                </p:cTn>
+                              </p:par>
+                            </p:childTnLst>
+                          </p:cTn>
+                        </p:par>
+                      </p:childTnLst>
+                    </p:cTn>
+                  </p:par>
+                  <p:par>
+                    <p:cTn id="38" fill="hold">
+                      <p:stCondLst>
+                        <p:cond delay="indefinite"/>
+                      </p:stCondLst>
+                      <p:childTnLst>
+                        <p:par>
+                          <p:cTn id="39" fill="hold">
+                            <p:stCondLst>
+                              <p:cond delay="0"/>
+                            </p:stCondLst>
+                            <p:childTnLst>
+                              <p:par>
+                                <p:cTn id="40" presetID="42" presetClass="entr" presetSubtype="0" fill="hold" grpId="0" nodeType="clickEffect">
+                                  <p:stCondLst>
+                                    <p:cond delay="0"/>
+                                  </p:stCondLst>
+                                  <p:childTnLst>
+                                    <p:set>
+                                      <p:cBhvr>
+                                        <p:cTn id="41" dur="1" fill="hold">
+                                          <p:stCondLst>
+                                            <p:cond delay="0"/>
+                                          </p:stCondLst>
+                                        </p:cTn>
+                                        <p:tgtEl>
+                                          <p:spTgt spid="3">
+                                            <p:txEl>
+                                              <p:pRg st="4" end="4"/>
+                                            </p:txEl>
+                                          </p:spTgt>
+                                        </p:tgtEl>
+                                        <p:attrNameLst>
+                                          <p:attrName>style.visibility</p:attrName>
+                                        </p:attrNameLst>
+                                      </p:cBhvr>
+                                      <p:to>
+                                        <p:strVal val="visible"/>
+                                      </p:to>
+                                    </p:set>
+                                    <p:animEffect transition="in" filter="fade">
+                                      <p:cBhvr>
+                                        <p:cTn id="42" dur="1000"/>
+                                        <p:tgtEl>
+                                          <p:spTgt spid="3">
+                                            <p:txEl>
+                                              <p:pRg st="4" end="4"/>
+                                            </p:txEl>
+                                          </p:spTgt>
+                                        </p:tgtEl>
+                                      </p:cBhvr>
+                                    </p:animEffect>
+                                    <p:anim calcmode="lin" valueType="num">
+                                      <p:cBhvr>
+                                        <p:cTn id="43" dur="1000" fill="hold"/>
+                                        <p:tgtEl>
+                                          <p:spTgt spid="3">
+                                            <p:txEl>
+                                              <p:pRg st="4" end="4"/>
+                                            </p:txEl>
+                                          </p:spTgt>
+                                        </p:tgtEl>
+                                        <p:attrNameLst>
+                                          <p:attrName>ppt_x</p:attrName>
+                                        </p:attrNameLst>
+                                      </p:cBhvr>
+                                      <p:tavLst>
+                                        <p:tav tm="0">
+                                          <p:val>
+                                            <p:strVal val="#ppt_x"/>
+                                          </p:val>
+                                        </p:tav>
+                                        <p:tav tm="100000">
+                                          <p:val>
+                                            <p:strVal val="#ppt_x"/>
+                                          </p:val>
+                                        </p:tav>
+                                      </p:tavLst>
+                                    </p:anim>
+                                    <p:anim calcmode="lin" valueType="num">
+                                      <p:cBhvr>
+                                        <p:cTn id="44" dur="1000" fill="hold"/>
+                                        <p:tgtEl>
+                                          <p:spTgt spid="3">
+                                            <p:txEl>
+                                              <p:pRg st="4" end="4"/>
+                                            </p:txEl>
+                                          </p:spTgt>
+                                        </p:tgtEl>
+                                        <p:attrNameLst>
+                                          <p:attrName>ppt_y</p:attrName>
+                                        </p:attrNameLst>
+                                      </p:cBhvr>
+                                      <p:tavLst>
+                                        <p:tav tm="0">
+                                          <p:val>
+                                            <p:strVal val="#ppt_y+.1"/>
+                                          </p:val>
+                                        </p:tav>
+                                        <p:tav tm="100000">
+                                          <p:val>
+                                            <p:strVal val="#ppt_y"/>
+                                          </p:val>
+                                        </p:tav>
+                                      </p:tavLst>
+                                    </p:anim>
+                                  </p:childTnLst>
+                                </p:cTn>
+                              </p:par>
+                            </p:childTnLst>
+                          </p:cTn>
+                        </p:par>
+                      </p:childTnLst>
+                    </p:cTn>
+                  </p:par>
+                </p:childTnLst>
+              </p:cTn>
+              <p:prevCondLst>
+                <p:cond evt="onPrev" delay="0">
+                  <p:tgtEl>
+                    <p:sldTgt/>
+                  </p:tgtEl>
+                </p:cond>
+              </p:prevCondLst>
+              <p:nextCondLst>
+                <p:cond evt="onNext" delay="0">
+                  <p:tgtEl>
+                    <p:sldTgt/>
+                  </p:tgtEl>
+                </p:cond>
+              </p:nextCondLst>
+            </p:seq>
+          </p:childTnLst>
+        </p:cTn>
+      </p:par>
+    </p:tnLst>
+    <p:bldLst>
+      <p:bldP spid="2" grpId="0"/>
+      <p:bldP spid="3" grpId="0" build="p"/>
+    </p:bldLst>
+  </p:timing>
+</p:sld>
+</file>
+
+<file path=ppt/slides/slide9.xml><?xml version="1.0" encoding="utf-8"?>
+<p:sld xmlns:a="http://schemas.openxmlformats.org/drawingml/2006/main" xmlns:r="http://schemas.openxmlformats.org/officeDocument/2006/relationships" xmlns:p="http://schemas.openxmlformats.org/presentationml/2006/main">
+  <p:cSld>
+    <p:spTree>
+      <p:nvGrpSpPr>
+        <p:cNvPr id="1" name=""/>
+        <p:cNvGrpSpPr/>
+        <p:nvPr/>
+      </p:nvGrpSpPr>
+      <p:grpSpPr>
+        <a:xfrm>
+          <a:off x="0" y="0"/>
+          <a:ext cx="0" cy="0"/>
+          <a:chOff x="0" y="0"/>
+          <a:chExt cx="0" cy="0"/>
+        </a:xfrm>
+      </p:grpSpPr>
+      <p:sp>
+        <p:nvSpPr>
+          <p:cNvPr id="2" name="Title 1">
+            <a:extLst>
+              <a:ext uri="{FF2B5EF4-FFF2-40B4-BE49-F238E27FC236}">
+                <a16:creationId xmlns:a16="http://schemas.microsoft.com/office/drawing/2014/main" id="{71DF1E49-F0A2-43B0-BA12-54D164D63BC2}"/>
+              </a:ext>
+            </a:extLst>
+          </p:cNvPr>
+          <p:cNvSpPr>
+            <a:spLocks noGrp="1"/>
+          </p:cNvSpPr>
+          <p:nvPr>
+            <p:ph type="title"/>
+          </p:nvPr>
+        </p:nvSpPr>
+        <p:spPr/>
+        <p:txBody>
+          <a:bodyPr/>
+          <a:lstStyle/>
+          <a:p>
+            <a:r>
+              <a:rPr lang="lv-LV" dirty="0"/>
+              <a:t>Paldies par uzmanību! ;]</a:t>
+            </a:r>
+          </a:p>
+        </p:txBody>
+      </p:sp>
+      <p:pic>
+        <p:nvPicPr>
+          <p:cNvPr id="1026" name="Picture 2" descr="12 Things Every Programmer Should Know | by javinpaul | The Startup | Medium">
+            <a:extLst>
+              <a:ext uri="{FF2B5EF4-FFF2-40B4-BE49-F238E27FC236}">
+                <a16:creationId xmlns:a16="http://schemas.microsoft.com/office/drawing/2014/main" id="{4BC24F76-8D14-4A53-AB4E-1EF2E7F6E9EA}"/>
+              </a:ext>
+            </a:extLst>
+          </p:cNvPr>
+          <p:cNvPicPr>
+            <a:picLocks noChangeAspect="1" noChangeArrowheads="1"/>
+          </p:cNvPicPr>
+          <p:nvPr/>
+        </p:nvPicPr>
+        <p:blipFill>
+          <a:blip r:embed="rId2">
+            <a:extLst>
+              <a:ext uri="{28A0092B-C50C-407E-A947-70E740481C1C}">
+                <a14:useLocalDpi xmlns:a14="http://schemas.microsoft.com/office/drawing/2010/main" val="0"/>
+              </a:ext>
+            </a:extLst>
+          </a:blip>
+          <a:srcRect/>
+          <a:stretch>
+            <a:fillRect/>
+          </a:stretch>
+        </p:blipFill>
+        <p:spPr bwMode="auto">
+          <a:xfrm>
+            <a:off x="1704569" y="1479356"/>
+            <a:ext cx="7287805" cy="4715189"/>
+          </a:xfrm>
+          <a:prstGeom prst="rect">
+            <a:avLst/>
+          </a:prstGeom>
+          <a:noFill/>
+          <a:extLst>
+            <a:ext uri="{909E8E84-426E-40DD-AFC4-6F175D3DCCD1}">
+              <a14:hiddenFill xmlns:a14="http://schemas.microsoft.com/office/drawing/2010/main">
+                <a:solidFill>
+                  <a:srgbClr val="FFFFFF"/>
+                </a:solidFill>
+              </a14:hiddenFill>
+            </a:ext>
+          </a:extLst>
+        </p:spPr>
+      </p:pic>
+    </p:spTree>
+    <p:extLst>
+      <p:ext uri="{BB962C8B-B14F-4D97-AF65-F5344CB8AC3E}">
+        <p14:creationId xmlns:p14="http://schemas.microsoft.com/office/powerpoint/2010/main" val="623684309"/>
+      </p:ext>
+    </p:extLst>
+  </p:cSld>
+  <p:clrMapOvr>
+    <a:masterClrMapping/>
+  </p:clrMapOvr>
+  <p:transition spd="slow">
+    <p:wipe/>
+  </p:transition>
+  <p:timing>
+    <p:tnLst>
+      <p:par>
+        <p:cTn id="1" dur="indefinite" restart="never" nodeType="tmRoot">
+          <p:childTnLst>
+            <p:seq concurrent="1" nextAc="seek">
+              <p:cTn id="2" dur="indefinite" nodeType="mainSeq">
+                <p:childTnLst>
+                  <p:par>
+                    <p:cTn id="3" fill="hold">
+                      <p:stCondLst>
+                        <p:cond delay="indefinite"/>
+                      </p:stCondLst>
+                      <p:childTnLst>
+                        <p:par>
+                          <p:cTn id="4" fill="hold">
+                            <p:stCondLst>
+                              <p:cond delay="0"/>
+                            </p:stCondLst>
+                            <p:childTnLst>
+                              <p:par>
+                                <p:cTn id="5" presetID="42" presetClass="entr" presetSubtype="0" fill="hold" grpId="0" nodeType="clickEffect">
+                                  <p:stCondLst>
+                                    <p:cond delay="0"/>
+                                  </p:stCondLst>
+                                  <p:childTnLst>
+                                    <p:set>
+                                      <p:cBhvr>
+                                        <p:cTn id="6" dur="1" fill="hold">
+                                          <p:stCondLst>
+                                            <p:cond delay="0"/>
+                                          </p:stCondLst>
+                                        </p:cTn>
+                                        <p:tgtEl>
+                                          <p:spTgt spid="2"/>
+                                        </p:tgtEl>
+                                        <p:attrNameLst>
+                                          <p:attrName>style.visibility</p:attrName>
+                                        </p:attrNameLst>
+                                      </p:cBhvr>
+                                      <p:to>
+                                        <p:strVal val="visible"/>
+                                      </p:to>
+                                    </p:set>
+                                    <p:animEffect transition="in" filter="fade">
+                                      <p:cBhvr>
+                                        <p:cTn id="7" dur="1000"/>
+                                        <p:tgtEl>
+                                          <p:spTgt spid="2"/>
+                                        </p:tgtEl>
+                                      </p:cBhvr>
+                                    </p:animEffect>
+                                    <p:anim calcmode="lin" valueType="num">
+                                      <p:cBhvr>
+                                        <p:cTn id="8" dur="1000" fill="hold"/>
+                                        <p:tgtEl>
+                                          <p:spTgt spid="2"/>
+                                        </p:tgtEl>
+                                        <p:attrNameLst>
+                                          <p:attrName>ppt_x</p:attrName>
+                                        </p:attrNameLst>
+                                      </p:cBhvr>
+                                      <p:tavLst>
+                                        <p:tav tm="0">
+                                          <p:val>
+                                            <p:strVal val="#ppt_x"/>
+                                          </p:val>
+                                        </p:tav>
+                                        <p:tav tm="100000">
+                                          <p:val>
+                                            <p:strVal val="#ppt_x"/>
+                                          </p:val>
+                                        </p:tav>
+                                      </p:tavLst>
+                                    </p:anim>
+                                    <p:anim calcmode="lin" valueType="num">
+                                      <p:cBhvr>
+                                        <p:cTn id="9" dur="1000" fill="hold"/>
+                                        <p:tgtEl>
+                                          <p:spTgt spid="2"/>
+                                        </p:tgtEl>
+                                        <p:attrNameLst>
+                                          <p:attrName>ppt_y</p:attrName>
+                                        </p:attrNameLst>
+                                      </p:cBhvr>
+                                      <p:tavLst>
+                                        <p:tav tm="0">
+                                          <p:val>
+                                            <p:strVal val="#ppt_y+.1"/>
+                                          </p:val>
+                                        </p:tav>
+                                        <p:tav tm="100000">
+                                          <p:val>
+                                            <p:strVal val="#ppt_y"/>
+                                          </p:val>
+                                        </p:tav>
+                                      </p:tavLst>
+                                    </p:anim>
+                                  </p:childTnLst>
+                                </p:cTn>
+                              </p:par>
+                            </p:childTnLst>
+                          </p:cTn>
+                        </p:par>
+                      </p:childTnLst>
+                    </p:cTn>
+                  </p:par>
+                  <p:par>
+                    <p:cTn id="10" fill="hold">
+                      <p:stCondLst>
+                        <p:cond delay="indefinite"/>
+                      </p:stCondLst>
+                      <p:childTnLst>
+                        <p:par>
+                          <p:cTn id="11" fill="hold">
+                            <p:stCondLst>
+                              <p:cond delay="0"/>
+                            </p:stCondLst>
+                            <p:childTnLst>
+                              <p:par>
+                                <p:cTn id="12" presetID="42" presetClass="entr" presetSubtype="0" fill="hold" nodeType="clickEffect">
+                                  <p:stCondLst>
+                                    <p:cond delay="0"/>
+                                  </p:stCondLst>
+                                  <p:childTnLst>
+                                    <p:set>
+                                      <p:cBhvr>
+                                        <p:cTn id="13" dur="1" fill="hold">
+                                          <p:stCondLst>
+                                            <p:cond delay="0"/>
+                                          </p:stCondLst>
+                                        </p:cTn>
+                                        <p:tgtEl>
+                                          <p:spTgt spid="1026"/>
+                                        </p:tgtEl>
+                                        <p:attrNameLst>
+                                          <p:attrName>style.visibility</p:attrName>
+                                        </p:attrNameLst>
+                                      </p:cBhvr>
+                                      <p:to>
+                                        <p:strVal val="visible"/>
+                                      </p:to>
+                                    </p:set>
+                                    <p:animEffect transition="in" filter="fade">
+                                      <p:cBhvr>
+                                        <p:cTn id="14" dur="1000"/>
+                                        <p:tgtEl>
+                                          <p:spTgt spid="1026"/>
+                                        </p:tgtEl>
+                                      </p:cBhvr>
+                                    </p:animEffect>
+                                    <p:anim calcmode="lin" valueType="num">
+                                      <p:cBhvr>
+                                        <p:cTn id="15" dur="1000" fill="hold"/>
+                                        <p:tgtEl>
+                                          <p:spTgt spid="1026"/>
+                                        </p:tgtEl>
+                                        <p:attrNameLst>
+                                          <p:attrName>ppt_x</p:attrName>
+                                        </p:attrNameLst>
+                                      </p:cBhvr>
+                                      <p:tavLst>
+                                        <p:tav tm="0">
+                                          <p:val>
+                                            <p:strVal val="#ppt_x"/>
+                                          </p:val>
+                                        </p:tav>
+                                        <p:tav tm="100000">
+                                          <p:val>
+                                            <p:strVal val="#ppt_x"/>
+                                          </p:val>
+                                        </p:tav>
+                                      </p:tavLst>
+                                    </p:anim>
+                                    <p:anim calcmode="lin" valueType="num">
+                                      <p:cBhvr>
+                                        <p:cTn id="16" dur="1000" fill="hold"/>
+                                        <p:tgtEl>
+                                          <p:spTgt spid="1026"/>
+                                        </p:tgtEl>
+                                        <p:attrNameLst>
+                                          <p:attrName>ppt_y</p:attrName>
+                                        </p:attrNameLst>
+                                      </p:cBhvr>
+                                      <p:tavLst>
+                                        <p:tav tm="0">
+                                          <p:val>
+                                            <p:strVal val="#ppt_y+.1"/>
+                                          </p:val>
+                                        </p:tav>
+                                        <p:tav tm="100000">
+                                          <p:val>
+                                            <p:strVal val="#ppt_y"/>
+                                          </p:val>
+                                        </p:tav>
+                                      </p:tavLst>
+                                    </p:anim>
+                                  </p:childTnLst>
+                                </p:cTn>
+                              </p:par>
+                            </p:childTnLst>
+                          </p:cTn>
+                        </p:par>
+                      </p:childTnLst>
+                    </p:cTn>
+                  </p:par>
+                </p:childTnLst>
+              </p:cTn>
+              <p:prevCondLst>
+                <p:cond evt="onPrev" delay="0">
+                  <p:tgtEl>
+                    <p:sldTgt/>
+                  </p:tgtEl>
+                </p:cond>
+              </p:prevCondLst>
+              <p:nextCondLst>
+                <p:cond evt="onNext" delay="0">
+                  <p:tgtEl>
+                    <p:sldTgt/>
+                  </p:tgtEl>
+                </p:cond>
+              </p:nextCondLst>
+            </p:seq>
+          </p:childTnLst>
+        </p:cTn>
+      </p:par>
+    </p:tnLst>
+    <p:bldLst>
+      <p:bldP spid="2" grpId="0"/>
+    </p:bldLst>
+  </p:timing>
 </p:sld>
 </file>
 
@@ -9413,4 +12657,299 @@
     </a:ext>
   </a:extLst>
 </a:theme>
+</file>
+
+<file path=ppt/theme/theme2.xml><?xml version="1.0" encoding="utf-8"?>
+<a:theme xmlns:a="http://schemas.openxmlformats.org/drawingml/2006/main" name="Office Theme">
+  <a:themeElements>
+    <a:clrScheme name="Office">
+      <a:dk1>
+        <a:sysClr val="windowText" lastClr="000000"/>
+      </a:dk1>
+      <a:lt1>
+        <a:sysClr val="window" lastClr="FFFFFF"/>
+      </a:lt1>
+      <a:dk2>
+        <a:srgbClr val="44546A"/>
+      </a:dk2>
+      <a:lt2>
+        <a:srgbClr val="E7E6E6"/>
+      </a:lt2>
+      <a:accent1>
+        <a:srgbClr val="4472C4"/>
+      </a:accent1>
+      <a:accent2>
+        <a:srgbClr val="ED7D31"/>
+      </a:accent2>
+      <a:accent3>
+        <a:srgbClr val="A5A5A5"/>
+      </a:accent3>
+      <a:accent4>
+        <a:srgbClr val="FFC000"/>
+      </a:accent4>
+      <a:accent5>
+        <a:srgbClr val="5B9BD5"/>
+      </a:accent5>
+      <a:accent6>
+        <a:srgbClr val="70AD47"/>
+      </a:accent6>
+      <a:hlink>
+        <a:srgbClr val="0563C1"/>
+      </a:hlink>
+      <a:folHlink>
+        <a:srgbClr val="954F72"/>
+      </a:folHlink>
+    </a:clrScheme>
+    <a:fontScheme name="Office">
+      <a:majorFont>
+        <a:latin typeface="Calibri Light" panose="020F0302020204030204"/>
+        <a:ea typeface=""/>
+        <a:cs typeface=""/>
+        <a:font script="Jpan" typeface="游ゴシック Light"/>
+        <a:font script="Hang" typeface="맑은 고딕"/>
+        <a:font script="Hans" typeface="等线 Light"/>
+        <a:font script="Hant" typeface="新細明體"/>
+        <a:font script="Arab" typeface="Times New Roman"/>
+        <a:font script="Hebr" typeface="Times New Roman"/>
+        <a:font script="Thai" typeface="Angsana New"/>
+        <a:font script="Ethi" typeface="Nyala"/>
+        <a:font script="Beng" typeface="Vrinda"/>
+        <a:font script="Gujr" typeface="Shruti"/>
+        <a:font script="Khmr" typeface="MoolBoran"/>
+        <a:font script="Knda" typeface="Tunga"/>
+        <a:font script="Guru" typeface="Raavi"/>
+        <a:font script="Cans" typeface="Euphemia"/>
+        <a:font script="Cher" typeface="Plantagenet Cherokee"/>
+        <a:font script="Yiii" typeface="Microsoft Yi Baiti"/>
+        <a:font script="Tibt" typeface="Microsoft Himalaya"/>
+        <a:font script="Thaa" typeface="MV Boli"/>
+        <a:font script="Deva" typeface="Mangal"/>
+        <a:font script="Telu" typeface="Gautami"/>
+        <a:font script="Taml" typeface="Latha"/>
+        <a:font script="Syrc" typeface="Estrangelo Edessa"/>
+        <a:font script="Orya" typeface="Kalinga"/>
+        <a:font script="Mlym" typeface="Kartika"/>
+        <a:font script="Laoo" typeface="DokChampa"/>
+        <a:font script="Sinh" typeface="Iskoola Pota"/>
+        <a:font script="Mong" typeface="Mongolian Baiti"/>
+        <a:font script="Viet" typeface="Times New Roman"/>
+        <a:font script="Uigh" typeface="Microsoft Uighur"/>
+        <a:font script="Geor" typeface="Sylfaen"/>
+        <a:font script="Armn" typeface="Arial"/>
+        <a:font script="Bugi" typeface="Leelawadee UI"/>
+        <a:font script="Bopo" typeface="Microsoft JhengHei"/>
+        <a:font script="Java" typeface="Javanese Text"/>
+        <a:font script="Lisu" typeface="Segoe UI"/>
+        <a:font script="Mymr" typeface="Myanmar Text"/>
+        <a:font script="Nkoo" typeface="Ebrima"/>
+        <a:font script="Olck" typeface="Nirmala UI"/>
+        <a:font script="Osma" typeface="Ebrima"/>
+        <a:font script="Phag" typeface="Phagspa"/>
+        <a:font script="Syrn" typeface="Estrangelo Edessa"/>
+        <a:font script="Syrj" typeface="Estrangelo Edessa"/>
+        <a:font script="Syre" typeface="Estrangelo Edessa"/>
+        <a:font script="Sora" typeface="Nirmala UI"/>
+        <a:font script="Tale" typeface="Microsoft Tai Le"/>
+        <a:font script="Talu" typeface="Microsoft New Tai Lue"/>
+        <a:font script="Tfng" typeface="Ebrima"/>
+      </a:majorFont>
+      <a:minorFont>
+        <a:latin typeface="Calibri" panose="020F0502020204030204"/>
+        <a:ea typeface=""/>
+        <a:cs typeface=""/>
+        <a:font script="Jpan" typeface="游ゴシック"/>
+        <a:font script="Hang" typeface="맑은 고딕"/>
+        <a:font script="Hans" typeface="等线"/>
+        <a:font script="Hant" typeface="新細明體"/>
+        <a:font script="Arab" typeface="Arial"/>
+        <a:font script="Hebr" typeface="Arial"/>
+        <a:font script="Thai" typeface="Cordia New"/>
+        <a:font script="Ethi" typeface="Nyala"/>
+        <a:font script="Beng" typeface="Vrinda"/>
+        <a:font script="Gujr" typeface="Shruti"/>
+        <a:font script="Khmr" typeface="DaunPenh"/>
+        <a:font script="Knda" typeface="Tunga"/>
+        <a:font script="Guru" typeface="Raavi"/>
+        <a:font script="Cans" typeface="Euphemia"/>
+        <a:font script="Cher" typeface="Plantagenet Cherokee"/>
+        <a:font script="Yiii" typeface="Microsoft Yi Baiti"/>
+        <a:font script="Tibt" typeface="Microsoft Himalaya"/>
+        <a:font script="Thaa" typeface="MV Boli"/>
+        <a:font script="Deva" typeface="Mangal"/>
+        <a:font script="Telu" typeface="Gautami"/>
+        <a:font script="Taml" typeface="Latha"/>
+        <a:font script="Syrc" typeface="Estrangelo Edessa"/>
+        <a:font script="Orya" typeface="Kalinga"/>
+        <a:font script="Mlym" typeface="Kartika"/>
+        <a:font script="Laoo" typeface="DokChampa"/>
+        <a:font script="Sinh" typeface="Iskoola Pota"/>
+        <a:font script="Mong" typeface="Mongolian Baiti"/>
+        <a:font script="Viet" typeface="Arial"/>
+        <a:font script="Uigh" typeface="Microsoft Uighur"/>
+        <a:font script="Geor" typeface="Sylfaen"/>
+        <a:font script="Armn" typeface="Arial"/>
+        <a:font script="Bugi" typeface="Leelawadee UI"/>
+        <a:font script="Bopo" typeface="Microsoft JhengHei"/>
+        <a:font script="Java" typeface="Javanese Text"/>
+        <a:font script="Lisu" typeface="Segoe UI"/>
+        <a:font script="Mymr" typeface="Myanmar Text"/>
+        <a:font script="Nkoo" typeface="Ebrima"/>
+        <a:font script="Olck" typeface="Nirmala UI"/>
+        <a:font script="Osma" typeface="Ebrima"/>
+        <a:font script="Phag" typeface="Phagspa"/>
+        <a:font script="Syrn" typeface="Estrangelo Edessa"/>
+        <a:font script="Syrj" typeface="Estrangelo Edessa"/>
+        <a:font script="Syre" typeface="Estrangelo Edessa"/>
+        <a:font script="Sora" typeface="Nirmala UI"/>
+        <a:font script="Tale" typeface="Microsoft Tai Le"/>
+        <a:font script="Talu" typeface="Microsoft New Tai Lue"/>
+        <a:font script="Tfng" typeface="Ebrima"/>
+      </a:minorFont>
+    </a:fontScheme>
+    <a:fmtScheme name="Office">
+      <a:fillStyleLst>
+        <a:solidFill>
+          <a:schemeClr val="phClr"/>
+        </a:solidFill>
+        <a:gradFill rotWithShape="1">
+          <a:gsLst>
+            <a:gs pos="0">
+              <a:schemeClr val="phClr">
+                <a:lumMod val="110000"/>
+                <a:satMod val="105000"/>
+                <a:tint val="67000"/>
+              </a:schemeClr>
+            </a:gs>
+            <a:gs pos="50000">
+              <a:schemeClr val="phClr">
+                <a:lumMod val="105000"/>
+                <a:satMod val="103000"/>
+                <a:tint val="73000"/>
+              </a:schemeClr>
+            </a:gs>
+            <a:gs pos="100000">
+              <a:schemeClr val="phClr">
+                <a:lumMod val="105000"/>
+                <a:satMod val="109000"/>
+                <a:tint val="81000"/>
+              </a:schemeClr>
+            </a:gs>
+          </a:gsLst>
+          <a:lin ang="5400000" scaled="0"/>
+        </a:gradFill>
+        <a:gradFill rotWithShape="1">
+          <a:gsLst>
+            <a:gs pos="0">
+              <a:schemeClr val="phClr">
+                <a:satMod val="103000"/>
+                <a:lumMod val="102000"/>
+                <a:tint val="94000"/>
+              </a:schemeClr>
+            </a:gs>
+            <a:gs pos="50000">
+              <a:schemeClr val="phClr">
+                <a:satMod val="110000"/>
+                <a:lumMod val="100000"/>
+                <a:shade val="100000"/>
+              </a:schemeClr>
+            </a:gs>
+            <a:gs pos="100000">
+              <a:schemeClr val="phClr">
+                <a:lumMod val="99000"/>
+                <a:satMod val="120000"/>
+                <a:shade val="78000"/>
+              </a:schemeClr>
+            </a:gs>
+          </a:gsLst>
+          <a:lin ang="5400000" scaled="0"/>
+        </a:gradFill>
+      </a:fillStyleLst>
+      <a:lnStyleLst>
+        <a:ln w="6350" cap="flat" cmpd="sng" algn="ctr">
+          <a:solidFill>
+            <a:schemeClr val="phClr"/>
+          </a:solidFill>
+          <a:prstDash val="solid"/>
+          <a:miter lim="800000"/>
+        </a:ln>
+        <a:ln w="12700" cap="flat" cmpd="sng" algn="ctr">
+          <a:solidFill>
+            <a:schemeClr val="phClr"/>
+          </a:solidFill>
+          <a:prstDash val="solid"/>
+          <a:miter lim="800000"/>
+        </a:ln>
+        <a:ln w="19050" cap="flat" cmpd="sng" algn="ctr">
+          <a:solidFill>
+            <a:schemeClr val="phClr"/>
+          </a:solidFill>
+          <a:prstDash val="solid"/>
+          <a:miter lim="800000"/>
+        </a:ln>
+      </a:lnStyleLst>
+      <a:effectStyleLst>
+        <a:effectStyle>
+          <a:effectLst/>
+        </a:effectStyle>
+        <a:effectStyle>
+          <a:effectLst/>
+        </a:effectStyle>
+        <a:effectStyle>
+          <a:effectLst>
+            <a:outerShdw blurRad="57150" dist="19050" dir="5400000" algn="ctr" rotWithShape="0">
+              <a:srgbClr val="000000">
+                <a:alpha val="63000"/>
+              </a:srgbClr>
+            </a:outerShdw>
+          </a:effectLst>
+        </a:effectStyle>
+      </a:effectStyleLst>
+      <a:bgFillStyleLst>
+        <a:solidFill>
+          <a:schemeClr val="phClr"/>
+        </a:solidFill>
+        <a:solidFill>
+          <a:schemeClr val="phClr">
+            <a:tint val="95000"/>
+            <a:satMod val="170000"/>
+          </a:schemeClr>
+        </a:solidFill>
+        <a:gradFill rotWithShape="1">
+          <a:gsLst>
+            <a:gs pos="0">
+              <a:schemeClr val="phClr">
+                <a:tint val="93000"/>
+                <a:satMod val="150000"/>
+                <a:shade val="98000"/>
+                <a:lumMod val="102000"/>
+              </a:schemeClr>
+            </a:gs>
+            <a:gs pos="50000">
+              <a:schemeClr val="phClr">
+                <a:tint val="98000"/>
+                <a:satMod val="130000"/>
+                <a:shade val="90000"/>
+                <a:lumMod val="103000"/>
+              </a:schemeClr>
+            </a:gs>
+            <a:gs pos="100000">
+              <a:schemeClr val="phClr">
+                <a:shade val="63000"/>
+                <a:satMod val="120000"/>
+              </a:schemeClr>
+            </a:gs>
+          </a:gsLst>
+          <a:lin ang="5400000" scaled="0"/>
+        </a:gradFill>
+      </a:bgFillStyleLst>
+    </a:fmtScheme>
+  </a:themeElements>
+  <a:objectDefaults/>
+  <a:extraClrSchemeLst/>
+  <a:extLst>
+    <a:ext uri="{05A4C25C-085E-4340-85A3-A5531E510DB2}">
+      <thm15:themeFamily xmlns:thm15="http://schemas.microsoft.com/office/thememl/2012/main" name="Office Theme" id="{62F939B6-93AF-4DB8-9C6B-D6C7DFDC589F}" vid="{4A3C46E8-61CC-4603-A589-7422A47A8E4A}"/>
+    </a:ext>
+  </a:extLst>
+</a:theme>
 </file>
</xml_diff>

<commit_message>
Tagad gan pēdējais commits ;]
</commit_message>
<xml_diff>
--- a/macibu_materiali/eksamens_krumins.pptx
+++ b/macibu_materiali/eksamens_krumins.pptx
@@ -8463,7 +8463,7 @@
                                         <p:tgtEl>
                                           <p:spTgt spid="3">
                                             <p:txEl>
-                                              <p:pRg st="1" end="1"/>
+                                              <p:pRg st="0" end="0"/>
                                             </p:txEl>
                                           </p:spTgt>
                                         </p:tgtEl>
@@ -8481,7 +8481,7 @@
                                         <p:tgtEl>
                                           <p:spTgt spid="3">
                                             <p:txEl>
-                                              <p:pRg st="1" end="1"/>
+                                              <p:pRg st="0" end="0"/>
                                             </p:txEl>
                                           </p:spTgt>
                                         </p:tgtEl>
@@ -8493,7 +8493,7 @@
                                         <p:tgtEl>
                                           <p:spTgt spid="3">
                                             <p:txEl>
-                                              <p:pRg st="1" end="1"/>
+                                              <p:pRg st="0" end="0"/>
                                             </p:txEl>
                                           </p:spTgt>
                                         </p:tgtEl>
@@ -8520,7 +8520,7 @@
                                         <p:tgtEl>
                                           <p:spTgt spid="3">
                                             <p:txEl>
-                                              <p:pRg st="1" end="1"/>
+                                              <p:pRg st="0" end="0"/>
                                             </p:txEl>
                                           </p:spTgt>
                                         </p:tgtEl>
@@ -8578,7 +8578,7 @@
                                         <p:tgtEl>
                                           <p:spTgt spid="3">
                                             <p:txEl>
-                                              <p:pRg st="0" end="0"/>
+                                              <p:pRg st="1" end="1"/>
                                             </p:txEl>
                                           </p:spTgt>
                                         </p:tgtEl>
@@ -8596,7 +8596,7 @@
                                         <p:tgtEl>
                                           <p:spTgt spid="3">
                                             <p:txEl>
-                                              <p:pRg st="0" end="0"/>
+                                              <p:pRg st="1" end="1"/>
                                             </p:txEl>
                                           </p:spTgt>
                                         </p:tgtEl>
@@ -8608,7 +8608,7 @@
                                         <p:tgtEl>
                                           <p:spTgt spid="3">
                                             <p:txEl>
-                                              <p:pRg st="0" end="0"/>
+                                              <p:pRg st="1" end="1"/>
                                             </p:txEl>
                                           </p:spTgt>
                                         </p:tgtEl>
@@ -8635,7 +8635,7 @@
                                         <p:tgtEl>
                                           <p:spTgt spid="3">
                                             <p:txEl>
-                                              <p:pRg st="0" end="0"/>
+                                              <p:pRg st="1" end="1"/>
                                             </p:txEl>
                                           </p:spTgt>
                                         </p:tgtEl>
@@ -10243,7 +10243,7 @@
           <a:p>
             <a:r>
               <a:rPr lang="lv-LV" sz="3000" dirty="0"/>
-              <a:t>Strādāju ~3 pilnas dienas</a:t>
+              <a:t>Strādāju ~4 pilnas dienas</a:t>
             </a:r>
           </a:p>
           <a:p>
@@ -10255,7 +10255,7 @@
           <a:p>
             <a:r>
               <a:rPr lang="lv-LV" sz="3000" dirty="0"/>
-              <a:t>Veicu 39 </a:t>
+              <a:t>Veicu 42 </a:t>
             </a:r>
             <a:r>
               <a:rPr lang="lv-LV" sz="3000" dirty="0" err="1"/>
@@ -10275,10 +10275,10 @@
       </p:sp>
       <p:pic>
         <p:nvPicPr>
-          <p:cNvPr id="5" name="Picture 4">
+          <p:cNvPr id="6" name="Picture 5">
             <a:extLst>
               <a:ext uri="{FF2B5EF4-FFF2-40B4-BE49-F238E27FC236}">
-                <a16:creationId xmlns:a16="http://schemas.microsoft.com/office/drawing/2014/main" id="{0FE4A550-1661-4296-8DA2-F42B5A6EBCB7}"/>
+                <a16:creationId xmlns:a16="http://schemas.microsoft.com/office/drawing/2014/main" id="{2C73FBD2-4E2D-48F2-A1A0-6082EBA20036}"/>
               </a:ext>
             </a:extLst>
           </p:cNvPr>
@@ -10295,8 +10295,8 @@
         </p:blipFill>
         <p:spPr>
           <a:xfrm>
-            <a:off x="6228502" y="3428999"/>
-            <a:ext cx="5887872" cy="3274422"/>
+            <a:off x="6685058" y="3760728"/>
+            <a:ext cx="5499903" cy="3097271"/>
           </a:xfrm>
           <a:prstGeom prst="rect">
             <a:avLst/>
@@ -10449,7 +10449,7 @@
                                           </p:stCondLst>
                                         </p:cTn>
                                         <p:tgtEl>
-                                          <p:spTgt spid="5"/>
+                                          <p:spTgt spid="6"/>
                                         </p:tgtEl>
                                         <p:attrNameLst>
                                           <p:attrName>style.visibility</p:attrName>
@@ -10463,7 +10463,7 @@
                                       <p:cBhvr>
                                         <p:cTn id="14" dur="1000"/>
                                         <p:tgtEl>
-                                          <p:spTgt spid="5"/>
+                                          <p:spTgt spid="6"/>
                                         </p:tgtEl>
                                       </p:cBhvr>
                                     </p:animEffect>
@@ -10471,7 +10471,7 @@
                                       <p:cBhvr>
                                         <p:cTn id="15" dur="1000" fill="hold"/>
                                         <p:tgtEl>
-                                          <p:spTgt spid="5"/>
+                                          <p:spTgt spid="6"/>
                                         </p:tgtEl>
                                         <p:attrNameLst>
                                           <p:attrName>ppt_x</p:attrName>
@@ -10494,7 +10494,7 @@
                                       <p:cBhvr>
                                         <p:cTn id="16" dur="1000" fill="hold"/>
                                         <p:tgtEl>
-                                          <p:spTgt spid="5"/>
+                                          <p:spTgt spid="6"/>
                                         </p:tgtEl>
                                         <p:attrNameLst>
                                           <p:attrName>ppt_y</p:attrName>

</xml_diff>